<commit_message>
7.4 proof of DKA
</commit_message>
<xml_diff>
--- a/task4.pptx
+++ b/task4.pptx
@@ -5,7 +5,7 @@
     <p:sldMasterId id="2147483648" r:id="rId1"/>
   </p:sldMasterIdLst>
   <p:notesMasterIdLst>
-    <p:notesMasterId r:id="rId23"/>
+    <p:notesMasterId r:id="rId24"/>
   </p:notesMasterIdLst>
   <p:sldIdLst>
     <p:sldId id="256" r:id="rId2"/>
@@ -28,7 +28,8 @@
     <p:sldId id="273" r:id="rId19"/>
     <p:sldId id="274" r:id="rId20"/>
     <p:sldId id="276" r:id="rId21"/>
-    <p:sldId id="275" r:id="rId22"/>
+    <p:sldId id="277" r:id="rId22"/>
+    <p:sldId id="275" r:id="rId23"/>
   </p:sldIdLst>
   <p:sldSz cx="12192000" cy="6858000"/>
   <p:notesSz cx="6858000" cy="9144000"/>
@@ -330,6 +331,11 @@
       </a:defRPr>
     </a:lvl9pPr>
   </p:defaultTextStyle>
+  <p:extLst>
+    <p:ext uri="{EFAFB233-063F-42B5-8137-9DF3F51BA10A}">
+      <p15:sldGuideLst xmlns:p15="http://schemas.microsoft.com/office/powerpoint/2012/main"/>
+    </p:ext>
+  </p:extLst>
 </p:presentation>
 </file>
 
@@ -1824,7 +1830,7 @@
           </a:ln>
           <a:extLst>
             <a:ext uri="{C572A759-6A51-4108-AA02-DFA0A04FC94B}">
-              <ma14:wrappingTextBoxFlag xmlns:ma14="http://schemas.microsoft.com/office/mac/drawingml/2011/main" xmlns:a14="http://schemas.microsoft.com/office/drawing/2010/main" xmlns:m="http://schemas.openxmlformats.org/officeDocument/2006/math" xmlns="" val="1"/>
+              <ma14:wrappingTextBoxFlag xmlns="" xmlns:m="http://schemas.openxmlformats.org/officeDocument/2006/math" xmlns:a14="http://schemas.microsoft.com/office/drawing/2010/main" xmlns:ma14="http://schemas.microsoft.com/office/mac/drawingml/2011/main" val="1"/>
             </a:ext>
           </a:extLst>
         </p:spPr>
@@ -1863,7 +1869,7 @@
           </a:ln>
           <a:extLst>
             <a:ext uri="{C572A759-6A51-4108-AA02-DFA0A04FC94B}">
-              <ma14:wrappingTextBoxFlag xmlns:ma14="http://schemas.microsoft.com/office/mac/drawingml/2011/main" xmlns:a14="http://schemas.microsoft.com/office/drawing/2010/main" xmlns:m="http://schemas.openxmlformats.org/officeDocument/2006/math" xmlns="" val="1"/>
+              <ma14:wrappingTextBoxFlag xmlns="" xmlns:m="http://schemas.openxmlformats.org/officeDocument/2006/math" xmlns:a14="http://schemas.microsoft.com/office/drawing/2010/main" xmlns:ma14="http://schemas.microsoft.com/office/mac/drawingml/2011/main" val="1"/>
             </a:ext>
           </a:extLst>
         </p:spPr>
@@ -2896,8 +2902,8 @@
         </p:nvSpPr>
         <p:spPr>
           <a:xfrm>
-            <a:off x="4276672" y="6270816"/>
-            <a:ext cx="4169625" cy="554590"/>
+            <a:off x="4239431" y="6270816"/>
+            <a:ext cx="4244108" cy="584771"/>
           </a:xfrm>
           <a:prstGeom prst="rect">
             <a:avLst/>
@@ -2907,7 +2913,7 @@
           </a:ln>
           <a:extLst>
             <a:ext uri="{C572A759-6A51-4108-AA02-DFA0A04FC94B}">
-              <ma14:wrappingTextBoxFlag xmlns:ma14="http://schemas.microsoft.com/office/mac/drawingml/2011/main" xmlns:a14="http://schemas.microsoft.com/office/drawing/2010/main" xmlns:m="http://schemas.openxmlformats.org/officeDocument/2006/math" xmlns="" val="1"/>
+              <ma14:wrappingTextBoxFlag xmlns="" xmlns:m="http://schemas.openxmlformats.org/officeDocument/2006/math" xmlns:a14="http://schemas.microsoft.com/office/drawing/2010/main" xmlns:ma14="http://schemas.microsoft.com/office/mac/drawingml/2011/main" val="1"/>
             </a:ext>
           </a:extLst>
         </p:spPr>
@@ -2921,16 +2927,52 @@
               <a:defRPr sz="1600"/>
             </a:pPr>
             <a:r>
-              <a:t>17.11.2020</a:t>
-            </a:r>
+              <a:rPr lang="ru-RU" dirty="0"/>
+              <a:t>20</a:t>
+            </a:r>
+            <a:r>
+              <a:rPr dirty="0"/>
+              <a:t>.</a:t>
+            </a:r>
+            <a:r>
+              <a:rPr lang="ru-RU" dirty="0"/>
+              <a:t>0</a:t>
+            </a:r>
+            <a:r>
+              <a:rPr dirty="0"/>
+              <a:t>1.202</a:t>
+            </a:r>
+            <a:r>
+              <a:rPr lang="ru-RU" dirty="0"/>
+              <a:t>1</a:t>
+            </a:r>
+            <a:endParaRPr dirty="0"/>
           </a:p>
           <a:p>
             <a:pPr algn="ctr">
               <a:defRPr sz="1600"/>
             </a:pPr>
             <a:r>
-              <a:t>Петрозаводский Государственный Университет</a:t>
-            </a:r>
+              <a:rPr dirty="0" err="1"/>
+              <a:t>Петрозаводский</a:t>
+            </a:r>
+            <a:r>
+              <a:rPr dirty="0"/>
+              <a:t> </a:t>
+            </a:r>
+            <a:r>
+              <a:rPr dirty="0" err="1"/>
+              <a:t>Государственный</a:t>
+            </a:r>
+            <a:r>
+              <a:rPr dirty="0"/>
+              <a:t> </a:t>
+            </a:r>
+            <a:r>
+              <a:rPr dirty="0" err="1"/>
+              <a:t>Университет</a:t>
+            </a:r>
+            <a:endParaRPr dirty="0"/>
           </a:p>
         </p:txBody>
       </p:sp>
@@ -2953,7 +2995,7 @@
           </a:ln>
           <a:extLst>
             <a:ext uri="{C572A759-6A51-4108-AA02-DFA0A04FC94B}">
-              <ma14:wrappingTextBoxFlag xmlns:ma14="http://schemas.microsoft.com/office/mac/drawingml/2011/main" xmlns:a14="http://schemas.microsoft.com/office/drawing/2010/main" xmlns:m="http://schemas.openxmlformats.org/officeDocument/2006/math" xmlns="" val="1"/>
+              <ma14:wrappingTextBoxFlag xmlns="" xmlns:m="http://schemas.openxmlformats.org/officeDocument/2006/math" xmlns:a14="http://schemas.microsoft.com/office/drawing/2010/main" xmlns:ma14="http://schemas.microsoft.com/office/mac/drawingml/2011/main" val="1"/>
             </a:ext>
           </a:extLst>
         </p:spPr>
@@ -3000,7 +3042,7 @@
           </a:ln>
           <a:extLst>
             <a:ext uri="{C572A759-6A51-4108-AA02-DFA0A04FC94B}">
-              <ma14:wrappingTextBoxFlag xmlns:ma14="http://schemas.microsoft.com/office/mac/drawingml/2011/main" xmlns:a14="http://schemas.microsoft.com/office/drawing/2010/main" xmlns:m="http://schemas.openxmlformats.org/officeDocument/2006/math" xmlns="" val="1"/>
+              <ma14:wrappingTextBoxFlag xmlns="" xmlns:m="http://schemas.openxmlformats.org/officeDocument/2006/math" xmlns:a14="http://schemas.microsoft.com/office/drawing/2010/main" xmlns:ma14="http://schemas.microsoft.com/office/mac/drawingml/2011/main" val="1"/>
             </a:ext>
           </a:extLst>
         </p:spPr>
@@ -3128,9 +3170,7 @@
           <p:nvPr/>
         </p:nvPicPr>
         <p:blipFill>
-          <a:blip r:embed="rId2">
-            <a:extLst/>
-          </a:blip>
+          <a:blip r:embed="rId2"/>
           <a:stretch>
             <a:fillRect/>
           </a:stretch>
@@ -3252,7 +3292,7 @@
                         <a:defRPr sz="1800"/>
                       </a:pPr>
                       <a:r>
-                        <a:rPr sz="2200"/>
+                        <a:rPr sz="2200" dirty="0"/>
                         <a:t>S</a:t>
                       </a:r>
                     </a:p>
@@ -3449,7 +3489,7 @@
                         <a:defRPr sz="1800"/>
                       </a:pPr>
                       <a:r>
-                        <a:rPr sz="2200"/>
+                        <a:rPr sz="2200" dirty="0"/>
                         <a:t>ø</a:t>
                       </a:r>
                     </a:p>
@@ -3485,7 +3525,7 @@
           </a:ln>
           <a:extLst>
             <a:ext uri="{C572A759-6A51-4108-AA02-DFA0A04FC94B}">
-              <ma14:wrappingTextBoxFlag xmlns:ma14="http://schemas.microsoft.com/office/mac/drawingml/2011/main" xmlns:a14="http://schemas.microsoft.com/office/drawing/2010/main" xmlns:m="http://schemas.openxmlformats.org/officeDocument/2006/math" xmlns="" val="1"/>
+              <ma14:wrappingTextBoxFlag xmlns="" xmlns:m="http://schemas.openxmlformats.org/officeDocument/2006/math" xmlns:a14="http://schemas.microsoft.com/office/drawing/2010/main" xmlns:ma14="http://schemas.microsoft.com/office/mac/drawingml/2011/main" val="1"/>
             </a:ext>
           </a:extLst>
         </p:spPr>
@@ -3644,7 +3684,7 @@
           </a:ln>
           <a:extLst>
             <a:ext uri="{C572A759-6A51-4108-AA02-DFA0A04FC94B}">
-              <ma14:wrappingTextBoxFlag xmlns:ma14="http://schemas.microsoft.com/office/mac/drawingml/2011/main" xmlns:a14="http://schemas.microsoft.com/office/drawing/2010/main" xmlns:m="http://schemas.openxmlformats.org/officeDocument/2006/math" xmlns="" val="1"/>
+              <ma14:wrappingTextBoxFlag xmlns="" xmlns:m="http://schemas.openxmlformats.org/officeDocument/2006/math" xmlns:a14="http://schemas.microsoft.com/office/drawing/2010/main" xmlns:ma14="http://schemas.microsoft.com/office/mac/drawingml/2011/main" val="1"/>
             </a:ext>
           </a:extLst>
         </p:spPr>
@@ -4576,9 +4616,7 @@
           <p:nvPr/>
         </p:nvPicPr>
         <p:blipFill>
-          <a:blip r:embed="rId2">
-            <a:extLst/>
-          </a:blip>
+          <a:blip r:embed="rId2"/>
           <a:stretch>
             <a:fillRect/>
           </a:stretch>
@@ -5370,9 +5408,7 @@
           <p:nvPr/>
         </p:nvPicPr>
         <p:blipFill>
-          <a:blip r:embed="rId2">
-            <a:extLst/>
-          </a:blip>
+          <a:blip r:embed="rId2"/>
           <a:stretch>
             <a:fillRect/>
           </a:stretch>
@@ -6135,9 +6171,7 @@
           <p:nvPr/>
         </p:nvPicPr>
         <p:blipFill>
-          <a:blip r:embed="rId2">
-            <a:extLst/>
-          </a:blip>
+          <a:blip r:embed="rId2"/>
           <a:stretch>
             <a:fillRect/>
           </a:stretch>
@@ -6918,9 +6952,7 @@
           <p:nvPr/>
         </p:nvPicPr>
         <p:blipFill>
-          <a:blip r:embed="rId2">
-            <a:extLst/>
-          </a:blip>
+          <a:blip r:embed="rId2"/>
           <a:stretch>
             <a:fillRect/>
           </a:stretch>
@@ -7793,9 +7825,7 @@
           <p:nvPr/>
         </p:nvPicPr>
         <p:blipFill>
-          <a:blip r:embed="rId2">
-            <a:extLst/>
-          </a:blip>
+          <a:blip r:embed="rId2"/>
           <a:stretch>
             <a:fillRect/>
           </a:stretch>
@@ -8795,9 +8825,7 @@
           <p:nvPr/>
         </p:nvPicPr>
         <p:blipFill>
-          <a:blip r:embed="rId2">
-            <a:extLst/>
-          </a:blip>
+          <a:blip r:embed="rId2"/>
           <a:stretch>
             <a:fillRect/>
           </a:stretch>
@@ -9341,9 +9369,7 @@
           <p:nvPr/>
         </p:nvPicPr>
         <p:blipFill>
-          <a:blip r:embed="rId2">
-            <a:extLst/>
-          </a:blip>
+          <a:blip r:embed="rId2"/>
           <a:stretch>
             <a:fillRect/>
           </a:stretch>
@@ -9522,24 +9548,20 @@
             <p:ph type="title"/>
           </p:nvPr>
         </p:nvSpPr>
-        <p:spPr/>
+        <p:spPr>
+          <a:xfrm>
+            <a:off x="838200" y="170572"/>
+            <a:ext cx="10515600" cy="734101"/>
+          </a:xfrm>
+        </p:spPr>
         <p:txBody>
           <a:bodyPr/>
           <a:lstStyle/>
           <a:p>
             <a:r>
-              <a:rPr lang="ru-RU" dirty="0" smtClean="0"/>
-              <a:t>Обоснование </a:t>
-            </a:r>
-            <a:r>
               <a:rPr lang="ru-RU" dirty="0"/>
-              <a:t>детерминированности КА</a:t>
-            </a:r>
-            <a:r>
-              <a:rPr lang="ru-RU" dirty="0" smtClean="0"/>
-              <a:t> </a:t>
-            </a:r>
-            <a:endParaRPr lang="ru-RU" dirty="0"/>
+              <a:t>Обоснование детерминированности КА </a:t>
+            </a:r>
           </a:p>
         </p:txBody>
       </p:sp>
@@ -9580,7 +9602,7 @@
               <a:t>Одно начальное состояние </a:t>
             </a:r>
             <a:r>
-              <a:rPr lang="en-US" dirty="0" smtClean="0"/>
+              <a:rPr lang="en-US" dirty="0"/>
               <a:t>S.</a:t>
             </a:r>
             <a:endParaRPr lang="ru-RU" dirty="0"/>
@@ -9588,7 +9610,7 @@
           <a:p>
             <a:r>
               <a:rPr lang="ru-RU" dirty="0"/>
-              <a:t>Из каждого состояния есть только один переход по одному символу или такой переход отсутствует. </a:t>
+              <a:t>Из каждого состояния есть только один переход по одному символу, или такой переход отсутствует. </a:t>
             </a:r>
           </a:p>
           <a:p>
@@ -9605,9 +9627,7 @@
           <p:nvPr/>
         </p:nvPicPr>
         <p:blipFill>
-          <a:blip r:embed="rId2">
-            <a:extLst/>
-          </a:blip>
+          <a:blip r:embed="rId2"/>
           <a:stretch>
             <a:fillRect/>
           </a:stretch>
@@ -9656,6 +9676,578 @@
           <a:chExt cx="0" cy="0"/>
         </a:xfrm>
       </p:grpSpPr>
+      <p:pic>
+        <p:nvPicPr>
+          <p:cNvPr id="5" name="Рисунок 8" descr="Рисунок 8">
+            <a:extLst>
+              <a:ext uri="{FF2B5EF4-FFF2-40B4-BE49-F238E27FC236}">
+                <a16:creationId xmlns:a16="http://schemas.microsoft.com/office/drawing/2014/main" id="{BB93CBC2-7075-4733-9EB5-B462482818D2}"/>
+              </a:ext>
+            </a:extLst>
+          </p:cNvPr>
+          <p:cNvPicPr>
+            <a:picLocks noChangeAspect="1"/>
+          </p:cNvPicPr>
+          <p:nvPr/>
+        </p:nvPicPr>
+        <p:blipFill>
+          <a:blip r:embed="rId2"/>
+          <a:stretch>
+            <a:fillRect/>
+          </a:stretch>
+        </p:blipFill>
+        <p:spPr>
+          <a:xfrm>
+            <a:off x="7635552" y="0"/>
+            <a:ext cx="3817146" cy="3419621"/>
+          </a:xfrm>
+          <a:prstGeom prst="rect">
+            <a:avLst/>
+          </a:prstGeom>
+          <a:ln w="12700">
+            <a:miter lim="400000"/>
+          </a:ln>
+        </p:spPr>
+      </p:pic>
+      <p:pic>
+        <p:nvPicPr>
+          <p:cNvPr id="4" name="Рисунок 2" descr="Рисунок 2">
+            <a:extLst>
+              <a:ext uri="{FF2B5EF4-FFF2-40B4-BE49-F238E27FC236}">
+                <a16:creationId xmlns:a16="http://schemas.microsoft.com/office/drawing/2014/main" id="{6450F734-9087-4B22-943A-B0BADC84C4CA}"/>
+              </a:ext>
+            </a:extLst>
+          </p:cNvPr>
+          <p:cNvPicPr>
+            <a:picLocks noChangeAspect="1"/>
+          </p:cNvPicPr>
+          <p:nvPr/>
+        </p:nvPicPr>
+        <p:blipFill>
+          <a:blip r:embed="rId3"/>
+          <a:stretch>
+            <a:fillRect/>
+          </a:stretch>
+        </p:blipFill>
+        <p:spPr>
+          <a:xfrm>
+            <a:off x="112829" y="583800"/>
+            <a:ext cx="3817145" cy="2775505"/>
+          </a:xfrm>
+          <a:prstGeom prst="rect">
+            <a:avLst/>
+          </a:prstGeom>
+          <a:ln w="12700">
+            <a:miter lim="400000"/>
+          </a:ln>
+        </p:spPr>
+      </p:pic>
+      <p:sp>
+        <p:nvSpPr>
+          <p:cNvPr id="2" name="Заголовок 1">
+            <a:extLst>
+              <a:ext uri="{FF2B5EF4-FFF2-40B4-BE49-F238E27FC236}">
+                <a16:creationId xmlns:a16="http://schemas.microsoft.com/office/drawing/2014/main" id="{FC3C89D1-AE3E-4005-AA14-F20A55005C91}"/>
+              </a:ext>
+            </a:extLst>
+          </p:cNvPr>
+          <p:cNvSpPr>
+            <a:spLocks noGrp="1"/>
+          </p:cNvSpPr>
+          <p:nvPr>
+            <p:ph type="title"/>
+          </p:nvPr>
+        </p:nvSpPr>
+        <p:spPr>
+          <a:xfrm>
+            <a:off x="838200" y="0"/>
+            <a:ext cx="10515600" cy="710119"/>
+          </a:xfrm>
+        </p:spPr>
+        <p:txBody>
+          <a:bodyPr/>
+          <a:lstStyle/>
+          <a:p>
+            <a:r>
+              <a:rPr lang="ru-RU" dirty="0"/>
+              <a:t>Обоснование верности ДКА</a:t>
+            </a:r>
+          </a:p>
+        </p:txBody>
+      </p:sp>
+      <p:sp>
+        <p:nvSpPr>
+          <p:cNvPr id="3" name="Текст 2">
+            <a:extLst>
+              <a:ext uri="{FF2B5EF4-FFF2-40B4-BE49-F238E27FC236}">
+                <a16:creationId xmlns:a16="http://schemas.microsoft.com/office/drawing/2014/main" id="{CEAF292A-C54D-4418-8B7B-706922B1C408}"/>
+              </a:ext>
+            </a:extLst>
+          </p:cNvPr>
+          <p:cNvSpPr>
+            <a:spLocks noGrp="1"/>
+          </p:cNvSpPr>
+          <p:nvPr>
+            <p:ph type="body" idx="1"/>
+          </p:nvPr>
+        </p:nvSpPr>
+        <p:spPr>
+          <a:xfrm>
+            <a:off x="-1" y="3359305"/>
+            <a:ext cx="5907933" cy="3512066"/>
+          </a:xfrm>
+        </p:spPr>
+        <p:txBody>
+          <a:bodyPr>
+            <a:normAutofit/>
+          </a:bodyPr>
+          <a:lstStyle/>
+          <a:p>
+            <a:pPr marL="0" indent="0">
+              <a:buNone/>
+            </a:pPr>
+            <a:r>
+              <a:rPr lang="ru-RU" sz="2000" dirty="0"/>
+              <a:t>Примеры цепочек, удовлетворяющих исходному НКА:</a:t>
+            </a:r>
+          </a:p>
+          <a:p>
+            <a:r>
+              <a:rPr lang="en-US" sz="2000" dirty="0"/>
+              <a:t>ab (</a:t>
+            </a:r>
+            <a:r>
+              <a:rPr lang="ru-RU" sz="2000" dirty="0"/>
+              <a:t>кратчайшая)</a:t>
+            </a:r>
+          </a:p>
+          <a:p>
+            <a:r>
+              <a:rPr lang="en-US" sz="2000" dirty="0" err="1"/>
+              <a:t>aaab</a:t>
+            </a:r>
+            <a:endParaRPr lang="en-US" sz="2000" dirty="0"/>
+          </a:p>
+          <a:p>
+            <a:r>
+              <a:rPr lang="en-US" sz="2000" dirty="0" err="1"/>
+              <a:t>aabab</a:t>
+            </a:r>
+            <a:endParaRPr lang="en-US" sz="2000" dirty="0"/>
+          </a:p>
+          <a:p>
+            <a:r>
+              <a:rPr lang="en-US" sz="2000" dirty="0" err="1"/>
+              <a:t>aaababab</a:t>
+            </a:r>
+            <a:endParaRPr lang="en-US" sz="2000" dirty="0"/>
+          </a:p>
+          <a:p>
+            <a:pPr marL="0" indent="0">
+              <a:buNone/>
+            </a:pPr>
+            <a:r>
+              <a:rPr lang="ru-RU" sz="2000" dirty="0"/>
+              <a:t>Все цепочки, кроме первой, можно описать общим шаблоном: </a:t>
+            </a:r>
+            <a:r>
+              <a:rPr lang="en-US" sz="2000" dirty="0"/>
+              <a:t>aa…ab</a:t>
+            </a:r>
+            <a:r>
+              <a:rPr lang="ru-RU" sz="2000" dirty="0"/>
+              <a:t>, где вместо … может быть пустота или любая последовательность из символов </a:t>
+            </a:r>
+            <a:r>
+              <a:rPr lang="en-US" sz="2000" dirty="0"/>
+              <a:t>a, b.</a:t>
+            </a:r>
+            <a:endParaRPr lang="ru-RU" sz="2000" dirty="0"/>
+          </a:p>
+        </p:txBody>
+      </p:sp>
+      <p:sp>
+        <p:nvSpPr>
+          <p:cNvPr id="6" name="Текст 2">
+            <a:extLst>
+              <a:ext uri="{FF2B5EF4-FFF2-40B4-BE49-F238E27FC236}">
+                <a16:creationId xmlns:a16="http://schemas.microsoft.com/office/drawing/2014/main" id="{C1A8F85C-223C-4760-AB63-5A0C5E88272E}"/>
+              </a:ext>
+            </a:extLst>
+          </p:cNvPr>
+          <p:cNvSpPr txBox="1">
+            <a:spLocks/>
+          </p:cNvSpPr>
+          <p:nvPr/>
+        </p:nvSpPr>
+        <p:spPr>
+          <a:xfrm>
+            <a:off x="6284068" y="3419621"/>
+            <a:ext cx="5907933" cy="3512066"/>
+          </a:xfrm>
+          <a:prstGeom prst="rect">
+            <a:avLst/>
+          </a:prstGeom>
+          <a:ln w="12700">
+            <a:miter lim="400000"/>
+          </a:ln>
+          <a:extLst>
+            <a:ext uri="{C572A759-6A51-4108-AA02-DFA0A04FC94B}">
+              <ma14:wrappingTextBoxFlag xmlns="" xmlns:m="http://schemas.openxmlformats.org/officeDocument/2006/math" xmlns:a14="http://schemas.microsoft.com/office/drawing/2010/main" xmlns:ma14="http://schemas.microsoft.com/office/mac/drawingml/2011/main" val="1"/>
+            </a:ext>
+          </a:extLst>
+        </p:spPr>
+        <p:txBody>
+          <a:bodyPr lIns="45718" tIns="45718" rIns="45718" bIns="45718">
+            <a:normAutofit lnSpcReduction="10000"/>
+          </a:bodyPr>
+          <a:lstStyle>
+            <a:lvl1pPr marL="228600" marR="0" indent="-228600" algn="l" defTabSz="914400" rtl="0" latinLnBrk="0">
+              <a:lnSpc>
+                <a:spcPct val="90000"/>
+              </a:lnSpc>
+              <a:spcBef>
+                <a:spcPts val="1000"/>
+              </a:spcBef>
+              <a:spcAft>
+                <a:spcPts val="0"/>
+              </a:spcAft>
+              <a:buClrTx/>
+              <a:buSzPct val="100000"/>
+              <a:buFont typeface="Arial"/>
+              <a:buChar char="•"/>
+              <a:tabLst/>
+              <a:defRPr sz="2800" b="0" i="0" u="none" strike="noStrike" cap="none" spc="0" baseline="0">
+                <a:solidFill>
+                  <a:srgbClr val="000000"/>
+                </a:solidFill>
+                <a:uFillTx/>
+                <a:latin typeface="+mj-lt"/>
+                <a:ea typeface="+mj-ea"/>
+                <a:cs typeface="+mj-cs"/>
+                <a:sym typeface="Calibri"/>
+              </a:defRPr>
+            </a:lvl1pPr>
+            <a:lvl2pPr marL="723900" marR="0" indent="-266700" algn="l" defTabSz="914400" rtl="0" latinLnBrk="0">
+              <a:lnSpc>
+                <a:spcPct val="90000"/>
+              </a:lnSpc>
+              <a:spcBef>
+                <a:spcPts val="1000"/>
+              </a:spcBef>
+              <a:spcAft>
+                <a:spcPts val="0"/>
+              </a:spcAft>
+              <a:buClrTx/>
+              <a:buSzPct val="100000"/>
+              <a:buFont typeface="Arial"/>
+              <a:buChar char="•"/>
+              <a:tabLst/>
+              <a:defRPr sz="2800" b="0" i="0" u="none" strike="noStrike" cap="none" spc="0" baseline="0">
+                <a:solidFill>
+                  <a:srgbClr val="000000"/>
+                </a:solidFill>
+                <a:uFillTx/>
+                <a:latin typeface="+mj-lt"/>
+                <a:ea typeface="+mj-ea"/>
+                <a:cs typeface="+mj-cs"/>
+                <a:sym typeface="Calibri"/>
+              </a:defRPr>
+            </a:lvl2pPr>
+            <a:lvl3pPr marL="1234438" marR="0" indent="-320038" algn="l" defTabSz="914400" rtl="0" latinLnBrk="0">
+              <a:lnSpc>
+                <a:spcPct val="90000"/>
+              </a:lnSpc>
+              <a:spcBef>
+                <a:spcPts val="1000"/>
+              </a:spcBef>
+              <a:spcAft>
+                <a:spcPts val="0"/>
+              </a:spcAft>
+              <a:buClrTx/>
+              <a:buSzPct val="100000"/>
+              <a:buFont typeface="Arial"/>
+              <a:buChar char="•"/>
+              <a:tabLst/>
+              <a:defRPr sz="2800" b="0" i="0" u="none" strike="noStrike" cap="none" spc="0" baseline="0">
+                <a:solidFill>
+                  <a:srgbClr val="000000"/>
+                </a:solidFill>
+                <a:uFillTx/>
+                <a:latin typeface="+mj-lt"/>
+                <a:ea typeface="+mj-ea"/>
+                <a:cs typeface="+mj-cs"/>
+                <a:sym typeface="Calibri"/>
+              </a:defRPr>
+            </a:lvl3pPr>
+            <a:lvl4pPr marL="1727200" marR="0" indent="-355600" algn="l" defTabSz="914400" rtl="0" latinLnBrk="0">
+              <a:lnSpc>
+                <a:spcPct val="90000"/>
+              </a:lnSpc>
+              <a:spcBef>
+                <a:spcPts val="1000"/>
+              </a:spcBef>
+              <a:spcAft>
+                <a:spcPts val="0"/>
+              </a:spcAft>
+              <a:buClrTx/>
+              <a:buSzPct val="100000"/>
+              <a:buFont typeface="Arial"/>
+              <a:buChar char="•"/>
+              <a:tabLst/>
+              <a:defRPr sz="2800" b="0" i="0" u="none" strike="noStrike" cap="none" spc="0" baseline="0">
+                <a:solidFill>
+                  <a:srgbClr val="000000"/>
+                </a:solidFill>
+                <a:uFillTx/>
+                <a:latin typeface="+mj-lt"/>
+                <a:ea typeface="+mj-ea"/>
+                <a:cs typeface="+mj-cs"/>
+                <a:sym typeface="Calibri"/>
+              </a:defRPr>
+            </a:lvl4pPr>
+            <a:lvl5pPr marL="2184400" marR="0" indent="-355600" algn="l" defTabSz="914400" rtl="0" latinLnBrk="0">
+              <a:lnSpc>
+                <a:spcPct val="90000"/>
+              </a:lnSpc>
+              <a:spcBef>
+                <a:spcPts val="1000"/>
+              </a:spcBef>
+              <a:spcAft>
+                <a:spcPts val="0"/>
+              </a:spcAft>
+              <a:buClrTx/>
+              <a:buSzPct val="100000"/>
+              <a:buFont typeface="Arial"/>
+              <a:buChar char="•"/>
+              <a:tabLst/>
+              <a:defRPr sz="2800" b="0" i="0" u="none" strike="noStrike" cap="none" spc="0" baseline="0">
+                <a:solidFill>
+                  <a:srgbClr val="000000"/>
+                </a:solidFill>
+                <a:uFillTx/>
+                <a:latin typeface="+mj-lt"/>
+                <a:ea typeface="+mj-ea"/>
+                <a:cs typeface="+mj-cs"/>
+                <a:sym typeface="Calibri"/>
+              </a:defRPr>
+            </a:lvl5pPr>
+            <a:lvl6pPr marL="2641600" marR="0" indent="-355600" algn="l" defTabSz="914400" rtl="0" latinLnBrk="0">
+              <a:lnSpc>
+                <a:spcPct val="90000"/>
+              </a:lnSpc>
+              <a:spcBef>
+                <a:spcPts val="1000"/>
+              </a:spcBef>
+              <a:spcAft>
+                <a:spcPts val="0"/>
+              </a:spcAft>
+              <a:buClrTx/>
+              <a:buSzPct val="100000"/>
+              <a:buFont typeface="Arial"/>
+              <a:buChar char="•"/>
+              <a:tabLst/>
+              <a:defRPr sz="2800" b="0" i="0" u="none" strike="noStrike" cap="none" spc="0" baseline="0">
+                <a:solidFill>
+                  <a:srgbClr val="000000"/>
+                </a:solidFill>
+                <a:uFillTx/>
+                <a:latin typeface="+mj-lt"/>
+                <a:ea typeface="+mj-ea"/>
+                <a:cs typeface="+mj-cs"/>
+                <a:sym typeface="Calibri"/>
+              </a:defRPr>
+            </a:lvl6pPr>
+            <a:lvl7pPr marL="3098800" marR="0" indent="-355600" algn="l" defTabSz="914400" rtl="0" latinLnBrk="0">
+              <a:lnSpc>
+                <a:spcPct val="90000"/>
+              </a:lnSpc>
+              <a:spcBef>
+                <a:spcPts val="1000"/>
+              </a:spcBef>
+              <a:spcAft>
+                <a:spcPts val="0"/>
+              </a:spcAft>
+              <a:buClrTx/>
+              <a:buSzPct val="100000"/>
+              <a:buFont typeface="Arial"/>
+              <a:buChar char="•"/>
+              <a:tabLst/>
+              <a:defRPr sz="2800" b="0" i="0" u="none" strike="noStrike" cap="none" spc="0" baseline="0">
+                <a:solidFill>
+                  <a:srgbClr val="000000"/>
+                </a:solidFill>
+                <a:uFillTx/>
+                <a:latin typeface="+mj-lt"/>
+                <a:ea typeface="+mj-ea"/>
+                <a:cs typeface="+mj-cs"/>
+                <a:sym typeface="Calibri"/>
+              </a:defRPr>
+            </a:lvl7pPr>
+            <a:lvl8pPr marL="3556000" marR="0" indent="-355600" algn="l" defTabSz="914400" rtl="0" latinLnBrk="0">
+              <a:lnSpc>
+                <a:spcPct val="90000"/>
+              </a:lnSpc>
+              <a:spcBef>
+                <a:spcPts val="1000"/>
+              </a:spcBef>
+              <a:spcAft>
+                <a:spcPts val="0"/>
+              </a:spcAft>
+              <a:buClrTx/>
+              <a:buSzPct val="100000"/>
+              <a:buFont typeface="Arial"/>
+              <a:buChar char="•"/>
+              <a:tabLst/>
+              <a:defRPr sz="2800" b="0" i="0" u="none" strike="noStrike" cap="none" spc="0" baseline="0">
+                <a:solidFill>
+                  <a:srgbClr val="000000"/>
+                </a:solidFill>
+                <a:uFillTx/>
+                <a:latin typeface="+mj-lt"/>
+                <a:ea typeface="+mj-ea"/>
+                <a:cs typeface="+mj-cs"/>
+                <a:sym typeface="Calibri"/>
+              </a:defRPr>
+            </a:lvl8pPr>
+            <a:lvl9pPr marL="4013200" marR="0" indent="-355600" algn="l" defTabSz="914400" rtl="0" latinLnBrk="0">
+              <a:lnSpc>
+                <a:spcPct val="90000"/>
+              </a:lnSpc>
+              <a:spcBef>
+                <a:spcPts val="1000"/>
+              </a:spcBef>
+              <a:spcAft>
+                <a:spcPts val="0"/>
+              </a:spcAft>
+              <a:buClrTx/>
+              <a:buSzPct val="100000"/>
+              <a:buFont typeface="Arial"/>
+              <a:buChar char="•"/>
+              <a:tabLst/>
+              <a:defRPr sz="2800" b="0" i="0" u="none" strike="noStrike" cap="none" spc="0" baseline="0">
+                <a:solidFill>
+                  <a:srgbClr val="000000"/>
+                </a:solidFill>
+                <a:uFillTx/>
+                <a:latin typeface="+mj-lt"/>
+                <a:ea typeface="+mj-ea"/>
+                <a:cs typeface="+mj-cs"/>
+                <a:sym typeface="Calibri"/>
+              </a:defRPr>
+            </a:lvl9pPr>
+          </a:lstStyle>
+          <a:p>
+            <a:pPr marL="0" indent="0" hangingPunct="1">
+              <a:buFont typeface="Arial"/>
+              <a:buNone/>
+            </a:pPr>
+            <a:r>
+              <a:rPr lang="ru-RU" sz="2000" dirty="0"/>
+              <a:t>Примеры цепочек, удовлетворяющих ДКА:</a:t>
+            </a:r>
+          </a:p>
+          <a:p>
+            <a:pPr hangingPunct="1"/>
+            <a:r>
+              <a:rPr lang="en-US" sz="2000" dirty="0"/>
+              <a:t>ab (</a:t>
+            </a:r>
+            <a:r>
+              <a:rPr lang="ru-RU" sz="2000" dirty="0"/>
+              <a:t>кратчайшая)</a:t>
+            </a:r>
+          </a:p>
+          <a:p>
+            <a:pPr hangingPunct="1"/>
+            <a:r>
+              <a:rPr lang="en-US" sz="2000" dirty="0" err="1"/>
+              <a:t>aaab</a:t>
+            </a:r>
+            <a:endParaRPr lang="en-US" sz="2000" dirty="0"/>
+          </a:p>
+          <a:p>
+            <a:pPr hangingPunct="1"/>
+            <a:r>
+              <a:rPr lang="en-US" sz="2000" dirty="0" err="1"/>
+              <a:t>aaabaaab</a:t>
+            </a:r>
+            <a:endParaRPr lang="en-US" sz="2000" dirty="0"/>
+          </a:p>
+          <a:p>
+            <a:pPr hangingPunct="1"/>
+            <a:r>
+              <a:rPr lang="en-US" sz="2000" dirty="0" err="1"/>
+              <a:t>aaababbbbaaab</a:t>
+            </a:r>
+            <a:endParaRPr lang="en-US" sz="2000" dirty="0"/>
+          </a:p>
+          <a:p>
+            <a:pPr marL="0" indent="0" hangingPunct="1">
+              <a:buFont typeface="Arial"/>
+              <a:buNone/>
+            </a:pPr>
+            <a:r>
+              <a:rPr lang="ru-RU" sz="2000" dirty="0"/>
+              <a:t>Все цепочки, кроме первой, можно описать общим шаблоном: </a:t>
+            </a:r>
+            <a:r>
+              <a:rPr lang="en-US" sz="2000" dirty="0"/>
+              <a:t>aa…ab</a:t>
+            </a:r>
+            <a:r>
+              <a:rPr lang="ru-RU" sz="2000" dirty="0"/>
+              <a:t>, где вместо … может быть пустота или любая последовательность из символов </a:t>
+            </a:r>
+            <a:r>
+              <a:rPr lang="en-US" sz="2000" dirty="0"/>
+              <a:t>a, b.</a:t>
+            </a:r>
+            <a:endParaRPr lang="ru-RU" sz="2000" dirty="0"/>
+          </a:p>
+          <a:p>
+            <a:pPr marL="0" indent="0" hangingPunct="1">
+              <a:buFont typeface="Arial"/>
+              <a:buNone/>
+            </a:pPr>
+            <a:r>
+              <a:rPr lang="ru-RU" sz="2000" dirty="0"/>
+              <a:t>ДКА распознает только те же цепочки, что и исходный НКА.</a:t>
+            </a:r>
+          </a:p>
+        </p:txBody>
+      </p:sp>
+    </p:spTree>
+    <p:extLst>
+      <p:ext uri="{BB962C8B-B14F-4D97-AF65-F5344CB8AC3E}">
+        <p14:creationId xmlns:p14="http://schemas.microsoft.com/office/powerpoint/2010/main" val="1951289333"/>
+      </p:ext>
+    </p:extLst>
+  </p:cSld>
+  <p:clrMapOvr>
+    <a:masterClrMapping/>
+  </p:clrMapOvr>
+  <p:transition spd="med"/>
+</p:sld>
+</file>
+
+<file path=ppt/slides/slide22.xml><?xml version="1.0" encoding="utf-8"?>
+<p:sld xmlns:a="http://schemas.openxmlformats.org/drawingml/2006/main" xmlns:r="http://schemas.openxmlformats.org/officeDocument/2006/relationships" xmlns:p="http://schemas.openxmlformats.org/presentationml/2006/main">
+  <p:cSld>
+    <p:spTree>
+      <p:nvGrpSpPr>
+        <p:cNvPr id="1" name=""/>
+        <p:cNvGrpSpPr/>
+        <p:nvPr/>
+      </p:nvGrpSpPr>
+      <p:grpSpPr>
+        <a:xfrm>
+          <a:off x="0" y="0"/>
+          <a:ext cx="0" cy="0"/>
+          <a:chOff x="0" y="0"/>
+          <a:chExt cx="0" cy="0"/>
+        </a:xfrm>
+      </p:grpSpPr>
       <p:sp>
         <p:nvSpPr>
           <p:cNvPr id="182" name="Заголовок 1"/>
@@ -9706,7 +10298,7 @@
           </a:ln>
           <a:extLst>
             <a:ext uri="{C572A759-6A51-4108-AA02-DFA0A04FC94B}">
-              <ma14:wrappingTextBoxFlag xmlns:ma14="http://schemas.microsoft.com/office/mac/drawingml/2011/main" xmlns:a14="http://schemas.microsoft.com/office/drawing/2010/main" xmlns:m="http://schemas.openxmlformats.org/officeDocument/2006/math" xmlns="" val="1"/>
+              <ma14:wrappingTextBoxFlag xmlns="" xmlns:m="http://schemas.openxmlformats.org/officeDocument/2006/math" xmlns:a14="http://schemas.microsoft.com/office/drawing/2010/main" xmlns:ma14="http://schemas.microsoft.com/office/mac/drawingml/2011/main" val="1"/>
             </a:ext>
           </a:extLst>
         </p:spPr>
@@ -10090,7 +10682,7 @@
           </a:ln>
           <a:extLst>
             <a:ext uri="{C572A759-6A51-4108-AA02-DFA0A04FC94B}">
-              <ma14:wrappingTextBoxFlag xmlns:ma14="http://schemas.microsoft.com/office/mac/drawingml/2011/main" xmlns:a14="http://schemas.microsoft.com/office/drawing/2010/main" xmlns:m="http://schemas.openxmlformats.org/officeDocument/2006/math" xmlns="" val="1"/>
+              <ma14:wrappingTextBoxFlag xmlns="" xmlns:m="http://schemas.openxmlformats.org/officeDocument/2006/math" xmlns:a14="http://schemas.microsoft.com/office/drawing/2010/main" xmlns:ma14="http://schemas.microsoft.com/office/mac/drawingml/2011/main" val="1"/>
             </a:ext>
           </a:extLst>
         </p:spPr>
@@ -10981,9 +11573,7 @@
           <p:nvPr/>
         </p:nvPicPr>
         <p:blipFill>
-          <a:blip r:embed="rId2">
-            <a:extLst/>
-          </a:blip>
+          <a:blip r:embed="rId2"/>
           <a:stretch>
             <a:fillRect/>
           </a:stretch>
@@ -11013,6 +11603,14 @@
 <file path=ppt/slides/slide3.xml><?xml version="1.0" encoding="utf-8"?>
 <p:sld xmlns:a="http://schemas.openxmlformats.org/drawingml/2006/main" xmlns:r="http://schemas.openxmlformats.org/officeDocument/2006/relationships" xmlns:p="http://schemas.openxmlformats.org/presentationml/2006/main">
   <p:cSld>
+    <p:bg>
+      <p:bgPr>
+        <a:solidFill>
+          <a:srgbClr val="FF0000"/>
+        </a:solidFill>
+        <a:effectLst/>
+      </p:bgPr>
+    </p:bg>
     <p:spTree>
       <p:nvGrpSpPr>
         <p:cNvPr id="1" name=""/>
@@ -11080,27 +11678,85 @@
               <a:buNone/>
             </a:pPr>
             <a:r>
-              <a:t>Удовлетворяющие условию задачи:</a:t>
-            </a:r>
-          </a:p>
-          <a:p>
-            <a:r>
+              <a:rPr dirty="0" err="1"/>
+              <a:t>Удовлетворяющие</a:t>
+            </a:r>
+            <a:r>
+              <a:rPr dirty="0"/>
+              <a:t> </a:t>
+            </a:r>
+            <a:r>
+              <a:rPr dirty="0" err="1"/>
+              <a:t>условию</a:t>
+            </a:r>
+            <a:r>
+              <a:rPr dirty="0"/>
+              <a:t> </a:t>
+            </a:r>
+            <a:r>
+              <a:rPr dirty="0" err="1"/>
+              <a:t>задачи</a:t>
+            </a:r>
+            <a:r>
+              <a:rPr dirty="0"/>
+              <a:t>:</a:t>
+            </a:r>
+            <a:endParaRPr lang="en-US" dirty="0"/>
+          </a:p>
+          <a:p>
+            <a:r>
+              <a:rPr dirty="0"/>
               <a:t>111</a:t>
             </a:r>
           </a:p>
           <a:p>
             <a:r>
+              <a:rPr dirty="0"/>
               <a:t>1011, 1111</a:t>
             </a:r>
           </a:p>
           <a:p>
             <a:r>
+              <a:rPr dirty="0"/>
               <a:t>100010101011</a:t>
             </a:r>
           </a:p>
           <a:p>
             <a:r>
-              <a:t>1…11, где … - любая последовательность из 0 и 1</a:t>
+              <a:rPr dirty="0"/>
+              <a:t>1…11, </a:t>
+            </a:r>
+            <a:r>
+              <a:rPr dirty="0" err="1"/>
+              <a:t>где</a:t>
+            </a:r>
+            <a:r>
+              <a:rPr dirty="0"/>
+              <a:t> … - </a:t>
+            </a:r>
+            <a:r>
+              <a:rPr dirty="0" err="1"/>
+              <a:t>любая</a:t>
+            </a:r>
+            <a:r>
+              <a:rPr dirty="0"/>
+              <a:t> </a:t>
+            </a:r>
+            <a:r>
+              <a:rPr dirty="0" err="1"/>
+              <a:t>последовательность</a:t>
+            </a:r>
+            <a:r>
+              <a:rPr dirty="0"/>
+              <a:t> </a:t>
+            </a:r>
+            <a:r>
+              <a:rPr dirty="0" err="1"/>
+              <a:t>из</a:t>
+            </a:r>
+            <a:r>
+              <a:rPr dirty="0"/>
+              <a:t> 0 и 1</a:t>
             </a:r>
           </a:p>
         </p:txBody>
@@ -11124,7 +11780,7 @@
           </a:ln>
           <a:extLst>
             <a:ext uri="{C572A759-6A51-4108-AA02-DFA0A04FC94B}">
-              <ma14:wrappingTextBoxFlag xmlns:ma14="http://schemas.microsoft.com/office/mac/drawingml/2011/main" xmlns:a14="http://schemas.microsoft.com/office/drawing/2010/main" xmlns:m="http://schemas.openxmlformats.org/officeDocument/2006/math" xmlns="" val="1"/>
+              <ma14:wrappingTextBoxFlag xmlns="" xmlns:m="http://schemas.openxmlformats.org/officeDocument/2006/math" xmlns:a14="http://schemas.microsoft.com/office/drawing/2010/main" xmlns:ma14="http://schemas.microsoft.com/office/mac/drawingml/2011/main" val="1"/>
             </a:ext>
           </a:extLst>
         </p:spPr>
@@ -11144,7 +11800,36 @@
               <a:defRPr sz="2800"/>
             </a:pPr>
             <a:r>
-              <a:t>Не удовлетворяющие условию задачи:</a:t>
+              <a:rPr dirty="0" err="1"/>
+              <a:t>Не</a:t>
+            </a:r>
+            <a:r>
+              <a:rPr dirty="0"/>
+              <a:t> </a:t>
+            </a:r>
+            <a:r>
+              <a:rPr dirty="0" err="1"/>
+              <a:t>удовлетворяющие</a:t>
+            </a:r>
+            <a:r>
+              <a:rPr dirty="0"/>
+              <a:t> </a:t>
+            </a:r>
+            <a:r>
+              <a:rPr dirty="0" err="1"/>
+              <a:t>условию</a:t>
+            </a:r>
+            <a:r>
+              <a:rPr dirty="0"/>
+              <a:t> </a:t>
+            </a:r>
+            <a:r>
+              <a:rPr dirty="0" err="1"/>
+              <a:t>задачи</a:t>
+            </a:r>
+            <a:r>
+              <a:rPr dirty="0"/>
+              <a:t>:</a:t>
             </a:r>
           </a:p>
           <a:p>
@@ -11161,7 +11846,24 @@
               <a:defRPr sz="2800"/>
             </a:pPr>
             <a:r>
-              <a:t>011 (неверный префикс)</a:t>
+              <a:rPr dirty="0"/>
+              <a:t>011 (</a:t>
+            </a:r>
+            <a:r>
+              <a:rPr dirty="0" err="1"/>
+              <a:t>неверный</a:t>
+            </a:r>
+            <a:r>
+              <a:rPr dirty="0"/>
+              <a:t> </a:t>
+            </a:r>
+            <a:r>
+              <a:rPr dirty="0" err="1"/>
+              <a:t>префикс</a:t>
+            </a:r>
+            <a:r>
+              <a:rPr dirty="0"/>
+              <a:t>)</a:t>
             </a:r>
           </a:p>
           <a:p>
@@ -11178,8 +11880,26 @@
               <a:defRPr sz="2800"/>
             </a:pPr>
             <a:r>
-              <a:t>1010, 1110 (неверный суффикс)</a:t>
-            </a:r>
+              <a:rPr dirty="0"/>
+              <a:t>1010, 1110 (</a:t>
+            </a:r>
+            <a:r>
+              <a:rPr dirty="0" err="1"/>
+              <a:t>неверный</a:t>
+            </a:r>
+            <a:r>
+              <a:rPr dirty="0"/>
+              <a:t> </a:t>
+            </a:r>
+            <a:r>
+              <a:rPr dirty="0" err="1"/>
+              <a:t>суффикс</a:t>
+            </a:r>
+            <a:r>
+              <a:rPr dirty="0"/>
+              <a:t>)</a:t>
+            </a:r>
+            <a:endParaRPr lang="en-US" dirty="0"/>
           </a:p>
           <a:p>
             <a:pPr marL="228600" indent="-228600">
@@ -11195,20 +11915,14 @@
               <a:defRPr sz="2800"/>
             </a:pPr>
             <a:r>
-              <a:t>11 (недостаточная длина)</a:t>
-            </a:r>
-          </a:p>
-          <a:p>
-            <a:pPr>
-              <a:lnSpc>
-                <a:spcPct val="90000"/>
-              </a:lnSpc>
-              <a:spcBef>
-                <a:spcPts val="1000"/>
-              </a:spcBef>
-              <a:defRPr sz="2800"/>
-            </a:pPr>
-            <a:endParaRPr/>
+              <a:rPr lang="en-US" dirty="0"/>
+              <a:t>11 (</a:t>
+            </a:r>
+            <a:r>
+              <a:rPr lang="ru-RU" dirty="0"/>
+              <a:t>недостаточная длина)</a:t>
+            </a:r>
+            <a:endParaRPr dirty="0"/>
           </a:p>
         </p:txBody>
       </p:sp>
@@ -11581,7 +12295,7 @@
           </a:ln>
           <a:extLst>
             <a:ext uri="{C572A759-6A51-4108-AA02-DFA0A04FC94B}">
-              <ma14:wrappingTextBoxFlag xmlns:ma14="http://schemas.microsoft.com/office/mac/drawingml/2011/main" xmlns:a14="http://schemas.microsoft.com/office/drawing/2010/main" xmlns:m="http://schemas.openxmlformats.org/officeDocument/2006/math" xmlns="" val="1"/>
+              <ma14:wrappingTextBoxFlag xmlns="" xmlns:m="http://schemas.openxmlformats.org/officeDocument/2006/math" xmlns:a14="http://schemas.microsoft.com/office/drawing/2010/main" xmlns:ma14="http://schemas.microsoft.com/office/mac/drawingml/2011/main" val="1"/>
             </a:ext>
           </a:extLst>
         </p:spPr>
@@ -11662,9 +12376,7 @@
           <p:nvPr/>
         </p:nvPicPr>
         <p:blipFill>
-          <a:blip r:embed="rId2">
-            <a:extLst/>
-          </a:blip>
+          <a:blip r:embed="rId2"/>
           <a:stretch>
             <a:fillRect/>
           </a:stretch>
@@ -11691,9 +12403,7 @@
           <p:nvPr/>
         </p:nvPicPr>
         <p:blipFill>
-          <a:blip r:embed="rId3">
-            <a:extLst/>
-          </a:blip>
+          <a:blip r:embed="rId3"/>
           <a:stretch>
             <a:fillRect/>
           </a:stretch>
@@ -11720,9 +12430,7 @@
           <p:nvPr/>
         </p:nvPicPr>
         <p:blipFill>
-          <a:blip r:embed="rId4">
-            <a:extLst/>
-          </a:blip>
+          <a:blip r:embed="rId4"/>
           <a:stretch>
             <a:fillRect/>
           </a:stretch>
@@ -12003,9 +12711,7 @@
           <p:nvPr/>
         </p:nvPicPr>
         <p:blipFill>
-          <a:blip r:embed="rId2">
-            <a:extLst/>
-          </a:blip>
+          <a:blip r:embed="rId2"/>
           <a:stretch>
             <a:fillRect/>
           </a:stretch>
@@ -12155,9 +12861,7 @@
           <p:nvPr/>
         </p:nvPicPr>
         <p:blipFill>
-          <a:blip r:embed="rId2">
-            <a:extLst/>
-          </a:blip>
+          <a:blip r:embed="rId2"/>
           <a:stretch>
             <a:fillRect/>
           </a:stretch>
@@ -12241,9 +12945,7 @@
           <p:nvPr/>
         </p:nvPicPr>
         <p:blipFill>
-          <a:blip r:embed="rId2">
-            <a:extLst/>
-          </a:blip>
+          <a:blip r:embed="rId2"/>
           <a:stretch>
             <a:fillRect/>
           </a:stretch>
@@ -12280,7 +12982,7 @@
           </a:ln>
           <a:extLst>
             <a:ext uri="{C572A759-6A51-4108-AA02-DFA0A04FC94B}">
-              <ma14:wrappingTextBoxFlag xmlns:ma14="http://schemas.microsoft.com/office/mac/drawingml/2011/main" xmlns:a14="http://schemas.microsoft.com/office/drawing/2010/main" xmlns:m="http://schemas.openxmlformats.org/officeDocument/2006/math" xmlns="" val="1"/>
+              <ma14:wrappingTextBoxFlag xmlns="" xmlns:m="http://schemas.openxmlformats.org/officeDocument/2006/math" xmlns:a14="http://schemas.microsoft.com/office/drawing/2010/main" xmlns:ma14="http://schemas.microsoft.com/office/mac/drawingml/2011/main" val="1"/>
             </a:ext>
           </a:extLst>
         </p:spPr>
@@ -12537,9 +13239,7 @@
           <p:nvPr/>
         </p:nvPicPr>
         <p:blipFill>
-          <a:blip r:embed="rId3">
-            <a:extLst/>
-          </a:blip>
+          <a:blip r:embed="rId3"/>
           <a:stretch>
             <a:fillRect/>
           </a:stretch>
@@ -12566,9 +13266,7 @@
           <p:nvPr/>
         </p:nvPicPr>
         <p:blipFill>
-          <a:blip r:embed="rId4">
-            <a:extLst/>
-          </a:blip>
+          <a:blip r:embed="rId4"/>
           <a:stretch>
             <a:fillRect/>
           </a:stretch>
@@ -12605,7 +13303,7 @@
           </a:ln>
           <a:extLst>
             <a:ext uri="{C572A759-6A51-4108-AA02-DFA0A04FC94B}">
-              <ma14:wrappingTextBoxFlag xmlns:ma14="http://schemas.microsoft.com/office/mac/drawingml/2011/main" xmlns:a14="http://schemas.microsoft.com/office/drawing/2010/main" xmlns:m="http://schemas.openxmlformats.org/officeDocument/2006/math" xmlns="" val="1"/>
+              <ma14:wrappingTextBoxFlag xmlns="" xmlns:m="http://schemas.openxmlformats.org/officeDocument/2006/math" xmlns:a14="http://schemas.microsoft.com/office/drawing/2010/main" xmlns:ma14="http://schemas.microsoft.com/office/mac/drawingml/2011/main" val="1"/>
             </a:ext>
           </a:extLst>
         </p:spPr>
@@ -12862,9 +13560,7 @@
           <p:nvPr/>
         </p:nvPicPr>
         <p:blipFill>
-          <a:blip r:embed="rId4">
-            <a:extLst/>
-          </a:blip>
+          <a:blip r:embed="rId4"/>
           <a:stretch>
             <a:fillRect/>
           </a:stretch>

</xml_diff>

<commit_message>
Changed table + DFSM
</commit_message>
<xml_diff>
--- a/task4.pptx
+++ b/task4.pptx
@@ -416,6 +416,11 @@
         </p:txBody>
       </p:sp>
     </p:spTree>
+    <p:extLst>
+      <p:ext uri="{BB962C8B-B14F-4D97-AF65-F5344CB8AC3E}">
+        <p14:creationId xmlns:p14="http://schemas.microsoft.com/office/powerpoint/2010/main" val="3919379200"/>
+      </p:ext>
+    </p:extLst>
   </p:cSld>
   <p:clrMap bg1="lt1" tx1="dk1" bg2="lt2" tx2="dk2" accent1="accent1" accent2="accent2" accent3="accent3" accent4="accent4" accent5="accent5" accent6="accent6" hlink="hlink" folHlink="folHlink"/>
   <p:notesStyle>
@@ -1830,7 +1835,7 @@
           </a:ln>
           <a:extLst>
             <a:ext uri="{C572A759-6A51-4108-AA02-DFA0A04FC94B}">
-              <ma14:wrappingTextBoxFlag xmlns="" xmlns:m="http://schemas.openxmlformats.org/officeDocument/2006/math" xmlns:a14="http://schemas.microsoft.com/office/drawing/2010/main" xmlns:ma14="http://schemas.microsoft.com/office/mac/drawingml/2011/main" val="1"/>
+              <ma14:wrappingTextBoxFlag xmlns:ma14="http://schemas.microsoft.com/office/mac/drawingml/2011/main" xmlns:a14="http://schemas.microsoft.com/office/drawing/2010/main" xmlns:m="http://schemas.openxmlformats.org/officeDocument/2006/math" xmlns="" val="1"/>
             </a:ext>
           </a:extLst>
         </p:spPr>
@@ -1869,7 +1874,7 @@
           </a:ln>
           <a:extLst>
             <a:ext uri="{C572A759-6A51-4108-AA02-DFA0A04FC94B}">
-              <ma14:wrappingTextBoxFlag xmlns="" xmlns:m="http://schemas.openxmlformats.org/officeDocument/2006/math" xmlns:a14="http://schemas.microsoft.com/office/drawing/2010/main" xmlns:ma14="http://schemas.microsoft.com/office/mac/drawingml/2011/main" val="1"/>
+              <ma14:wrappingTextBoxFlag xmlns:ma14="http://schemas.microsoft.com/office/mac/drawingml/2011/main" xmlns:a14="http://schemas.microsoft.com/office/drawing/2010/main" xmlns:m="http://schemas.openxmlformats.org/officeDocument/2006/math" xmlns="" val="1"/>
             </a:ext>
           </a:extLst>
         </p:spPr>
@@ -2913,7 +2918,7 @@
           </a:ln>
           <a:extLst>
             <a:ext uri="{C572A759-6A51-4108-AA02-DFA0A04FC94B}">
-              <ma14:wrappingTextBoxFlag xmlns="" xmlns:m="http://schemas.openxmlformats.org/officeDocument/2006/math" xmlns:a14="http://schemas.microsoft.com/office/drawing/2010/main" xmlns:ma14="http://schemas.microsoft.com/office/mac/drawingml/2011/main" val="1"/>
+              <ma14:wrappingTextBoxFlag xmlns:ma14="http://schemas.microsoft.com/office/mac/drawingml/2011/main" xmlns:a14="http://schemas.microsoft.com/office/drawing/2010/main" xmlns:m="http://schemas.openxmlformats.org/officeDocument/2006/math" xmlns="" val="1"/>
             </a:ext>
           </a:extLst>
         </p:spPr>
@@ -2995,7 +3000,7 @@
           </a:ln>
           <a:extLst>
             <a:ext uri="{C572A759-6A51-4108-AA02-DFA0A04FC94B}">
-              <ma14:wrappingTextBoxFlag xmlns="" xmlns:m="http://schemas.openxmlformats.org/officeDocument/2006/math" xmlns:a14="http://schemas.microsoft.com/office/drawing/2010/main" xmlns:ma14="http://schemas.microsoft.com/office/mac/drawingml/2011/main" val="1"/>
+              <ma14:wrappingTextBoxFlag xmlns:ma14="http://schemas.microsoft.com/office/mac/drawingml/2011/main" xmlns:a14="http://schemas.microsoft.com/office/drawing/2010/main" xmlns:m="http://schemas.openxmlformats.org/officeDocument/2006/math" xmlns="" val="1"/>
             </a:ext>
           </a:extLst>
         </p:spPr>
@@ -3042,7 +3047,7 @@
           </a:ln>
           <a:extLst>
             <a:ext uri="{C572A759-6A51-4108-AA02-DFA0A04FC94B}">
-              <ma14:wrappingTextBoxFlag xmlns="" xmlns:m="http://schemas.openxmlformats.org/officeDocument/2006/math" xmlns:a14="http://schemas.microsoft.com/office/drawing/2010/main" xmlns:ma14="http://schemas.microsoft.com/office/mac/drawingml/2011/main" val="1"/>
+              <ma14:wrappingTextBoxFlag xmlns:ma14="http://schemas.microsoft.com/office/mac/drawingml/2011/main" xmlns:a14="http://schemas.microsoft.com/office/drawing/2010/main" xmlns:m="http://schemas.openxmlformats.org/officeDocument/2006/math" xmlns="" val="1"/>
             </a:ext>
           </a:extLst>
         </p:spPr>
@@ -3208,21 +3213,21 @@
                 <a:gridCol w="1152547">
                   <a:extLst>
                     <a:ext uri="{9D8B030D-6E8A-4147-A177-3AD203B41FA5}">
-                      <a16:colId xmlns:a16="http://schemas.microsoft.com/office/drawing/2014/main" val="20000"/>
+                      <a16:colId xmlns:a16="http://schemas.microsoft.com/office/drawing/2014/main" xmlns="" val="20000"/>
                     </a:ext>
                   </a:extLst>
                 </a:gridCol>
                 <a:gridCol w="1152547">
                   <a:extLst>
                     <a:ext uri="{9D8B030D-6E8A-4147-A177-3AD203B41FA5}">
-                      <a16:colId xmlns:a16="http://schemas.microsoft.com/office/drawing/2014/main" val="20001"/>
+                      <a16:colId xmlns:a16="http://schemas.microsoft.com/office/drawing/2014/main" xmlns="" val="20001"/>
                     </a:ext>
                   </a:extLst>
                 </a:gridCol>
                 <a:gridCol w="1152547">
                   <a:extLst>
                     <a:ext uri="{9D8B030D-6E8A-4147-A177-3AD203B41FA5}">
-                      <a16:colId xmlns:a16="http://schemas.microsoft.com/office/drawing/2014/main" val="20002"/>
+                      <a16:colId xmlns:a16="http://schemas.microsoft.com/office/drawing/2014/main" xmlns="" val="20002"/>
                     </a:ext>
                   </a:extLst>
                 </a:gridCol>
@@ -3278,7 +3283,7 @@
                 </a:tc>
                 <a:extLst>
                   <a:ext uri="{0D108BD9-81ED-4DB2-BD59-A6C34878D82A}">
-                    <a16:rowId xmlns:a16="http://schemas.microsoft.com/office/drawing/2014/main" val="10000"/>
+                    <a16:rowId xmlns:a16="http://schemas.microsoft.com/office/drawing/2014/main" xmlns="" val="10000"/>
                   </a:ext>
                 </a:extLst>
               </a:tr>
@@ -3333,7 +3338,7 @@
                 </a:tc>
                 <a:extLst>
                   <a:ext uri="{0D108BD9-81ED-4DB2-BD59-A6C34878D82A}">
-                    <a16:rowId xmlns:a16="http://schemas.microsoft.com/office/drawing/2014/main" val="10001"/>
+                    <a16:rowId xmlns:a16="http://schemas.microsoft.com/office/drawing/2014/main" xmlns="" val="10001"/>
                   </a:ext>
                 </a:extLst>
               </a:tr>
@@ -3388,7 +3393,7 @@
                 </a:tc>
                 <a:extLst>
                   <a:ext uri="{0D108BD9-81ED-4DB2-BD59-A6C34878D82A}">
-                    <a16:rowId xmlns:a16="http://schemas.microsoft.com/office/drawing/2014/main" val="10002"/>
+                    <a16:rowId xmlns:a16="http://schemas.microsoft.com/office/drawing/2014/main" xmlns="" val="10002"/>
                   </a:ext>
                 </a:extLst>
               </a:tr>
@@ -3443,7 +3448,7 @@
                 </a:tc>
                 <a:extLst>
                   <a:ext uri="{0D108BD9-81ED-4DB2-BD59-A6C34878D82A}">
-                    <a16:rowId xmlns:a16="http://schemas.microsoft.com/office/drawing/2014/main" val="10003"/>
+                    <a16:rowId xmlns:a16="http://schemas.microsoft.com/office/drawing/2014/main" xmlns="" val="10003"/>
                   </a:ext>
                 </a:extLst>
               </a:tr>
@@ -3498,7 +3503,7 @@
                 </a:tc>
                 <a:extLst>
                   <a:ext uri="{0D108BD9-81ED-4DB2-BD59-A6C34878D82A}">
-                    <a16:rowId xmlns:a16="http://schemas.microsoft.com/office/drawing/2014/main" val="10004"/>
+                    <a16:rowId xmlns:a16="http://schemas.microsoft.com/office/drawing/2014/main" xmlns="" val="10004"/>
                   </a:ext>
                 </a:extLst>
               </a:tr>
@@ -3525,7 +3530,7 @@
           </a:ln>
           <a:extLst>
             <a:ext uri="{C572A759-6A51-4108-AA02-DFA0A04FC94B}">
-              <ma14:wrappingTextBoxFlag xmlns="" xmlns:m="http://schemas.openxmlformats.org/officeDocument/2006/math" xmlns:a14="http://schemas.microsoft.com/office/drawing/2010/main" xmlns:ma14="http://schemas.microsoft.com/office/mac/drawingml/2011/main" val="1"/>
+              <ma14:wrappingTextBoxFlag xmlns:ma14="http://schemas.microsoft.com/office/mac/drawingml/2011/main" xmlns:a14="http://schemas.microsoft.com/office/drawing/2010/main" xmlns:m="http://schemas.openxmlformats.org/officeDocument/2006/math" xmlns="" val="1"/>
             </a:ext>
           </a:extLst>
         </p:spPr>
@@ -3684,7 +3689,7 @@
           </a:ln>
           <a:extLst>
             <a:ext uri="{C572A759-6A51-4108-AA02-DFA0A04FC94B}">
-              <ma14:wrappingTextBoxFlag xmlns="" xmlns:m="http://schemas.openxmlformats.org/officeDocument/2006/math" xmlns:a14="http://schemas.microsoft.com/office/drawing/2010/main" xmlns:ma14="http://schemas.microsoft.com/office/mac/drawingml/2011/main" val="1"/>
+              <ma14:wrappingTextBoxFlag xmlns:ma14="http://schemas.microsoft.com/office/mac/drawingml/2011/main" xmlns:a14="http://schemas.microsoft.com/office/drawing/2010/main" xmlns:m="http://schemas.openxmlformats.org/officeDocument/2006/math" xmlns="" val="1"/>
             </a:ext>
           </a:extLst>
         </p:spPr>
@@ -3950,21 +3955,21 @@
                 <a:gridCol w="839281">
                   <a:extLst>
                     <a:ext uri="{9D8B030D-6E8A-4147-A177-3AD203B41FA5}">
-                      <a16:colId xmlns:a16="http://schemas.microsoft.com/office/drawing/2014/main" val="20000"/>
+                      <a16:colId xmlns:a16="http://schemas.microsoft.com/office/drawing/2014/main" xmlns="" val="20000"/>
                     </a:ext>
                   </a:extLst>
                 </a:gridCol>
                 <a:gridCol w="839281">
                   <a:extLst>
                     <a:ext uri="{9D8B030D-6E8A-4147-A177-3AD203B41FA5}">
-                      <a16:colId xmlns:a16="http://schemas.microsoft.com/office/drawing/2014/main" val="20001"/>
+                      <a16:colId xmlns:a16="http://schemas.microsoft.com/office/drawing/2014/main" xmlns="" val="20001"/>
                     </a:ext>
                   </a:extLst>
                 </a:gridCol>
                 <a:gridCol w="839281">
                   <a:extLst>
                     <a:ext uri="{9D8B030D-6E8A-4147-A177-3AD203B41FA5}">
-                      <a16:colId xmlns:a16="http://schemas.microsoft.com/office/drawing/2014/main" val="20002"/>
+                      <a16:colId xmlns:a16="http://schemas.microsoft.com/office/drawing/2014/main" xmlns="" val="20002"/>
                     </a:ext>
                   </a:extLst>
                 </a:gridCol>
@@ -4020,7 +4025,7 @@
                 </a:tc>
                 <a:extLst>
                   <a:ext uri="{0D108BD9-81ED-4DB2-BD59-A6C34878D82A}">
-                    <a16:rowId xmlns:a16="http://schemas.microsoft.com/office/drawing/2014/main" val="10000"/>
+                    <a16:rowId xmlns:a16="http://schemas.microsoft.com/office/drawing/2014/main" xmlns="" val="10000"/>
                   </a:ext>
                 </a:extLst>
               </a:tr>
@@ -4075,7 +4080,7 @@
                 </a:tc>
                 <a:extLst>
                   <a:ext uri="{0D108BD9-81ED-4DB2-BD59-A6C34878D82A}">
-                    <a16:rowId xmlns:a16="http://schemas.microsoft.com/office/drawing/2014/main" val="10001"/>
+                    <a16:rowId xmlns:a16="http://schemas.microsoft.com/office/drawing/2014/main" xmlns="" val="10001"/>
                   </a:ext>
                 </a:extLst>
               </a:tr>
@@ -4130,7 +4135,7 @@
                 </a:tc>
                 <a:extLst>
                   <a:ext uri="{0D108BD9-81ED-4DB2-BD59-A6C34878D82A}">
-                    <a16:rowId xmlns:a16="http://schemas.microsoft.com/office/drawing/2014/main" val="10002"/>
+                    <a16:rowId xmlns:a16="http://schemas.microsoft.com/office/drawing/2014/main" xmlns="" val="10002"/>
                   </a:ext>
                 </a:extLst>
               </a:tr>
@@ -4185,7 +4190,7 @@
                 </a:tc>
                 <a:extLst>
                   <a:ext uri="{0D108BD9-81ED-4DB2-BD59-A6C34878D82A}">
-                    <a16:rowId xmlns:a16="http://schemas.microsoft.com/office/drawing/2014/main" val="10003"/>
+                    <a16:rowId xmlns:a16="http://schemas.microsoft.com/office/drawing/2014/main" xmlns="" val="10003"/>
                   </a:ext>
                 </a:extLst>
               </a:tr>
@@ -4240,7 +4245,7 @@
                 </a:tc>
                 <a:extLst>
                   <a:ext uri="{0D108BD9-81ED-4DB2-BD59-A6C34878D82A}">
-                    <a16:rowId xmlns:a16="http://schemas.microsoft.com/office/drawing/2014/main" val="10004"/>
+                    <a16:rowId xmlns:a16="http://schemas.microsoft.com/office/drawing/2014/main" xmlns="" val="10004"/>
                   </a:ext>
                 </a:extLst>
               </a:tr>
@@ -4474,21 +4479,21 @@
                 <a:gridCol w="839281">
                   <a:extLst>
                     <a:ext uri="{9D8B030D-6E8A-4147-A177-3AD203B41FA5}">
-                      <a16:colId xmlns:a16="http://schemas.microsoft.com/office/drawing/2014/main" val="20000"/>
+                      <a16:colId xmlns:a16="http://schemas.microsoft.com/office/drawing/2014/main" xmlns="" val="20000"/>
                     </a:ext>
                   </a:extLst>
                 </a:gridCol>
                 <a:gridCol w="839281">
                   <a:extLst>
                     <a:ext uri="{9D8B030D-6E8A-4147-A177-3AD203B41FA5}">
-                      <a16:colId xmlns:a16="http://schemas.microsoft.com/office/drawing/2014/main" val="20001"/>
+                      <a16:colId xmlns:a16="http://schemas.microsoft.com/office/drawing/2014/main" xmlns="" val="20001"/>
                     </a:ext>
                   </a:extLst>
                 </a:gridCol>
                 <a:gridCol w="839281">
                   <a:extLst>
                     <a:ext uri="{9D8B030D-6E8A-4147-A177-3AD203B41FA5}">
-                      <a16:colId xmlns:a16="http://schemas.microsoft.com/office/drawing/2014/main" val="20002"/>
+                      <a16:colId xmlns:a16="http://schemas.microsoft.com/office/drawing/2014/main" xmlns="" val="20002"/>
                     </a:ext>
                   </a:extLst>
                 </a:gridCol>
@@ -4544,7 +4549,7 @@
                 </a:tc>
                 <a:extLst>
                   <a:ext uri="{0D108BD9-81ED-4DB2-BD59-A6C34878D82A}">
-                    <a16:rowId xmlns:a16="http://schemas.microsoft.com/office/drawing/2014/main" val="10000"/>
+                    <a16:rowId xmlns:a16="http://schemas.microsoft.com/office/drawing/2014/main" xmlns="" val="10000"/>
                   </a:ext>
                 </a:extLst>
               </a:tr>
@@ -4599,7 +4604,7 @@
                 </a:tc>
                 <a:extLst>
                   <a:ext uri="{0D108BD9-81ED-4DB2-BD59-A6C34878D82A}">
-                    <a16:rowId xmlns:a16="http://schemas.microsoft.com/office/drawing/2014/main" val="10001"/>
+                    <a16:rowId xmlns:a16="http://schemas.microsoft.com/office/drawing/2014/main" xmlns="" val="10001"/>
                   </a:ext>
                 </a:extLst>
               </a:tr>
@@ -4715,21 +4720,21 @@
                 <a:gridCol w="839281">
                   <a:extLst>
                     <a:ext uri="{9D8B030D-6E8A-4147-A177-3AD203B41FA5}">
-                      <a16:colId xmlns:a16="http://schemas.microsoft.com/office/drawing/2014/main" val="20000"/>
+                      <a16:colId xmlns:a16="http://schemas.microsoft.com/office/drawing/2014/main" xmlns="" val="20000"/>
                     </a:ext>
                   </a:extLst>
                 </a:gridCol>
                 <a:gridCol w="839281">
                   <a:extLst>
                     <a:ext uri="{9D8B030D-6E8A-4147-A177-3AD203B41FA5}">
-                      <a16:colId xmlns:a16="http://schemas.microsoft.com/office/drawing/2014/main" val="20001"/>
+                      <a16:colId xmlns:a16="http://schemas.microsoft.com/office/drawing/2014/main" xmlns="" val="20001"/>
                     </a:ext>
                   </a:extLst>
                 </a:gridCol>
                 <a:gridCol w="839281">
                   <a:extLst>
                     <a:ext uri="{9D8B030D-6E8A-4147-A177-3AD203B41FA5}">
-                      <a16:colId xmlns:a16="http://schemas.microsoft.com/office/drawing/2014/main" val="20002"/>
+                      <a16:colId xmlns:a16="http://schemas.microsoft.com/office/drawing/2014/main" xmlns="" val="20002"/>
                     </a:ext>
                   </a:extLst>
                 </a:gridCol>
@@ -4785,7 +4790,7 @@
                 </a:tc>
                 <a:extLst>
                   <a:ext uri="{0D108BD9-81ED-4DB2-BD59-A6C34878D82A}">
-                    <a16:rowId xmlns:a16="http://schemas.microsoft.com/office/drawing/2014/main" val="10000"/>
+                    <a16:rowId xmlns:a16="http://schemas.microsoft.com/office/drawing/2014/main" xmlns="" val="10000"/>
                   </a:ext>
                 </a:extLst>
               </a:tr>
@@ -4840,7 +4845,7 @@
                 </a:tc>
                 <a:extLst>
                   <a:ext uri="{0D108BD9-81ED-4DB2-BD59-A6C34878D82A}">
-                    <a16:rowId xmlns:a16="http://schemas.microsoft.com/office/drawing/2014/main" val="10001"/>
+                    <a16:rowId xmlns:a16="http://schemas.microsoft.com/office/drawing/2014/main" xmlns="" val="10001"/>
                   </a:ext>
                 </a:extLst>
               </a:tr>
@@ -4895,7 +4900,7 @@
                 </a:tc>
                 <a:extLst>
                   <a:ext uri="{0D108BD9-81ED-4DB2-BD59-A6C34878D82A}">
-                    <a16:rowId xmlns:a16="http://schemas.microsoft.com/office/drawing/2014/main" val="10002"/>
+                    <a16:rowId xmlns:a16="http://schemas.microsoft.com/office/drawing/2014/main" xmlns="" val="10002"/>
                   </a:ext>
                 </a:extLst>
               </a:tr>
@@ -4950,7 +4955,7 @@
                 </a:tc>
                 <a:extLst>
                   <a:ext uri="{0D108BD9-81ED-4DB2-BD59-A6C34878D82A}">
-                    <a16:rowId xmlns:a16="http://schemas.microsoft.com/office/drawing/2014/main" val="10003"/>
+                    <a16:rowId xmlns:a16="http://schemas.microsoft.com/office/drawing/2014/main" xmlns="" val="10003"/>
                   </a:ext>
                 </a:extLst>
               </a:tr>
@@ -5005,7 +5010,7 @@
                 </a:tc>
                 <a:extLst>
                   <a:ext uri="{0D108BD9-81ED-4DB2-BD59-A6C34878D82A}">
-                    <a16:rowId xmlns:a16="http://schemas.microsoft.com/office/drawing/2014/main" val="10004"/>
+                    <a16:rowId xmlns:a16="http://schemas.microsoft.com/office/drawing/2014/main" xmlns="" val="10004"/>
                   </a:ext>
                 </a:extLst>
               </a:tr>
@@ -5211,21 +5216,21 @@
                 <a:gridCol w="898547">
                   <a:extLst>
                     <a:ext uri="{9D8B030D-6E8A-4147-A177-3AD203B41FA5}">
-                      <a16:colId xmlns:a16="http://schemas.microsoft.com/office/drawing/2014/main" val="20000"/>
+                      <a16:colId xmlns:a16="http://schemas.microsoft.com/office/drawing/2014/main" xmlns="" val="20000"/>
                     </a:ext>
                   </a:extLst>
                 </a:gridCol>
                 <a:gridCol w="898547">
                   <a:extLst>
                     <a:ext uri="{9D8B030D-6E8A-4147-A177-3AD203B41FA5}">
-                      <a16:colId xmlns:a16="http://schemas.microsoft.com/office/drawing/2014/main" val="20001"/>
+                      <a16:colId xmlns:a16="http://schemas.microsoft.com/office/drawing/2014/main" xmlns="" val="20001"/>
                     </a:ext>
                   </a:extLst>
                 </a:gridCol>
                 <a:gridCol w="898547">
                   <a:extLst>
                     <a:ext uri="{9D8B030D-6E8A-4147-A177-3AD203B41FA5}">
-                      <a16:colId xmlns:a16="http://schemas.microsoft.com/office/drawing/2014/main" val="20002"/>
+                      <a16:colId xmlns:a16="http://schemas.microsoft.com/office/drawing/2014/main" xmlns="" val="20002"/>
                     </a:ext>
                   </a:extLst>
                 </a:gridCol>
@@ -5281,7 +5286,7 @@
                 </a:tc>
                 <a:extLst>
                   <a:ext uri="{0D108BD9-81ED-4DB2-BD59-A6C34878D82A}">
-                    <a16:rowId xmlns:a16="http://schemas.microsoft.com/office/drawing/2014/main" val="10000"/>
+                    <a16:rowId xmlns:a16="http://schemas.microsoft.com/office/drawing/2014/main" xmlns="" val="10000"/>
                   </a:ext>
                 </a:extLst>
               </a:tr>
@@ -5336,7 +5341,7 @@
                 </a:tc>
                 <a:extLst>
                   <a:ext uri="{0D108BD9-81ED-4DB2-BD59-A6C34878D82A}">
-                    <a16:rowId xmlns:a16="http://schemas.microsoft.com/office/drawing/2014/main" val="10001"/>
+                    <a16:rowId xmlns:a16="http://schemas.microsoft.com/office/drawing/2014/main" xmlns="" val="10001"/>
                   </a:ext>
                 </a:extLst>
               </a:tr>
@@ -5391,7 +5396,7 @@
                 </a:tc>
                 <a:extLst>
                   <a:ext uri="{0D108BD9-81ED-4DB2-BD59-A6C34878D82A}">
-                    <a16:rowId xmlns:a16="http://schemas.microsoft.com/office/drawing/2014/main" val="10002"/>
+                    <a16:rowId xmlns:a16="http://schemas.microsoft.com/office/drawing/2014/main" xmlns="" val="10002"/>
                   </a:ext>
                 </a:extLst>
               </a:tr>
@@ -5507,21 +5512,21 @@
                 <a:gridCol w="839281">
                   <a:extLst>
                     <a:ext uri="{9D8B030D-6E8A-4147-A177-3AD203B41FA5}">
-                      <a16:colId xmlns:a16="http://schemas.microsoft.com/office/drawing/2014/main" val="20000"/>
+                      <a16:colId xmlns:a16="http://schemas.microsoft.com/office/drawing/2014/main" xmlns="" val="20000"/>
                     </a:ext>
                   </a:extLst>
                 </a:gridCol>
                 <a:gridCol w="839281">
                   <a:extLst>
                     <a:ext uri="{9D8B030D-6E8A-4147-A177-3AD203B41FA5}">
-                      <a16:colId xmlns:a16="http://schemas.microsoft.com/office/drawing/2014/main" val="20001"/>
+                      <a16:colId xmlns:a16="http://schemas.microsoft.com/office/drawing/2014/main" xmlns="" val="20001"/>
                     </a:ext>
                   </a:extLst>
                 </a:gridCol>
                 <a:gridCol w="839281">
                   <a:extLst>
                     <a:ext uri="{9D8B030D-6E8A-4147-A177-3AD203B41FA5}">
-                      <a16:colId xmlns:a16="http://schemas.microsoft.com/office/drawing/2014/main" val="20002"/>
+                      <a16:colId xmlns:a16="http://schemas.microsoft.com/office/drawing/2014/main" xmlns="" val="20002"/>
                     </a:ext>
                   </a:extLst>
                 </a:gridCol>
@@ -5577,7 +5582,7 @@
                 </a:tc>
                 <a:extLst>
                   <a:ext uri="{0D108BD9-81ED-4DB2-BD59-A6C34878D82A}">
-                    <a16:rowId xmlns:a16="http://schemas.microsoft.com/office/drawing/2014/main" val="10000"/>
+                    <a16:rowId xmlns:a16="http://schemas.microsoft.com/office/drawing/2014/main" xmlns="" val="10000"/>
                   </a:ext>
                 </a:extLst>
               </a:tr>
@@ -5632,7 +5637,7 @@
                 </a:tc>
                 <a:extLst>
                   <a:ext uri="{0D108BD9-81ED-4DB2-BD59-A6C34878D82A}">
-                    <a16:rowId xmlns:a16="http://schemas.microsoft.com/office/drawing/2014/main" val="10001"/>
+                    <a16:rowId xmlns:a16="http://schemas.microsoft.com/office/drawing/2014/main" xmlns="" val="10001"/>
                   </a:ext>
                 </a:extLst>
               </a:tr>
@@ -5687,7 +5692,7 @@
                 </a:tc>
                 <a:extLst>
                   <a:ext uri="{0D108BD9-81ED-4DB2-BD59-A6C34878D82A}">
-                    <a16:rowId xmlns:a16="http://schemas.microsoft.com/office/drawing/2014/main" val="10002"/>
+                    <a16:rowId xmlns:a16="http://schemas.microsoft.com/office/drawing/2014/main" xmlns="" val="10002"/>
                   </a:ext>
                 </a:extLst>
               </a:tr>
@@ -5742,7 +5747,7 @@
                 </a:tc>
                 <a:extLst>
                   <a:ext uri="{0D108BD9-81ED-4DB2-BD59-A6C34878D82A}">
-                    <a16:rowId xmlns:a16="http://schemas.microsoft.com/office/drawing/2014/main" val="10003"/>
+                    <a16:rowId xmlns:a16="http://schemas.microsoft.com/office/drawing/2014/main" xmlns="" val="10003"/>
                   </a:ext>
                 </a:extLst>
               </a:tr>
@@ -5797,7 +5802,7 @@
                 </a:tc>
                 <a:extLst>
                   <a:ext uri="{0D108BD9-81ED-4DB2-BD59-A6C34878D82A}">
-                    <a16:rowId xmlns:a16="http://schemas.microsoft.com/office/drawing/2014/main" val="10004"/>
+                    <a16:rowId xmlns:a16="http://schemas.microsoft.com/office/drawing/2014/main" xmlns="" val="10004"/>
                   </a:ext>
                 </a:extLst>
               </a:tr>
@@ -5919,21 +5924,21 @@
                 <a:gridCol w="827211">
                   <a:extLst>
                     <a:ext uri="{9D8B030D-6E8A-4147-A177-3AD203B41FA5}">
-                      <a16:colId xmlns:a16="http://schemas.microsoft.com/office/drawing/2014/main" val="20000"/>
+                      <a16:colId xmlns:a16="http://schemas.microsoft.com/office/drawing/2014/main" xmlns="" val="20000"/>
                     </a:ext>
                   </a:extLst>
                 </a:gridCol>
                 <a:gridCol w="827211">
                   <a:extLst>
                     <a:ext uri="{9D8B030D-6E8A-4147-A177-3AD203B41FA5}">
-                      <a16:colId xmlns:a16="http://schemas.microsoft.com/office/drawing/2014/main" val="20001"/>
+                      <a16:colId xmlns:a16="http://schemas.microsoft.com/office/drawing/2014/main" xmlns="" val="20001"/>
                     </a:ext>
                   </a:extLst>
                 </a:gridCol>
                 <a:gridCol w="827211">
                   <a:extLst>
                     <a:ext uri="{9D8B030D-6E8A-4147-A177-3AD203B41FA5}">
-                      <a16:colId xmlns:a16="http://schemas.microsoft.com/office/drawing/2014/main" val="20002"/>
+                      <a16:colId xmlns:a16="http://schemas.microsoft.com/office/drawing/2014/main" xmlns="" val="20002"/>
                     </a:ext>
                   </a:extLst>
                 </a:gridCol>
@@ -5989,7 +5994,7 @@
                 </a:tc>
                 <a:extLst>
                   <a:ext uri="{0D108BD9-81ED-4DB2-BD59-A6C34878D82A}">
-                    <a16:rowId xmlns:a16="http://schemas.microsoft.com/office/drawing/2014/main" val="10000"/>
+                    <a16:rowId xmlns:a16="http://schemas.microsoft.com/office/drawing/2014/main" xmlns="" val="10000"/>
                   </a:ext>
                 </a:extLst>
               </a:tr>
@@ -6044,7 +6049,7 @@
                 </a:tc>
                 <a:extLst>
                   <a:ext uri="{0D108BD9-81ED-4DB2-BD59-A6C34878D82A}">
-                    <a16:rowId xmlns:a16="http://schemas.microsoft.com/office/drawing/2014/main" val="10001"/>
+                    <a16:rowId xmlns:a16="http://schemas.microsoft.com/office/drawing/2014/main" xmlns="" val="10001"/>
                   </a:ext>
                 </a:extLst>
               </a:tr>
@@ -6099,7 +6104,7 @@
                 </a:tc>
                 <a:extLst>
                   <a:ext uri="{0D108BD9-81ED-4DB2-BD59-A6C34878D82A}">
-                    <a16:rowId xmlns:a16="http://schemas.microsoft.com/office/drawing/2014/main" val="10002"/>
+                    <a16:rowId xmlns:a16="http://schemas.microsoft.com/office/drawing/2014/main" xmlns="" val="10002"/>
                   </a:ext>
                 </a:extLst>
               </a:tr>
@@ -6154,7 +6159,7 @@
                 </a:tc>
                 <a:extLst>
                   <a:ext uri="{0D108BD9-81ED-4DB2-BD59-A6C34878D82A}">
-                    <a16:rowId xmlns:a16="http://schemas.microsoft.com/office/drawing/2014/main" val="10003"/>
+                    <a16:rowId xmlns:a16="http://schemas.microsoft.com/office/drawing/2014/main" xmlns="" val="10003"/>
                   </a:ext>
                 </a:extLst>
               </a:tr>
@@ -6270,21 +6275,21 @@
                 <a:gridCol w="839281">
                   <a:extLst>
                     <a:ext uri="{9D8B030D-6E8A-4147-A177-3AD203B41FA5}">
-                      <a16:colId xmlns:a16="http://schemas.microsoft.com/office/drawing/2014/main" val="20000"/>
+                      <a16:colId xmlns:a16="http://schemas.microsoft.com/office/drawing/2014/main" xmlns="" val="20000"/>
                     </a:ext>
                   </a:extLst>
                 </a:gridCol>
                 <a:gridCol w="839281">
                   <a:extLst>
                     <a:ext uri="{9D8B030D-6E8A-4147-A177-3AD203B41FA5}">
-                      <a16:colId xmlns:a16="http://schemas.microsoft.com/office/drawing/2014/main" val="20001"/>
+                      <a16:colId xmlns:a16="http://schemas.microsoft.com/office/drawing/2014/main" xmlns="" val="20001"/>
                     </a:ext>
                   </a:extLst>
                 </a:gridCol>
                 <a:gridCol w="839281">
                   <a:extLst>
                     <a:ext uri="{9D8B030D-6E8A-4147-A177-3AD203B41FA5}">
-                      <a16:colId xmlns:a16="http://schemas.microsoft.com/office/drawing/2014/main" val="20002"/>
+                      <a16:colId xmlns:a16="http://schemas.microsoft.com/office/drawing/2014/main" xmlns="" val="20002"/>
                     </a:ext>
                   </a:extLst>
                 </a:gridCol>
@@ -6340,7 +6345,7 @@
                 </a:tc>
                 <a:extLst>
                   <a:ext uri="{0D108BD9-81ED-4DB2-BD59-A6C34878D82A}">
-                    <a16:rowId xmlns:a16="http://schemas.microsoft.com/office/drawing/2014/main" val="10000"/>
+                    <a16:rowId xmlns:a16="http://schemas.microsoft.com/office/drawing/2014/main" xmlns="" val="10000"/>
                   </a:ext>
                 </a:extLst>
               </a:tr>
@@ -6395,7 +6400,7 @@
                 </a:tc>
                 <a:extLst>
                   <a:ext uri="{0D108BD9-81ED-4DB2-BD59-A6C34878D82A}">
-                    <a16:rowId xmlns:a16="http://schemas.microsoft.com/office/drawing/2014/main" val="10001"/>
+                    <a16:rowId xmlns:a16="http://schemas.microsoft.com/office/drawing/2014/main" xmlns="" val="10001"/>
                   </a:ext>
                 </a:extLst>
               </a:tr>
@@ -6450,7 +6455,7 @@
                 </a:tc>
                 <a:extLst>
                   <a:ext uri="{0D108BD9-81ED-4DB2-BD59-A6C34878D82A}">
-                    <a16:rowId xmlns:a16="http://schemas.microsoft.com/office/drawing/2014/main" val="10002"/>
+                    <a16:rowId xmlns:a16="http://schemas.microsoft.com/office/drawing/2014/main" xmlns="" val="10002"/>
                   </a:ext>
                 </a:extLst>
               </a:tr>
@@ -6505,7 +6510,7 @@
                 </a:tc>
                 <a:extLst>
                   <a:ext uri="{0D108BD9-81ED-4DB2-BD59-A6C34878D82A}">
-                    <a16:rowId xmlns:a16="http://schemas.microsoft.com/office/drawing/2014/main" val="10003"/>
+                    <a16:rowId xmlns:a16="http://schemas.microsoft.com/office/drawing/2014/main" xmlns="" val="10003"/>
                   </a:ext>
                 </a:extLst>
               </a:tr>
@@ -6560,7 +6565,7 @@
                 </a:tc>
                 <a:extLst>
                   <a:ext uri="{0D108BD9-81ED-4DB2-BD59-A6C34878D82A}">
-                    <a16:rowId xmlns:a16="http://schemas.microsoft.com/office/drawing/2014/main" val="10004"/>
+                    <a16:rowId xmlns:a16="http://schemas.microsoft.com/office/drawing/2014/main" xmlns="" val="10004"/>
                   </a:ext>
                 </a:extLst>
               </a:tr>
@@ -6645,21 +6650,21 @@
                 <a:gridCol w="839281">
                   <a:extLst>
                     <a:ext uri="{9D8B030D-6E8A-4147-A177-3AD203B41FA5}">
-                      <a16:colId xmlns:a16="http://schemas.microsoft.com/office/drawing/2014/main" val="20000"/>
+                      <a16:colId xmlns:a16="http://schemas.microsoft.com/office/drawing/2014/main" xmlns="" val="20000"/>
                     </a:ext>
                   </a:extLst>
                 </a:gridCol>
                 <a:gridCol w="839281">
                   <a:extLst>
                     <a:ext uri="{9D8B030D-6E8A-4147-A177-3AD203B41FA5}">
-                      <a16:colId xmlns:a16="http://schemas.microsoft.com/office/drawing/2014/main" val="20001"/>
+                      <a16:colId xmlns:a16="http://schemas.microsoft.com/office/drawing/2014/main" xmlns="" val="20001"/>
                     </a:ext>
                   </a:extLst>
                 </a:gridCol>
                 <a:gridCol w="839281">
                   <a:extLst>
                     <a:ext uri="{9D8B030D-6E8A-4147-A177-3AD203B41FA5}">
-                      <a16:colId xmlns:a16="http://schemas.microsoft.com/office/drawing/2014/main" val="20002"/>
+                      <a16:colId xmlns:a16="http://schemas.microsoft.com/office/drawing/2014/main" xmlns="" val="20002"/>
                     </a:ext>
                   </a:extLst>
                 </a:gridCol>
@@ -6715,7 +6720,7 @@
                 </a:tc>
                 <a:extLst>
                   <a:ext uri="{0D108BD9-81ED-4DB2-BD59-A6C34878D82A}">
-                    <a16:rowId xmlns:a16="http://schemas.microsoft.com/office/drawing/2014/main" val="10000"/>
+                    <a16:rowId xmlns:a16="http://schemas.microsoft.com/office/drawing/2014/main" xmlns="" val="10000"/>
                   </a:ext>
                 </a:extLst>
               </a:tr>
@@ -6770,7 +6775,7 @@
                 </a:tc>
                 <a:extLst>
                   <a:ext uri="{0D108BD9-81ED-4DB2-BD59-A6C34878D82A}">
-                    <a16:rowId xmlns:a16="http://schemas.microsoft.com/office/drawing/2014/main" val="10001"/>
+                    <a16:rowId xmlns:a16="http://schemas.microsoft.com/office/drawing/2014/main" xmlns="" val="10001"/>
                   </a:ext>
                 </a:extLst>
               </a:tr>
@@ -6825,7 +6830,7 @@
                 </a:tc>
                 <a:extLst>
                   <a:ext uri="{0D108BD9-81ED-4DB2-BD59-A6C34878D82A}">
-                    <a16:rowId xmlns:a16="http://schemas.microsoft.com/office/drawing/2014/main" val="10002"/>
+                    <a16:rowId xmlns:a16="http://schemas.microsoft.com/office/drawing/2014/main" xmlns="" val="10002"/>
                   </a:ext>
                 </a:extLst>
               </a:tr>
@@ -6880,7 +6885,7 @@
                 </a:tc>
                 <a:extLst>
                   <a:ext uri="{0D108BD9-81ED-4DB2-BD59-A6C34878D82A}">
-                    <a16:rowId xmlns:a16="http://schemas.microsoft.com/office/drawing/2014/main" val="10003"/>
+                    <a16:rowId xmlns:a16="http://schemas.microsoft.com/office/drawing/2014/main" xmlns="" val="10003"/>
                   </a:ext>
                 </a:extLst>
               </a:tr>
@@ -6935,7 +6940,7 @@
                 </a:tc>
                 <a:extLst>
                   <a:ext uri="{0D108BD9-81ED-4DB2-BD59-A6C34878D82A}">
-                    <a16:rowId xmlns:a16="http://schemas.microsoft.com/office/drawing/2014/main" val="10004"/>
+                    <a16:rowId xmlns:a16="http://schemas.microsoft.com/office/drawing/2014/main" xmlns="" val="10004"/>
                   </a:ext>
                 </a:extLst>
               </a:tr>
@@ -7051,21 +7056,21 @@
                 <a:gridCol w="839281">
                   <a:extLst>
                     <a:ext uri="{9D8B030D-6E8A-4147-A177-3AD203B41FA5}">
-                      <a16:colId xmlns:a16="http://schemas.microsoft.com/office/drawing/2014/main" val="20000"/>
+                      <a16:colId xmlns:a16="http://schemas.microsoft.com/office/drawing/2014/main" xmlns="" val="20000"/>
                     </a:ext>
                   </a:extLst>
                 </a:gridCol>
                 <a:gridCol w="839281">
                   <a:extLst>
                     <a:ext uri="{9D8B030D-6E8A-4147-A177-3AD203B41FA5}">
-                      <a16:colId xmlns:a16="http://schemas.microsoft.com/office/drawing/2014/main" val="20001"/>
+                      <a16:colId xmlns:a16="http://schemas.microsoft.com/office/drawing/2014/main" xmlns="" val="20001"/>
                     </a:ext>
                   </a:extLst>
                 </a:gridCol>
                 <a:gridCol w="839281">
                   <a:extLst>
                     <a:ext uri="{9D8B030D-6E8A-4147-A177-3AD203B41FA5}">
-                      <a16:colId xmlns:a16="http://schemas.microsoft.com/office/drawing/2014/main" val="20002"/>
+                      <a16:colId xmlns:a16="http://schemas.microsoft.com/office/drawing/2014/main" xmlns="" val="20002"/>
                     </a:ext>
                   </a:extLst>
                 </a:gridCol>
@@ -7121,7 +7126,7 @@
                 </a:tc>
                 <a:extLst>
                   <a:ext uri="{0D108BD9-81ED-4DB2-BD59-A6C34878D82A}">
-                    <a16:rowId xmlns:a16="http://schemas.microsoft.com/office/drawing/2014/main" val="10000"/>
+                    <a16:rowId xmlns:a16="http://schemas.microsoft.com/office/drawing/2014/main" xmlns="" val="10000"/>
                   </a:ext>
                 </a:extLst>
               </a:tr>
@@ -7176,7 +7181,7 @@
                 </a:tc>
                 <a:extLst>
                   <a:ext uri="{0D108BD9-81ED-4DB2-BD59-A6C34878D82A}">
-                    <a16:rowId xmlns:a16="http://schemas.microsoft.com/office/drawing/2014/main" val="10001"/>
+                    <a16:rowId xmlns:a16="http://schemas.microsoft.com/office/drawing/2014/main" xmlns="" val="10001"/>
                   </a:ext>
                 </a:extLst>
               </a:tr>
@@ -7231,7 +7236,7 @@
                 </a:tc>
                 <a:extLst>
                   <a:ext uri="{0D108BD9-81ED-4DB2-BD59-A6C34878D82A}">
-                    <a16:rowId xmlns:a16="http://schemas.microsoft.com/office/drawing/2014/main" val="10002"/>
+                    <a16:rowId xmlns:a16="http://schemas.microsoft.com/office/drawing/2014/main" xmlns="" val="10002"/>
                   </a:ext>
                 </a:extLst>
               </a:tr>
@@ -7286,7 +7291,7 @@
                 </a:tc>
                 <a:extLst>
                   <a:ext uri="{0D108BD9-81ED-4DB2-BD59-A6C34878D82A}">
-                    <a16:rowId xmlns:a16="http://schemas.microsoft.com/office/drawing/2014/main" val="10003"/>
+                    <a16:rowId xmlns:a16="http://schemas.microsoft.com/office/drawing/2014/main" xmlns="" val="10003"/>
                   </a:ext>
                 </a:extLst>
               </a:tr>
@@ -7341,7 +7346,7 @@
                 </a:tc>
                 <a:extLst>
                   <a:ext uri="{0D108BD9-81ED-4DB2-BD59-A6C34878D82A}">
-                    <a16:rowId xmlns:a16="http://schemas.microsoft.com/office/drawing/2014/main" val="10004"/>
+                    <a16:rowId xmlns:a16="http://schemas.microsoft.com/office/drawing/2014/main" xmlns="" val="10004"/>
                   </a:ext>
                 </a:extLst>
               </a:tr>
@@ -7463,21 +7468,21 @@
                 <a:gridCol w="839281">
                   <a:extLst>
                     <a:ext uri="{9D8B030D-6E8A-4147-A177-3AD203B41FA5}">
-                      <a16:colId xmlns:a16="http://schemas.microsoft.com/office/drawing/2014/main" val="20000"/>
+                      <a16:colId xmlns:a16="http://schemas.microsoft.com/office/drawing/2014/main" xmlns="" val="20000"/>
                     </a:ext>
                   </a:extLst>
                 </a:gridCol>
                 <a:gridCol w="839281">
                   <a:extLst>
                     <a:ext uri="{9D8B030D-6E8A-4147-A177-3AD203B41FA5}">
-                      <a16:colId xmlns:a16="http://schemas.microsoft.com/office/drawing/2014/main" val="20001"/>
+                      <a16:colId xmlns:a16="http://schemas.microsoft.com/office/drawing/2014/main" xmlns="" val="20001"/>
                     </a:ext>
                   </a:extLst>
                 </a:gridCol>
                 <a:gridCol w="839281">
                   <a:extLst>
                     <a:ext uri="{9D8B030D-6E8A-4147-A177-3AD203B41FA5}">
-                      <a16:colId xmlns:a16="http://schemas.microsoft.com/office/drawing/2014/main" val="20002"/>
+                      <a16:colId xmlns:a16="http://schemas.microsoft.com/office/drawing/2014/main" xmlns="" val="20002"/>
                     </a:ext>
                   </a:extLst>
                 </a:gridCol>
@@ -7533,7 +7538,7 @@
                 </a:tc>
                 <a:extLst>
                   <a:ext uri="{0D108BD9-81ED-4DB2-BD59-A6C34878D82A}">
-                    <a16:rowId xmlns:a16="http://schemas.microsoft.com/office/drawing/2014/main" val="10000"/>
+                    <a16:rowId xmlns:a16="http://schemas.microsoft.com/office/drawing/2014/main" xmlns="" val="10000"/>
                   </a:ext>
                 </a:extLst>
               </a:tr>
@@ -7588,7 +7593,7 @@
                 </a:tc>
                 <a:extLst>
                   <a:ext uri="{0D108BD9-81ED-4DB2-BD59-A6C34878D82A}">
-                    <a16:rowId xmlns:a16="http://schemas.microsoft.com/office/drawing/2014/main" val="10001"/>
+                    <a16:rowId xmlns:a16="http://schemas.microsoft.com/office/drawing/2014/main" xmlns="" val="10001"/>
                   </a:ext>
                 </a:extLst>
               </a:tr>
@@ -7643,7 +7648,7 @@
                 </a:tc>
                 <a:extLst>
                   <a:ext uri="{0D108BD9-81ED-4DB2-BD59-A6C34878D82A}">
-                    <a16:rowId xmlns:a16="http://schemas.microsoft.com/office/drawing/2014/main" val="10002"/>
+                    <a16:rowId xmlns:a16="http://schemas.microsoft.com/office/drawing/2014/main" xmlns="" val="10002"/>
                   </a:ext>
                 </a:extLst>
               </a:tr>
@@ -7698,7 +7703,7 @@
                 </a:tc>
                 <a:extLst>
                   <a:ext uri="{0D108BD9-81ED-4DB2-BD59-A6C34878D82A}">
-                    <a16:rowId xmlns:a16="http://schemas.microsoft.com/office/drawing/2014/main" val="10003"/>
+                    <a16:rowId xmlns:a16="http://schemas.microsoft.com/office/drawing/2014/main" xmlns="" val="10003"/>
                   </a:ext>
                 </a:extLst>
               </a:tr>
@@ -7753,7 +7758,7 @@
                 </a:tc>
                 <a:extLst>
                   <a:ext uri="{0D108BD9-81ED-4DB2-BD59-A6C34878D82A}">
-                    <a16:rowId xmlns:a16="http://schemas.microsoft.com/office/drawing/2014/main" val="10004"/>
+                    <a16:rowId xmlns:a16="http://schemas.microsoft.com/office/drawing/2014/main" xmlns="" val="10004"/>
                   </a:ext>
                 </a:extLst>
               </a:tr>
@@ -7808,7 +7813,7 @@
                 </a:tc>
                 <a:extLst>
                   <a:ext uri="{0D108BD9-81ED-4DB2-BD59-A6C34878D82A}">
-                    <a16:rowId xmlns:a16="http://schemas.microsoft.com/office/drawing/2014/main" val="10005"/>
+                    <a16:rowId xmlns:a16="http://schemas.microsoft.com/office/drawing/2014/main" xmlns="" val="10005"/>
                   </a:ext>
                 </a:extLst>
               </a:tr>
@@ -7924,21 +7929,21 @@
                 <a:gridCol w="839281">
                   <a:extLst>
                     <a:ext uri="{9D8B030D-6E8A-4147-A177-3AD203B41FA5}">
-                      <a16:colId xmlns:a16="http://schemas.microsoft.com/office/drawing/2014/main" val="20000"/>
+                      <a16:colId xmlns:a16="http://schemas.microsoft.com/office/drawing/2014/main" xmlns="" val="20000"/>
                     </a:ext>
                   </a:extLst>
                 </a:gridCol>
                 <a:gridCol w="839281">
                   <a:extLst>
                     <a:ext uri="{9D8B030D-6E8A-4147-A177-3AD203B41FA5}">
-                      <a16:colId xmlns:a16="http://schemas.microsoft.com/office/drawing/2014/main" val="20001"/>
+                      <a16:colId xmlns:a16="http://schemas.microsoft.com/office/drawing/2014/main" xmlns="" val="20001"/>
                     </a:ext>
                   </a:extLst>
                 </a:gridCol>
                 <a:gridCol w="839281">
                   <a:extLst>
                     <a:ext uri="{9D8B030D-6E8A-4147-A177-3AD203B41FA5}">
-                      <a16:colId xmlns:a16="http://schemas.microsoft.com/office/drawing/2014/main" val="20002"/>
+                      <a16:colId xmlns:a16="http://schemas.microsoft.com/office/drawing/2014/main" xmlns="" val="20002"/>
                     </a:ext>
                   </a:extLst>
                 </a:gridCol>
@@ -7994,7 +7999,7 @@
                 </a:tc>
                 <a:extLst>
                   <a:ext uri="{0D108BD9-81ED-4DB2-BD59-A6C34878D82A}">
-                    <a16:rowId xmlns:a16="http://schemas.microsoft.com/office/drawing/2014/main" val="10000"/>
+                    <a16:rowId xmlns:a16="http://schemas.microsoft.com/office/drawing/2014/main" xmlns="" val="10000"/>
                   </a:ext>
                 </a:extLst>
               </a:tr>
@@ -8049,7 +8054,7 @@
                 </a:tc>
                 <a:extLst>
                   <a:ext uri="{0D108BD9-81ED-4DB2-BD59-A6C34878D82A}">
-                    <a16:rowId xmlns:a16="http://schemas.microsoft.com/office/drawing/2014/main" val="10001"/>
+                    <a16:rowId xmlns:a16="http://schemas.microsoft.com/office/drawing/2014/main" xmlns="" val="10001"/>
                   </a:ext>
                 </a:extLst>
               </a:tr>
@@ -8104,7 +8109,7 @@
                 </a:tc>
                 <a:extLst>
                   <a:ext uri="{0D108BD9-81ED-4DB2-BD59-A6C34878D82A}">
-                    <a16:rowId xmlns:a16="http://schemas.microsoft.com/office/drawing/2014/main" val="10002"/>
+                    <a16:rowId xmlns:a16="http://schemas.microsoft.com/office/drawing/2014/main" xmlns="" val="10002"/>
                   </a:ext>
                 </a:extLst>
               </a:tr>
@@ -8159,7 +8164,7 @@
                 </a:tc>
                 <a:extLst>
                   <a:ext uri="{0D108BD9-81ED-4DB2-BD59-A6C34878D82A}">
-                    <a16:rowId xmlns:a16="http://schemas.microsoft.com/office/drawing/2014/main" val="10003"/>
+                    <a16:rowId xmlns:a16="http://schemas.microsoft.com/office/drawing/2014/main" xmlns="" val="10003"/>
                   </a:ext>
                 </a:extLst>
               </a:tr>
@@ -8214,7 +8219,7 @@
                 </a:tc>
                 <a:extLst>
                   <a:ext uri="{0D108BD9-81ED-4DB2-BD59-A6C34878D82A}">
-                    <a16:rowId xmlns:a16="http://schemas.microsoft.com/office/drawing/2014/main" val="10004"/>
+                    <a16:rowId xmlns:a16="http://schemas.microsoft.com/office/drawing/2014/main" xmlns="" val="10004"/>
                   </a:ext>
                 </a:extLst>
               </a:tr>
@@ -8408,21 +8413,21 @@
                 <a:gridCol w="944664">
                   <a:extLst>
                     <a:ext uri="{9D8B030D-6E8A-4147-A177-3AD203B41FA5}">
-                      <a16:colId xmlns:a16="http://schemas.microsoft.com/office/drawing/2014/main" val="20000"/>
+                      <a16:colId xmlns:a16="http://schemas.microsoft.com/office/drawing/2014/main" xmlns="" val="20000"/>
                     </a:ext>
                   </a:extLst>
                 </a:gridCol>
                 <a:gridCol w="944664">
                   <a:extLst>
                     <a:ext uri="{9D8B030D-6E8A-4147-A177-3AD203B41FA5}">
-                      <a16:colId xmlns:a16="http://schemas.microsoft.com/office/drawing/2014/main" val="20001"/>
+                      <a16:colId xmlns:a16="http://schemas.microsoft.com/office/drawing/2014/main" xmlns="" val="20001"/>
                     </a:ext>
                   </a:extLst>
                 </a:gridCol>
                 <a:gridCol w="944664">
                   <a:extLst>
                     <a:ext uri="{9D8B030D-6E8A-4147-A177-3AD203B41FA5}">
-                      <a16:colId xmlns:a16="http://schemas.microsoft.com/office/drawing/2014/main" val="20002"/>
+                      <a16:colId xmlns:a16="http://schemas.microsoft.com/office/drawing/2014/main" xmlns="" val="20002"/>
                     </a:ext>
                   </a:extLst>
                 </a:gridCol>
@@ -8478,7 +8483,7 @@
                 </a:tc>
                 <a:extLst>
                   <a:ext uri="{0D108BD9-81ED-4DB2-BD59-A6C34878D82A}">
-                    <a16:rowId xmlns:a16="http://schemas.microsoft.com/office/drawing/2014/main" val="10000"/>
+                    <a16:rowId xmlns:a16="http://schemas.microsoft.com/office/drawing/2014/main" xmlns="" val="10000"/>
                   </a:ext>
                 </a:extLst>
               </a:tr>
@@ -8533,7 +8538,7 @@
                 </a:tc>
                 <a:extLst>
                   <a:ext uri="{0D108BD9-81ED-4DB2-BD59-A6C34878D82A}">
-                    <a16:rowId xmlns:a16="http://schemas.microsoft.com/office/drawing/2014/main" val="10001"/>
+                    <a16:rowId xmlns:a16="http://schemas.microsoft.com/office/drawing/2014/main" xmlns="" val="10001"/>
                   </a:ext>
                 </a:extLst>
               </a:tr>
@@ -8588,7 +8593,7 @@
                 </a:tc>
                 <a:extLst>
                   <a:ext uri="{0D108BD9-81ED-4DB2-BD59-A6C34878D82A}">
-                    <a16:rowId xmlns:a16="http://schemas.microsoft.com/office/drawing/2014/main" val="10002"/>
+                    <a16:rowId xmlns:a16="http://schemas.microsoft.com/office/drawing/2014/main" xmlns="" val="10002"/>
                   </a:ext>
                 </a:extLst>
               </a:tr>
@@ -8643,7 +8648,7 @@
                 </a:tc>
                 <a:extLst>
                   <a:ext uri="{0D108BD9-81ED-4DB2-BD59-A6C34878D82A}">
-                    <a16:rowId xmlns:a16="http://schemas.microsoft.com/office/drawing/2014/main" val="10003"/>
+                    <a16:rowId xmlns:a16="http://schemas.microsoft.com/office/drawing/2014/main" xmlns="" val="10003"/>
                   </a:ext>
                 </a:extLst>
               </a:tr>
@@ -8698,7 +8703,7 @@
                 </a:tc>
                 <a:extLst>
                   <a:ext uri="{0D108BD9-81ED-4DB2-BD59-A6C34878D82A}">
-                    <a16:rowId xmlns:a16="http://schemas.microsoft.com/office/drawing/2014/main" val="10004"/>
+                    <a16:rowId xmlns:a16="http://schemas.microsoft.com/office/drawing/2014/main" xmlns="" val="10004"/>
                   </a:ext>
                 </a:extLst>
               </a:tr>
@@ -8753,7 +8758,7 @@
                 </a:tc>
                 <a:extLst>
                   <a:ext uri="{0D108BD9-81ED-4DB2-BD59-A6C34878D82A}">
-                    <a16:rowId xmlns:a16="http://schemas.microsoft.com/office/drawing/2014/main" val="10005"/>
+                    <a16:rowId xmlns:a16="http://schemas.microsoft.com/office/drawing/2014/main" xmlns="" val="10005"/>
                   </a:ext>
                 </a:extLst>
               </a:tr>
@@ -8808,7 +8813,7 @@
                 </a:tc>
                 <a:extLst>
                   <a:ext uri="{0D108BD9-81ED-4DB2-BD59-A6C34878D82A}">
-                    <a16:rowId xmlns:a16="http://schemas.microsoft.com/office/drawing/2014/main" val="10006"/>
+                    <a16:rowId xmlns:a16="http://schemas.microsoft.com/office/drawing/2014/main" xmlns="" val="10006"/>
                   </a:ext>
                 </a:extLst>
               </a:tr>
@@ -8952,21 +8957,21 @@
                 <a:gridCol w="944664">
                   <a:extLst>
                     <a:ext uri="{9D8B030D-6E8A-4147-A177-3AD203B41FA5}">
-                      <a16:colId xmlns:a16="http://schemas.microsoft.com/office/drawing/2014/main" val="20000"/>
+                      <a16:colId xmlns:a16="http://schemas.microsoft.com/office/drawing/2014/main" xmlns="" val="20000"/>
                     </a:ext>
                   </a:extLst>
                 </a:gridCol>
                 <a:gridCol w="944664">
                   <a:extLst>
                     <a:ext uri="{9D8B030D-6E8A-4147-A177-3AD203B41FA5}">
-                      <a16:colId xmlns:a16="http://schemas.microsoft.com/office/drawing/2014/main" val="20001"/>
+                      <a16:colId xmlns:a16="http://schemas.microsoft.com/office/drawing/2014/main" xmlns="" val="20001"/>
                     </a:ext>
                   </a:extLst>
                 </a:gridCol>
                 <a:gridCol w="944664">
                   <a:extLst>
                     <a:ext uri="{9D8B030D-6E8A-4147-A177-3AD203B41FA5}">
-                      <a16:colId xmlns:a16="http://schemas.microsoft.com/office/drawing/2014/main" val="20002"/>
+                      <a16:colId xmlns:a16="http://schemas.microsoft.com/office/drawing/2014/main" xmlns="" val="20002"/>
                     </a:ext>
                   </a:extLst>
                 </a:gridCol>
@@ -9022,7 +9027,7 @@
                 </a:tc>
                 <a:extLst>
                   <a:ext uri="{0D108BD9-81ED-4DB2-BD59-A6C34878D82A}">
-                    <a16:rowId xmlns:a16="http://schemas.microsoft.com/office/drawing/2014/main" val="10000"/>
+                    <a16:rowId xmlns:a16="http://schemas.microsoft.com/office/drawing/2014/main" xmlns="" val="10000"/>
                   </a:ext>
                 </a:extLst>
               </a:tr>
@@ -9077,7 +9082,7 @@
                 </a:tc>
                 <a:extLst>
                   <a:ext uri="{0D108BD9-81ED-4DB2-BD59-A6C34878D82A}">
-                    <a16:rowId xmlns:a16="http://schemas.microsoft.com/office/drawing/2014/main" val="10001"/>
+                    <a16:rowId xmlns:a16="http://schemas.microsoft.com/office/drawing/2014/main" xmlns="" val="10001"/>
                   </a:ext>
                 </a:extLst>
               </a:tr>
@@ -9132,7 +9137,7 @@
                 </a:tc>
                 <a:extLst>
                   <a:ext uri="{0D108BD9-81ED-4DB2-BD59-A6C34878D82A}">
-                    <a16:rowId xmlns:a16="http://schemas.microsoft.com/office/drawing/2014/main" val="10002"/>
+                    <a16:rowId xmlns:a16="http://schemas.microsoft.com/office/drawing/2014/main" xmlns="" val="10002"/>
                   </a:ext>
                 </a:extLst>
               </a:tr>
@@ -9187,7 +9192,7 @@
                 </a:tc>
                 <a:extLst>
                   <a:ext uri="{0D108BD9-81ED-4DB2-BD59-A6C34878D82A}">
-                    <a16:rowId xmlns:a16="http://schemas.microsoft.com/office/drawing/2014/main" val="10003"/>
+                    <a16:rowId xmlns:a16="http://schemas.microsoft.com/office/drawing/2014/main" xmlns="" val="10003"/>
                   </a:ext>
                 </a:extLst>
               </a:tr>
@@ -9242,7 +9247,7 @@
                 </a:tc>
                 <a:extLst>
                   <a:ext uri="{0D108BD9-81ED-4DB2-BD59-A6C34878D82A}">
-                    <a16:rowId xmlns:a16="http://schemas.microsoft.com/office/drawing/2014/main" val="10004"/>
+                    <a16:rowId xmlns:a16="http://schemas.microsoft.com/office/drawing/2014/main" xmlns="" val="10004"/>
                   </a:ext>
                 </a:extLst>
               </a:tr>
@@ -9297,7 +9302,7 @@
                 </a:tc>
                 <a:extLst>
                   <a:ext uri="{0D108BD9-81ED-4DB2-BD59-A6C34878D82A}">
-                    <a16:rowId xmlns:a16="http://schemas.microsoft.com/office/drawing/2014/main" val="10005"/>
+                    <a16:rowId xmlns:a16="http://schemas.microsoft.com/office/drawing/2014/main" xmlns="" val="10005"/>
                   </a:ext>
                 </a:extLst>
               </a:tr>
@@ -9352,7 +9357,7 @@
                 </a:tc>
                 <a:extLst>
                   <a:ext uri="{0D108BD9-81ED-4DB2-BD59-A6C34878D82A}">
-                    <a16:rowId xmlns:a16="http://schemas.microsoft.com/office/drawing/2014/main" val="10006"/>
+                    <a16:rowId xmlns:a16="http://schemas.microsoft.com/office/drawing/2014/main" xmlns="" val="10006"/>
                   </a:ext>
                 </a:extLst>
               </a:tr>
@@ -9681,7 +9686,7 @@
           <p:cNvPr id="5" name="Рисунок 8" descr="Рисунок 8">
             <a:extLst>
               <a:ext uri="{FF2B5EF4-FFF2-40B4-BE49-F238E27FC236}">
-                <a16:creationId xmlns:a16="http://schemas.microsoft.com/office/drawing/2014/main" id="{BB93CBC2-7075-4733-9EB5-B462482818D2}"/>
+                <a16:creationId xmlns:a16="http://schemas.microsoft.com/office/drawing/2014/main" xmlns="" id="{BB93CBC2-7075-4733-9EB5-B462482818D2}"/>
               </a:ext>
             </a:extLst>
           </p:cNvPr>
@@ -9714,7 +9719,7 @@
           <p:cNvPr id="4" name="Рисунок 2" descr="Рисунок 2">
             <a:extLst>
               <a:ext uri="{FF2B5EF4-FFF2-40B4-BE49-F238E27FC236}">
-                <a16:creationId xmlns:a16="http://schemas.microsoft.com/office/drawing/2014/main" id="{6450F734-9087-4B22-943A-B0BADC84C4CA}"/>
+                <a16:creationId xmlns:a16="http://schemas.microsoft.com/office/drawing/2014/main" xmlns="" id="{6450F734-9087-4B22-943A-B0BADC84C4CA}"/>
               </a:ext>
             </a:extLst>
           </p:cNvPr>
@@ -9747,7 +9752,7 @@
           <p:cNvPr id="2" name="Заголовок 1">
             <a:extLst>
               <a:ext uri="{FF2B5EF4-FFF2-40B4-BE49-F238E27FC236}">
-                <a16:creationId xmlns:a16="http://schemas.microsoft.com/office/drawing/2014/main" id="{FC3C89D1-AE3E-4005-AA14-F20A55005C91}"/>
+                <a16:creationId xmlns:a16="http://schemas.microsoft.com/office/drawing/2014/main" xmlns="" id="{FC3C89D1-AE3E-4005-AA14-F20A55005C91}"/>
               </a:ext>
             </a:extLst>
           </p:cNvPr>
@@ -9780,7 +9785,7 @@
           <p:cNvPr id="3" name="Текст 2">
             <a:extLst>
               <a:ext uri="{FF2B5EF4-FFF2-40B4-BE49-F238E27FC236}">
-                <a16:creationId xmlns:a16="http://schemas.microsoft.com/office/drawing/2014/main" id="{CEAF292A-C54D-4418-8B7B-706922B1C408}"/>
+                <a16:creationId xmlns:a16="http://schemas.microsoft.com/office/drawing/2014/main" xmlns="" id="{CEAF292A-C54D-4418-8B7B-706922B1C408}"/>
               </a:ext>
             </a:extLst>
           </p:cNvPr>
@@ -9871,7 +9876,7 @@
           <p:cNvPr id="6" name="Текст 2">
             <a:extLst>
               <a:ext uri="{FF2B5EF4-FFF2-40B4-BE49-F238E27FC236}">
-                <a16:creationId xmlns:a16="http://schemas.microsoft.com/office/drawing/2014/main" id="{C1A8F85C-223C-4760-AB63-5A0C5E88272E}"/>
+                <a16:creationId xmlns:a16="http://schemas.microsoft.com/office/drawing/2014/main" xmlns="" id="{C1A8F85C-223C-4760-AB63-5A0C5E88272E}"/>
               </a:ext>
             </a:extLst>
           </p:cNvPr>
@@ -9893,7 +9898,7 @@
           </a:ln>
           <a:extLst>
             <a:ext uri="{C572A759-6A51-4108-AA02-DFA0A04FC94B}">
-              <ma14:wrappingTextBoxFlag xmlns="" xmlns:m="http://schemas.openxmlformats.org/officeDocument/2006/math" xmlns:a14="http://schemas.microsoft.com/office/drawing/2010/main" xmlns:ma14="http://schemas.microsoft.com/office/mac/drawingml/2011/main" val="1"/>
+              <ma14:wrappingTextBoxFlag xmlns:ma14="http://schemas.microsoft.com/office/mac/drawingml/2011/main" xmlns:a14="http://schemas.microsoft.com/office/drawing/2010/main" xmlns:m="http://schemas.openxmlformats.org/officeDocument/2006/math" xmlns="" val="1"/>
             </a:ext>
           </a:extLst>
         </p:spPr>
@@ -10298,7 +10303,7 @@
           </a:ln>
           <a:extLst>
             <a:ext uri="{C572A759-6A51-4108-AA02-DFA0A04FC94B}">
-              <ma14:wrappingTextBoxFlag xmlns="" xmlns:m="http://schemas.openxmlformats.org/officeDocument/2006/math" xmlns:a14="http://schemas.microsoft.com/office/drawing/2010/main" xmlns:ma14="http://schemas.microsoft.com/office/mac/drawingml/2011/main" val="1"/>
+              <ma14:wrappingTextBoxFlag xmlns:ma14="http://schemas.microsoft.com/office/mac/drawingml/2011/main" xmlns:a14="http://schemas.microsoft.com/office/drawing/2010/main" xmlns:m="http://schemas.openxmlformats.org/officeDocument/2006/math" xmlns="" val="1"/>
             </a:ext>
           </a:extLst>
         </p:spPr>
@@ -10682,7 +10687,7 @@
           </a:ln>
           <a:extLst>
             <a:ext uri="{C572A759-6A51-4108-AA02-DFA0A04FC94B}">
-              <ma14:wrappingTextBoxFlag xmlns="" xmlns:m="http://schemas.openxmlformats.org/officeDocument/2006/math" xmlns:a14="http://schemas.microsoft.com/office/drawing/2010/main" xmlns:ma14="http://schemas.microsoft.com/office/mac/drawingml/2011/main" val="1"/>
+              <ma14:wrappingTextBoxFlag xmlns:ma14="http://schemas.microsoft.com/office/mac/drawingml/2011/main" xmlns:a14="http://schemas.microsoft.com/office/drawing/2010/main" xmlns:m="http://schemas.openxmlformats.org/officeDocument/2006/math" xmlns="" val="1"/>
             </a:ext>
           </a:extLst>
         </p:spPr>
@@ -11156,21 +11161,21 @@
                 <a:gridCol w="862607">
                   <a:extLst>
                     <a:ext uri="{9D8B030D-6E8A-4147-A177-3AD203B41FA5}">
-                      <a16:colId xmlns:a16="http://schemas.microsoft.com/office/drawing/2014/main" val="20000"/>
+                      <a16:colId xmlns:a16="http://schemas.microsoft.com/office/drawing/2014/main" xmlns="" val="20000"/>
                     </a:ext>
                   </a:extLst>
                 </a:gridCol>
                 <a:gridCol w="862607">
                   <a:extLst>
                     <a:ext uri="{9D8B030D-6E8A-4147-A177-3AD203B41FA5}">
-                      <a16:colId xmlns:a16="http://schemas.microsoft.com/office/drawing/2014/main" val="20001"/>
+                      <a16:colId xmlns:a16="http://schemas.microsoft.com/office/drawing/2014/main" xmlns="" val="20001"/>
                     </a:ext>
                   </a:extLst>
                 </a:gridCol>
                 <a:gridCol w="862607">
                   <a:extLst>
                     <a:ext uri="{9D8B030D-6E8A-4147-A177-3AD203B41FA5}">
-                      <a16:colId xmlns:a16="http://schemas.microsoft.com/office/drawing/2014/main" val="20002"/>
+                      <a16:colId xmlns:a16="http://schemas.microsoft.com/office/drawing/2014/main" xmlns="" val="20002"/>
                     </a:ext>
                   </a:extLst>
                 </a:gridCol>
@@ -11226,7 +11231,7 @@
                 </a:tc>
                 <a:extLst>
                   <a:ext uri="{0D108BD9-81ED-4DB2-BD59-A6C34878D82A}">
-                    <a16:rowId xmlns:a16="http://schemas.microsoft.com/office/drawing/2014/main" val="10000"/>
+                    <a16:rowId xmlns:a16="http://schemas.microsoft.com/office/drawing/2014/main" xmlns="" val="10000"/>
                   </a:ext>
                 </a:extLst>
               </a:tr>
@@ -11281,7 +11286,7 @@
                 </a:tc>
                 <a:extLst>
                   <a:ext uri="{0D108BD9-81ED-4DB2-BD59-A6C34878D82A}">
-                    <a16:rowId xmlns:a16="http://schemas.microsoft.com/office/drawing/2014/main" val="10001"/>
+                    <a16:rowId xmlns:a16="http://schemas.microsoft.com/office/drawing/2014/main" xmlns="" val="10001"/>
                   </a:ext>
                 </a:extLst>
               </a:tr>
@@ -11336,7 +11341,7 @@
                 </a:tc>
                 <a:extLst>
                   <a:ext uri="{0D108BD9-81ED-4DB2-BD59-A6C34878D82A}">
-                    <a16:rowId xmlns:a16="http://schemas.microsoft.com/office/drawing/2014/main" val="10002"/>
+                    <a16:rowId xmlns:a16="http://schemas.microsoft.com/office/drawing/2014/main" xmlns="" val="10002"/>
                   </a:ext>
                 </a:extLst>
               </a:tr>
@@ -11391,7 +11396,7 @@
                 </a:tc>
                 <a:extLst>
                   <a:ext uri="{0D108BD9-81ED-4DB2-BD59-A6C34878D82A}">
-                    <a16:rowId xmlns:a16="http://schemas.microsoft.com/office/drawing/2014/main" val="10003"/>
+                    <a16:rowId xmlns:a16="http://schemas.microsoft.com/office/drawing/2014/main" xmlns="" val="10003"/>
                   </a:ext>
                 </a:extLst>
               </a:tr>
@@ -11446,7 +11451,7 @@
                 </a:tc>
                 <a:extLst>
                   <a:ext uri="{0D108BD9-81ED-4DB2-BD59-A6C34878D82A}">
-                    <a16:rowId xmlns:a16="http://schemas.microsoft.com/office/drawing/2014/main" val="10004"/>
+                    <a16:rowId xmlns:a16="http://schemas.microsoft.com/office/drawing/2014/main" xmlns="" val="10004"/>
                   </a:ext>
                 </a:extLst>
               </a:tr>
@@ -11501,7 +11506,7 @@
                 </a:tc>
                 <a:extLst>
                   <a:ext uri="{0D108BD9-81ED-4DB2-BD59-A6C34878D82A}">
-                    <a16:rowId xmlns:a16="http://schemas.microsoft.com/office/drawing/2014/main" val="10005"/>
+                    <a16:rowId xmlns:a16="http://schemas.microsoft.com/office/drawing/2014/main" xmlns="" val="10005"/>
                   </a:ext>
                 </a:extLst>
               </a:tr>
@@ -11556,7 +11561,7 @@
                 </a:tc>
                 <a:extLst>
                   <a:ext uri="{0D108BD9-81ED-4DB2-BD59-A6C34878D82A}">
-                    <a16:rowId xmlns:a16="http://schemas.microsoft.com/office/drawing/2014/main" val="10006"/>
+                    <a16:rowId xmlns:a16="http://schemas.microsoft.com/office/drawing/2014/main" xmlns="" val="10006"/>
                   </a:ext>
                 </a:extLst>
               </a:tr>
@@ -11786,7 +11791,7 @@
           </a:ln>
           <a:extLst>
             <a:ext uri="{C572A759-6A51-4108-AA02-DFA0A04FC94B}">
-              <ma14:wrappingTextBoxFlag xmlns="" xmlns:m="http://schemas.openxmlformats.org/officeDocument/2006/math" xmlns:a14="http://schemas.microsoft.com/office/drawing/2010/main" xmlns:ma14="http://schemas.microsoft.com/office/mac/drawingml/2011/main" val="1"/>
+              <ma14:wrappingTextBoxFlag xmlns:ma14="http://schemas.microsoft.com/office/mac/drawingml/2011/main" xmlns:a14="http://schemas.microsoft.com/office/drawing/2010/main" xmlns:m="http://schemas.openxmlformats.org/officeDocument/2006/math" xmlns="" val="1"/>
             </a:ext>
           </a:extLst>
         </p:spPr>
@@ -12380,7 +12385,44 @@
               <a:buNone/>
             </a:pPr>
             <a:r>
-              <a:t>Построим детерминированный конечный автомат (ДКА), где:</a:t>
+              <a:rPr dirty="0" err="1"/>
+              <a:t>Построим</a:t>
+            </a:r>
+            <a:r>
+              <a:rPr dirty="0"/>
+              <a:t> </a:t>
+            </a:r>
+            <a:r>
+              <a:rPr dirty="0" err="1"/>
+              <a:t>детерминированный</a:t>
+            </a:r>
+            <a:r>
+              <a:rPr dirty="0"/>
+              <a:t> </a:t>
+            </a:r>
+            <a:r>
+              <a:rPr dirty="0" err="1"/>
+              <a:t>конечный</a:t>
+            </a:r>
+            <a:r>
+              <a:rPr dirty="0"/>
+              <a:t> </a:t>
+            </a:r>
+            <a:r>
+              <a:rPr dirty="0" err="1"/>
+              <a:t>автомат</a:t>
+            </a:r>
+            <a:r>
+              <a:rPr dirty="0"/>
+              <a:t> (ДКА), </a:t>
+            </a:r>
+            <a:r>
+              <a:rPr dirty="0" err="1"/>
+              <a:t>где</a:t>
+            </a:r>
+            <a:r>
+              <a:rPr dirty="0"/>
+              <a:t>:</a:t>
             </a:r>
           </a:p>
           <a:p>
@@ -12389,7 +12431,20 @@
               <a:buNone/>
             </a:pPr>
             <a:r>
-              <a:t>M = {Σ, Q, A, F, δ}</a:t>
+              <a:rPr dirty="0"/>
+              <a:t>M = {Σ, Q, </a:t>
+            </a:r>
+            <a:r>
+              <a:rPr lang="en-US" dirty="0" smtClean="0"/>
+              <a:t>S</a:t>
+            </a:r>
+            <a:r>
+              <a:rPr dirty="0" smtClean="0"/>
+              <a:t>, </a:t>
+            </a:r>
+            <a:r>
+              <a:rPr dirty="0"/>
+              <a:t>F, δ}</a:t>
             </a:r>
           </a:p>
           <a:p>
@@ -12398,8 +12453,22 @@
               <a:buNone/>
             </a:pPr>
             <a:r>
-              <a:t>Σ = {0, 1} – входной алфавит</a:t>
-            </a:r>
+              <a:rPr dirty="0"/>
+              <a:t>Σ = {0, 1} – </a:t>
+            </a:r>
+            <a:r>
+              <a:rPr dirty="0" err="1"/>
+              <a:t>входной</a:t>
+            </a:r>
+            <a:r>
+              <a:rPr dirty="0"/>
+              <a:t> </a:t>
+            </a:r>
+            <a:r>
+              <a:rPr dirty="0" err="1"/>
+              <a:t>алфавит</a:t>
+            </a:r>
+            <a:endParaRPr dirty="0"/>
           </a:p>
           <a:p>
             <a:pPr marL="0" indent="0">
@@ -12407,8 +12476,54 @@
               <a:buNone/>
             </a:pPr>
             <a:r>
-              <a:t>Q = {A, B, C, D} – множество состояний</a:t>
-            </a:r>
+              <a:rPr dirty="0"/>
+              <a:t>Q = </a:t>
+            </a:r>
+            <a:r>
+              <a:rPr dirty="0" smtClean="0"/>
+              <a:t>{</a:t>
+            </a:r>
+            <a:r>
+              <a:rPr lang="en-US" dirty="0" smtClean="0"/>
+              <a:t>S, </a:t>
+            </a:r>
+            <a:r>
+              <a:rPr dirty="0" smtClean="0"/>
+              <a:t>A</a:t>
+            </a:r>
+            <a:r>
+              <a:rPr dirty="0"/>
+              <a:t>, B, C, </a:t>
+            </a:r>
+            <a:r>
+              <a:rPr dirty="0" smtClean="0"/>
+              <a:t>D</a:t>
+            </a:r>
+            <a:r>
+              <a:rPr lang="en-US" dirty="0" smtClean="0"/>
+              <a:t>, E</a:t>
+            </a:r>
+            <a:r>
+              <a:rPr dirty="0" smtClean="0"/>
+              <a:t>} </a:t>
+            </a:r>
+            <a:r>
+              <a:rPr dirty="0"/>
+              <a:t>– </a:t>
+            </a:r>
+            <a:r>
+              <a:rPr dirty="0" err="1"/>
+              <a:t>множество</a:t>
+            </a:r>
+            <a:r>
+              <a:rPr dirty="0"/>
+              <a:t> </a:t>
+            </a:r>
+            <a:r>
+              <a:rPr dirty="0" err="1"/>
+              <a:t>состояний</a:t>
+            </a:r>
+            <a:endParaRPr dirty="0"/>
           </a:p>
           <a:p>
             <a:pPr marL="0" indent="0">
@@ -12416,8 +12531,30 @@
               <a:buNone/>
             </a:pPr>
             <a:r>
-              <a:t>A – начальное состояние</a:t>
-            </a:r>
+              <a:rPr lang="en-US" dirty="0" smtClean="0"/>
+              <a:t>S</a:t>
+            </a:r>
+            <a:r>
+              <a:rPr dirty="0" smtClean="0"/>
+              <a:t> </a:t>
+            </a:r>
+            <a:r>
+              <a:rPr dirty="0"/>
+              <a:t>– </a:t>
+            </a:r>
+            <a:r>
+              <a:rPr dirty="0" err="1"/>
+              <a:t>начальное</a:t>
+            </a:r>
+            <a:r>
+              <a:rPr dirty="0"/>
+              <a:t> </a:t>
+            </a:r>
+            <a:r>
+              <a:rPr dirty="0" err="1"/>
+              <a:t>состояние</a:t>
+            </a:r>
+            <a:endParaRPr dirty="0"/>
           </a:p>
           <a:p>
             <a:pPr marL="0" indent="0">
@@ -12425,8 +12562,46 @@
               <a:buNone/>
             </a:pPr>
             <a:r>
-              <a:t>F = {D} – множество финальных состояний</a:t>
-            </a:r>
+              <a:rPr dirty="0"/>
+              <a:t>F = {</a:t>
+            </a:r>
+            <a:r>
+              <a:rPr dirty="0" smtClean="0"/>
+              <a:t>D</a:t>
+            </a:r>
+            <a:r>
+              <a:rPr lang="en-US" dirty="0" smtClean="0"/>
+              <a:t>, E</a:t>
+            </a:r>
+            <a:r>
+              <a:rPr dirty="0" smtClean="0"/>
+              <a:t>} </a:t>
+            </a:r>
+            <a:r>
+              <a:rPr dirty="0"/>
+              <a:t>– </a:t>
+            </a:r>
+            <a:r>
+              <a:rPr dirty="0" err="1"/>
+              <a:t>множество</a:t>
+            </a:r>
+            <a:r>
+              <a:rPr dirty="0"/>
+              <a:t> </a:t>
+            </a:r>
+            <a:r>
+              <a:rPr dirty="0" err="1"/>
+              <a:t>финальных</a:t>
+            </a:r>
+            <a:r>
+              <a:rPr dirty="0"/>
+              <a:t> </a:t>
+            </a:r>
+            <a:r>
+              <a:rPr dirty="0" err="1"/>
+              <a:t>состояний</a:t>
+            </a:r>
+            <a:endParaRPr dirty="0"/>
           </a:p>
           <a:p>
             <a:pPr marL="0" indent="0">
@@ -12434,8 +12609,22 @@
               <a:buNone/>
             </a:pPr>
             <a:r>
-              <a:t>δ – функция переходов</a:t>
-            </a:r>
+              <a:rPr dirty="0"/>
+              <a:t>δ – </a:t>
+            </a:r>
+            <a:r>
+              <a:rPr dirty="0" err="1"/>
+              <a:t>функция</a:t>
+            </a:r>
+            <a:r>
+              <a:rPr dirty="0"/>
+              <a:t> </a:t>
+            </a:r>
+            <a:r>
+              <a:rPr dirty="0" err="1"/>
+              <a:t>переходов</a:t>
+            </a:r>
+            <a:endParaRPr dirty="0"/>
           </a:p>
         </p:txBody>
       </p:sp>
@@ -12499,7 +12688,7 @@
         <p:spPr>
           <a:xfrm>
             <a:off x="883920" y="1315528"/>
-            <a:ext cx="9893170" cy="1200329"/>
+            <a:ext cx="9893170" cy="830997"/>
           </a:xfrm>
           <a:prstGeom prst="rect">
             <a:avLst/>
@@ -12509,7 +12698,7 @@
           </a:ln>
           <a:extLst>
             <a:ext uri="{C572A759-6A51-4108-AA02-DFA0A04FC94B}">
-              <ma14:wrappingTextBoxFlag xmlns="" xmlns:m="http://schemas.openxmlformats.org/officeDocument/2006/math" xmlns:a14="http://schemas.microsoft.com/office/drawing/2010/main" xmlns:ma14="http://schemas.microsoft.com/office/mac/drawingml/2011/main" val="1"/>
+              <ma14:wrappingTextBoxFlag xmlns:ma14="http://schemas.microsoft.com/office/mac/drawingml/2011/main" xmlns:a14="http://schemas.microsoft.com/office/drawing/2010/main" xmlns:m="http://schemas.openxmlformats.org/officeDocument/2006/math" xmlns="" val="1"/>
             </a:ext>
           </a:extLst>
         </p:spPr>
@@ -12605,22 +12794,23 @@
                 <a:cs typeface="+mn-cs"/>
                 <a:sym typeface="Helvetica"/>
               </a:rPr>
-              <a:t>11 | 11</a:t>
-            </a:r>
-          </a:p>
-          <a:p>
-            <a:pPr algn="just">
-              <a:defRPr sz="2400"/>
-            </a:pPr>
-            <a:r>
-              <a:rPr b="1" dirty="0">
+              <a:t>11 | </a:t>
+            </a:r>
+            <a:r>
+              <a:rPr lang="ru-RU" b="1" dirty="0" smtClean="0">
                 <a:latin typeface="+mn-lt"/>
                 <a:ea typeface="+mn-ea"/>
                 <a:cs typeface="+mn-cs"/>
                 <a:sym typeface="Helvetica"/>
               </a:rPr>
-              <a:t>.</a:t>
-            </a:r>
+              <a:t>11</a:t>
+            </a:r>
+            <a:endParaRPr b="1" dirty="0">
+              <a:latin typeface="+mn-lt"/>
+              <a:ea typeface="+mn-ea"/>
+              <a:cs typeface="+mn-cs"/>
+              <a:sym typeface="Helvetica"/>
+            </a:endParaRPr>
           </a:p>
           <a:p>
             <a:pPr algn="just">
@@ -12635,7 +12825,7 @@
       </p:sp>
       <p:pic>
         <p:nvPicPr>
-          <p:cNvPr id="108" name="Picture 2" descr="Picture 2"/>
+          <p:cNvPr id="3" name="Рисунок 2"/>
           <p:cNvPicPr>
             <a:picLocks noChangeAspect="1"/>
           </p:cNvPicPr>
@@ -12649,20 +12839,17 @@
         </p:blipFill>
         <p:spPr>
           <a:xfrm>
-            <a:off x="4544988" y="2324892"/>
-            <a:ext cx="7097125" cy="3414716"/>
+            <a:off x="4629893" y="2146524"/>
+            <a:ext cx="7178931" cy="3017659"/>
           </a:xfrm>
           <a:prstGeom prst="rect">
             <a:avLst/>
           </a:prstGeom>
-          <a:ln w="12700">
-            <a:miter lim="400000"/>
-          </a:ln>
         </p:spPr>
       </p:pic>
       <p:pic>
         <p:nvPicPr>
-          <p:cNvPr id="109" name="Рисунок 2" descr="Рисунок 2"/>
+          <p:cNvPr id="4" name="Рисунок 3"/>
           <p:cNvPicPr>
             <a:picLocks noChangeAspect="1"/>
           </p:cNvPicPr>
@@ -12676,42 +12863,12 @@
         </p:blipFill>
         <p:spPr>
           <a:xfrm>
-            <a:off x="838200" y="2146524"/>
-            <a:ext cx="3686175" cy="4067176"/>
+            <a:off x="1269548" y="2055902"/>
+            <a:ext cx="2623183" cy="4079399"/>
           </a:xfrm>
           <a:prstGeom prst="rect">
             <a:avLst/>
           </a:prstGeom>
-          <a:ln w="12700">
-            <a:miter lim="400000"/>
-          </a:ln>
-        </p:spPr>
-      </p:pic>
-      <p:pic>
-        <p:nvPicPr>
-          <p:cNvPr id="110" name="Рисунок 3" descr="Рисунок 3"/>
-          <p:cNvPicPr>
-            <a:picLocks noChangeAspect="1"/>
-          </p:cNvPicPr>
-          <p:nvPr/>
-        </p:nvPicPr>
-        <p:blipFill>
-          <a:blip r:embed="rId4"/>
-          <a:stretch>
-            <a:fillRect/>
-          </a:stretch>
-        </p:blipFill>
-        <p:spPr>
-          <a:xfrm>
-            <a:off x="2133599" y="4601870"/>
-            <a:ext cx="1095376" cy="704851"/>
-          </a:xfrm>
-          <a:prstGeom prst="rect">
-            <a:avLst/>
-          </a:prstGeom>
-          <a:ln w="12700">
-            <a:miter lim="400000"/>
-          </a:ln>
         </p:spPr>
       </p:pic>
     </p:spTree>
@@ -12849,8 +13006,13 @@
             </a:r>
             <a:r>
               <a:rPr dirty="0"/>
-              <a:t> A</a:t>
-            </a:r>
+              <a:t> </a:t>
+            </a:r>
+            <a:r>
+              <a:rPr lang="en-US" dirty="0" smtClean="0"/>
+              <a:t>S</a:t>
+            </a:r>
+            <a:endParaRPr dirty="0"/>
           </a:p>
           <a:p>
             <a:r>
@@ -12970,7 +13132,7 @@
       </p:sp>
       <p:pic>
         <p:nvPicPr>
-          <p:cNvPr id="114" name="Picture 2" descr="Picture 2"/>
+          <p:cNvPr id="5" name="Рисунок 4"/>
           <p:cNvPicPr>
             <a:picLocks noChangeAspect="1"/>
           </p:cNvPicPr>
@@ -12984,15 +13146,12 @@
         </p:blipFill>
         <p:spPr>
           <a:xfrm>
-            <a:off x="2141707" y="3443284"/>
-            <a:ext cx="7097125" cy="3414716"/>
+            <a:off x="2260884" y="3566021"/>
+            <a:ext cx="7344672" cy="3087328"/>
           </a:xfrm>
           <a:prstGeom prst="rect">
             <a:avLst/>
           </a:prstGeom>
-          <a:ln w="12700">
-            <a:miter lim="400000"/>
-          </a:ln>
         </p:spPr>
       </p:pic>
     </p:spTree>
@@ -13074,7 +13233,9 @@
           </a:prstGeom>
         </p:spPr>
         <p:txBody>
-          <a:bodyPr/>
+          <a:bodyPr>
+            <a:normAutofit lnSpcReduction="10000"/>
+          </a:bodyPr>
           <a:lstStyle/>
           <a:p>
             <a:pPr marL="514350" indent="-514350">
@@ -13083,7 +13244,136 @@
               <a:defRPr sz="2200"/>
             </a:pPr>
             <a:r>
-              <a:t>Для гарантии наличия префикса 1 у входной строки был создан переход из состояния ‘A’ -&gt; ‘B’ по символу 1. </a:t>
+              <a:rPr dirty="0" err="1"/>
+              <a:t>Для</a:t>
+            </a:r>
+            <a:r>
+              <a:rPr dirty="0"/>
+              <a:t> </a:t>
+            </a:r>
+            <a:r>
+              <a:rPr dirty="0" err="1"/>
+              <a:t>гарантии</a:t>
+            </a:r>
+            <a:r>
+              <a:rPr dirty="0"/>
+              <a:t> </a:t>
+            </a:r>
+            <a:r>
+              <a:rPr dirty="0" err="1"/>
+              <a:t>наличия</a:t>
+            </a:r>
+            <a:r>
+              <a:rPr dirty="0"/>
+              <a:t> </a:t>
+            </a:r>
+            <a:r>
+              <a:rPr dirty="0" err="1"/>
+              <a:t>префикса</a:t>
+            </a:r>
+            <a:r>
+              <a:rPr dirty="0"/>
+              <a:t> 1 у </a:t>
+            </a:r>
+            <a:r>
+              <a:rPr dirty="0" err="1"/>
+              <a:t>входной</a:t>
+            </a:r>
+            <a:r>
+              <a:rPr dirty="0"/>
+              <a:t> </a:t>
+            </a:r>
+            <a:r>
+              <a:rPr dirty="0" err="1"/>
+              <a:t>строки</a:t>
+            </a:r>
+            <a:r>
+              <a:rPr dirty="0"/>
+              <a:t> </a:t>
+            </a:r>
+            <a:r>
+              <a:rPr dirty="0" err="1"/>
+              <a:t>был</a:t>
+            </a:r>
+            <a:r>
+              <a:rPr dirty="0"/>
+              <a:t> </a:t>
+            </a:r>
+            <a:r>
+              <a:rPr dirty="0" err="1"/>
+              <a:t>создан</a:t>
+            </a:r>
+            <a:r>
+              <a:rPr dirty="0"/>
+              <a:t> </a:t>
+            </a:r>
+            <a:r>
+              <a:rPr dirty="0" err="1"/>
+              <a:t>переход</a:t>
+            </a:r>
+            <a:r>
+              <a:rPr dirty="0"/>
+              <a:t> </a:t>
+            </a:r>
+            <a:r>
+              <a:rPr dirty="0" err="1"/>
+              <a:t>из</a:t>
+            </a:r>
+            <a:r>
+              <a:rPr dirty="0"/>
+              <a:t> </a:t>
+            </a:r>
+            <a:r>
+              <a:rPr dirty="0" err="1"/>
+              <a:t>состояния</a:t>
+            </a:r>
+            <a:r>
+              <a:rPr dirty="0"/>
+              <a:t> </a:t>
+            </a:r>
+            <a:r>
+              <a:rPr dirty="0" smtClean="0"/>
+              <a:t>‘</a:t>
+            </a:r>
+            <a:r>
+              <a:rPr lang="en-US" dirty="0" smtClean="0"/>
+              <a:t>S</a:t>
+            </a:r>
+            <a:r>
+              <a:rPr dirty="0" smtClean="0"/>
+              <a:t>’ </a:t>
+            </a:r>
+            <a:r>
+              <a:rPr dirty="0"/>
+              <a:t>-&gt; </a:t>
+            </a:r>
+            <a:r>
+              <a:rPr dirty="0" smtClean="0"/>
+              <a:t>‘</a:t>
+            </a:r>
+            <a:r>
+              <a:rPr lang="en-US" dirty="0" smtClean="0"/>
+              <a:t>A</a:t>
+            </a:r>
+            <a:r>
+              <a:rPr dirty="0" smtClean="0"/>
+              <a:t>’ </a:t>
+            </a:r>
+            <a:r>
+              <a:rPr dirty="0" err="1"/>
+              <a:t>по</a:t>
+            </a:r>
+            <a:r>
+              <a:rPr dirty="0"/>
+              <a:t> </a:t>
+            </a:r>
+            <a:r>
+              <a:rPr dirty="0" err="1"/>
+              <a:t>символу</a:t>
+            </a:r>
+            <a:r>
+              <a:rPr dirty="0"/>
+              <a:t> 1. </a:t>
             </a:r>
           </a:p>
           <a:p>
@@ -13093,7 +13383,60 @@
               <a:defRPr sz="2200"/>
             </a:pPr>
             <a:r>
-              <a:t>Автомат переходит в состояние ‘C’, когда суффикс строки равен 1. </a:t>
+              <a:rPr dirty="0" err="1"/>
+              <a:t>Автомат</a:t>
+            </a:r>
+            <a:r>
+              <a:rPr dirty="0"/>
+              <a:t> </a:t>
+            </a:r>
+            <a:r>
+              <a:rPr dirty="0" err="1"/>
+              <a:t>переходит</a:t>
+            </a:r>
+            <a:r>
+              <a:rPr dirty="0"/>
+              <a:t> в </a:t>
+            </a:r>
+            <a:r>
+              <a:rPr dirty="0" err="1"/>
+              <a:t>состояние</a:t>
+            </a:r>
+            <a:r>
+              <a:rPr dirty="0"/>
+              <a:t> ‘C’, </a:t>
+            </a:r>
+            <a:r>
+              <a:rPr dirty="0" err="1"/>
+              <a:t>когда</a:t>
+            </a:r>
+            <a:r>
+              <a:rPr dirty="0"/>
+              <a:t> </a:t>
+            </a:r>
+            <a:r>
+              <a:rPr dirty="0" err="1"/>
+              <a:t>суффикс</a:t>
+            </a:r>
+            <a:r>
+              <a:rPr dirty="0"/>
+              <a:t> </a:t>
+            </a:r>
+            <a:r>
+              <a:rPr dirty="0" err="1"/>
+              <a:t>строки</a:t>
+            </a:r>
+            <a:r>
+              <a:rPr dirty="0"/>
+              <a:t> </a:t>
+            </a:r>
+            <a:r>
+              <a:rPr dirty="0" err="1"/>
+              <a:t>равен</a:t>
+            </a:r>
+            <a:r>
+              <a:rPr dirty="0"/>
+              <a:t> 1. </a:t>
             </a:r>
           </a:p>
           <a:p>
@@ -13103,7 +13446,140 @@
               <a:defRPr sz="2200"/>
             </a:pPr>
             <a:r>
-              <a:t>Для гарантии наличия суффикса 11 у входной строки был создан переход из состояния ‘C’ -&gt; ‘D’ по символу 1, а также переход ‘D’ -&gt; ‘D’ по символу 1.</a:t>
+              <a:rPr dirty="0" err="1"/>
+              <a:t>Для</a:t>
+            </a:r>
+            <a:r>
+              <a:rPr dirty="0"/>
+              <a:t> </a:t>
+            </a:r>
+            <a:r>
+              <a:rPr dirty="0" err="1"/>
+              <a:t>гарантии</a:t>
+            </a:r>
+            <a:r>
+              <a:rPr dirty="0"/>
+              <a:t> </a:t>
+            </a:r>
+            <a:r>
+              <a:rPr dirty="0" err="1"/>
+              <a:t>наличия</a:t>
+            </a:r>
+            <a:r>
+              <a:rPr dirty="0"/>
+              <a:t> </a:t>
+            </a:r>
+            <a:r>
+              <a:rPr dirty="0" err="1"/>
+              <a:t>суффикса</a:t>
+            </a:r>
+            <a:r>
+              <a:rPr dirty="0"/>
+              <a:t> 11 у </a:t>
+            </a:r>
+            <a:r>
+              <a:rPr dirty="0" err="1"/>
+              <a:t>входной</a:t>
+            </a:r>
+            <a:r>
+              <a:rPr dirty="0"/>
+              <a:t> </a:t>
+            </a:r>
+            <a:r>
+              <a:rPr dirty="0" err="1"/>
+              <a:t>строки</a:t>
+            </a:r>
+            <a:r>
+              <a:rPr dirty="0"/>
+              <a:t> </a:t>
+            </a:r>
+            <a:r>
+              <a:rPr dirty="0" err="1"/>
+              <a:t>был</a:t>
+            </a:r>
+            <a:r>
+              <a:rPr dirty="0"/>
+              <a:t> </a:t>
+            </a:r>
+            <a:r>
+              <a:rPr dirty="0" err="1"/>
+              <a:t>создан</a:t>
+            </a:r>
+            <a:r>
+              <a:rPr dirty="0"/>
+              <a:t> </a:t>
+            </a:r>
+            <a:r>
+              <a:rPr dirty="0" err="1"/>
+              <a:t>переход</a:t>
+            </a:r>
+            <a:r>
+              <a:rPr dirty="0"/>
+              <a:t> </a:t>
+            </a:r>
+            <a:r>
+              <a:rPr dirty="0" err="1"/>
+              <a:t>из</a:t>
+            </a:r>
+            <a:r>
+              <a:rPr dirty="0"/>
+              <a:t> </a:t>
+            </a:r>
+            <a:r>
+              <a:rPr dirty="0" err="1"/>
+              <a:t>состояния</a:t>
+            </a:r>
+            <a:r>
+              <a:rPr dirty="0"/>
+              <a:t> ‘C’ -&gt; ‘D’ </a:t>
+            </a:r>
+            <a:r>
+              <a:rPr dirty="0" err="1"/>
+              <a:t>по</a:t>
+            </a:r>
+            <a:r>
+              <a:rPr dirty="0"/>
+              <a:t> </a:t>
+            </a:r>
+            <a:r>
+              <a:rPr dirty="0" err="1"/>
+              <a:t>символу</a:t>
+            </a:r>
+            <a:r>
+              <a:rPr dirty="0"/>
+              <a:t> 1, а </a:t>
+            </a:r>
+            <a:r>
+              <a:rPr dirty="0" err="1"/>
+              <a:t>также</a:t>
+            </a:r>
+            <a:r>
+              <a:rPr dirty="0"/>
+              <a:t> </a:t>
+            </a:r>
+            <a:r>
+              <a:rPr dirty="0" err="1"/>
+              <a:t>переход</a:t>
+            </a:r>
+            <a:r>
+              <a:rPr dirty="0"/>
+              <a:t> ‘D’ -&gt; ‘D’ </a:t>
+            </a:r>
+            <a:r>
+              <a:rPr dirty="0" err="1"/>
+              <a:t>по</a:t>
+            </a:r>
+            <a:r>
+              <a:rPr dirty="0"/>
+              <a:t> </a:t>
+            </a:r>
+            <a:r>
+              <a:rPr dirty="0" err="1"/>
+              <a:t>символу</a:t>
+            </a:r>
+            <a:r>
+              <a:rPr dirty="0"/>
+              <a:t> 1.</a:t>
             </a:r>
           </a:p>
           <a:p>
@@ -13113,14 +13589,120 @@
               <a:defRPr sz="2200"/>
             </a:pPr>
             <a:r>
-              <a:t>Автомат находится в состоянии ‘B’ для всех символов строки между префиксом 1 и суффиксом 11. </a:t>
-            </a:r>
+              <a:rPr dirty="0" err="1"/>
+              <a:t>Автомат</a:t>
+            </a:r>
+            <a:r>
+              <a:rPr dirty="0"/>
+              <a:t> </a:t>
+            </a:r>
+            <a:r>
+              <a:rPr dirty="0" err="1"/>
+              <a:t>находится</a:t>
+            </a:r>
+            <a:r>
+              <a:rPr dirty="0"/>
+              <a:t> в </a:t>
+            </a:r>
+            <a:r>
+              <a:rPr dirty="0" err="1"/>
+              <a:t>состоянии</a:t>
+            </a:r>
+            <a:r>
+              <a:rPr dirty="0"/>
+              <a:t> ‘B’ </a:t>
+            </a:r>
+            <a:r>
+              <a:rPr dirty="0" err="1"/>
+              <a:t>для</a:t>
+            </a:r>
+            <a:r>
+              <a:rPr dirty="0"/>
+              <a:t> </a:t>
+            </a:r>
+            <a:r>
+              <a:rPr dirty="0" err="1"/>
+              <a:t>всех</a:t>
+            </a:r>
+            <a:r>
+              <a:rPr dirty="0"/>
+              <a:t> </a:t>
+            </a:r>
+            <a:r>
+              <a:rPr dirty="0" err="1"/>
+              <a:t>символов</a:t>
+            </a:r>
+            <a:r>
+              <a:rPr dirty="0"/>
+              <a:t> </a:t>
+            </a:r>
+            <a:r>
+              <a:rPr dirty="0" err="1"/>
+              <a:t>строки</a:t>
+            </a:r>
+            <a:r>
+              <a:rPr dirty="0"/>
+              <a:t> </a:t>
+            </a:r>
+            <a:r>
+              <a:rPr dirty="0" err="1"/>
+              <a:t>между</a:t>
+            </a:r>
+            <a:r>
+              <a:rPr dirty="0"/>
+              <a:t> </a:t>
+            </a:r>
+            <a:r>
+              <a:rPr dirty="0" err="1"/>
+              <a:t>префиксом</a:t>
+            </a:r>
+            <a:r>
+              <a:rPr dirty="0"/>
+              <a:t> 1 и </a:t>
+            </a:r>
+            <a:r>
+              <a:rPr dirty="0" err="1"/>
+              <a:t>суффиксом</a:t>
+            </a:r>
+            <a:r>
+              <a:rPr dirty="0"/>
+              <a:t> 11. </a:t>
+            </a:r>
+            <a:endParaRPr lang="en-US" dirty="0" smtClean="0"/>
+          </a:p>
+          <a:p>
+            <a:pPr marL="514350" indent="-514350">
+              <a:buFontTx/>
+              <a:buAutoNum type="arabicParenR"/>
+              <a:defRPr sz="2200"/>
+            </a:pPr>
+            <a:r>
+              <a:rPr lang="ru-RU" dirty="0" smtClean="0"/>
+              <a:t>Состояние </a:t>
+            </a:r>
+            <a:r>
+              <a:rPr lang="en-US" dirty="0" smtClean="0"/>
+              <a:t>‘E’ </a:t>
+            </a:r>
+            <a:r>
+              <a:rPr lang="ru-RU" dirty="0" smtClean="0"/>
+              <a:t>обрабатывает строку 11</a:t>
+            </a:r>
+            <a:r>
+              <a:rPr lang="en-US" dirty="0" smtClean="0"/>
+              <a:t>, </a:t>
+            </a:r>
+            <a:r>
+              <a:rPr lang="ru-RU" dirty="0" smtClean="0"/>
+              <a:t>где префикс является частью суффикса</a:t>
+            </a:r>
+            <a:endParaRPr dirty="0"/>
           </a:p>
         </p:txBody>
       </p:sp>
       <p:pic>
         <p:nvPicPr>
-          <p:cNvPr id="118" name="Picture 2" descr="Picture 2"/>
+          <p:cNvPr id="5" name="Рисунок 4"/>
           <p:cNvPicPr>
             <a:picLocks noChangeAspect="1"/>
           </p:cNvPicPr>
@@ -13134,15 +13716,12 @@
         </p:blipFill>
         <p:spPr>
           <a:xfrm>
-            <a:off x="2679969" y="3570816"/>
-            <a:ext cx="6832061" cy="3287184"/>
+            <a:off x="2024286" y="3513770"/>
+            <a:ext cx="7572561" cy="3183121"/>
           </a:xfrm>
           <a:prstGeom prst="rect">
             <a:avLst/>
           </a:prstGeom>
-          <a:ln w="12700">
-            <a:miter lim="400000"/>
-          </a:ln>
         </p:spPr>
       </p:pic>
     </p:spTree>
@@ -13202,33 +13781,6 @@
           </a:p>
         </p:txBody>
       </p:sp>
-      <p:pic>
-        <p:nvPicPr>
-          <p:cNvPr id="121" name="Рисунок 9" descr="Рисунок 9"/>
-          <p:cNvPicPr>
-            <a:picLocks noChangeAspect="1"/>
-          </p:cNvPicPr>
-          <p:nvPr/>
-        </p:nvPicPr>
-        <p:blipFill>
-          <a:blip r:embed="rId2"/>
-          <a:stretch>
-            <a:fillRect/>
-          </a:stretch>
-        </p:blipFill>
-        <p:spPr>
-          <a:xfrm>
-            <a:off x="77208" y="552610"/>
-            <a:ext cx="5658412" cy="2450433"/>
-          </a:xfrm>
-          <a:prstGeom prst="rect">
-            <a:avLst/>
-          </a:prstGeom>
-          <a:ln w="12700">
-            <a:miter lim="400000"/>
-          </a:ln>
-        </p:spPr>
-      </p:pic>
       <p:sp>
         <p:nvSpPr>
           <p:cNvPr id="122" name="TextBox 10"/>
@@ -13248,7 +13800,7 @@
           </a:ln>
           <a:extLst>
             <a:ext uri="{C572A759-6A51-4108-AA02-DFA0A04FC94B}">
-              <ma14:wrappingTextBoxFlag xmlns="" xmlns:m="http://schemas.openxmlformats.org/officeDocument/2006/math" xmlns:a14="http://schemas.microsoft.com/office/drawing/2010/main" xmlns:ma14="http://schemas.microsoft.com/office/mac/drawingml/2011/main" val="1"/>
+              <ma14:wrappingTextBoxFlag xmlns:ma14="http://schemas.microsoft.com/office/mac/drawingml/2011/main" xmlns:a14="http://schemas.microsoft.com/office/drawing/2010/main" xmlns:m="http://schemas.openxmlformats.org/officeDocument/2006/math" xmlns="" val="1"/>
             </a:ext>
           </a:extLst>
         </p:spPr>
@@ -13496,60 +14048,6 @@
           </a:p>
         </p:txBody>
       </p:sp>
-      <p:pic>
-        <p:nvPicPr>
-          <p:cNvPr id="123" name="Рисунок 11" descr="Рисунок 11"/>
-          <p:cNvPicPr>
-            <a:picLocks noChangeAspect="1"/>
-          </p:cNvPicPr>
-          <p:nvPr/>
-        </p:nvPicPr>
-        <p:blipFill>
-          <a:blip r:embed="rId3"/>
-          <a:stretch>
-            <a:fillRect/>
-          </a:stretch>
-        </p:blipFill>
-        <p:spPr>
-          <a:xfrm>
-            <a:off x="8026527" y="10142"/>
-            <a:ext cx="2790825" cy="3079284"/>
-          </a:xfrm>
-          <a:prstGeom prst="rect">
-            <a:avLst/>
-          </a:prstGeom>
-          <a:ln w="12700">
-            <a:miter lim="400000"/>
-          </a:ln>
-        </p:spPr>
-      </p:pic>
-      <p:pic>
-        <p:nvPicPr>
-          <p:cNvPr id="124" name="Рисунок 12" descr="Рисунок 12"/>
-          <p:cNvPicPr>
-            <a:picLocks noChangeAspect="1"/>
-          </p:cNvPicPr>
-          <p:nvPr/>
-        </p:nvPicPr>
-        <p:blipFill>
-          <a:blip r:embed="rId4"/>
-          <a:stretch>
-            <a:fillRect/>
-          </a:stretch>
-        </p:blipFill>
-        <p:spPr>
-          <a:xfrm>
-            <a:off x="8989844" y="1263484"/>
-            <a:ext cx="829316" cy="533647"/>
-          </a:xfrm>
-          <a:prstGeom prst="rect">
-            <a:avLst/>
-          </a:prstGeom>
-          <a:ln w="12700">
-            <a:miter lim="400000"/>
-          </a:ln>
-        </p:spPr>
-      </p:pic>
       <p:sp>
         <p:nvSpPr>
           <p:cNvPr id="125" name="TextBox 13"/>
@@ -13569,7 +14067,7 @@
           </a:ln>
           <a:extLst>
             <a:ext uri="{C572A759-6A51-4108-AA02-DFA0A04FC94B}">
-              <ma14:wrappingTextBoxFlag xmlns="" xmlns:m="http://schemas.openxmlformats.org/officeDocument/2006/math" xmlns:a14="http://schemas.microsoft.com/office/drawing/2010/main" xmlns:ma14="http://schemas.microsoft.com/office/mac/drawingml/2011/main" val="1"/>
+              <ma14:wrappingTextBoxFlag xmlns:ma14="http://schemas.microsoft.com/office/mac/drawingml/2011/main" xmlns:a14="http://schemas.microsoft.com/office/drawing/2010/main" xmlns:m="http://schemas.openxmlformats.org/officeDocument/2006/math" xmlns="" val="1"/>
             </a:ext>
           </a:extLst>
         </p:spPr>
@@ -13819,29 +14317,50 @@
       </p:sp>
       <p:pic>
         <p:nvPicPr>
-          <p:cNvPr id="126" name="Рисунок 2" descr="Рисунок 2"/>
+          <p:cNvPr id="9" name="Рисунок 8"/>
           <p:cNvPicPr>
             <a:picLocks noChangeAspect="1"/>
           </p:cNvPicPr>
           <p:nvPr/>
         </p:nvPicPr>
         <p:blipFill>
-          <a:blip r:embed="rId4"/>
+          <a:blip r:embed="rId2"/>
           <a:stretch>
             <a:fillRect/>
           </a:stretch>
         </p:blipFill>
         <p:spPr>
           <a:xfrm>
-            <a:off x="8989844" y="1883648"/>
-            <a:ext cx="829316" cy="533647"/>
+            <a:off x="258094" y="615619"/>
+            <a:ext cx="5577524" cy="2344509"/>
           </a:xfrm>
           <a:prstGeom prst="rect">
             <a:avLst/>
           </a:prstGeom>
-          <a:ln w="12700">
-            <a:miter lim="400000"/>
-          </a:ln>
+        </p:spPr>
+      </p:pic>
+      <p:pic>
+        <p:nvPicPr>
+          <p:cNvPr id="10" name="Рисунок 9"/>
+          <p:cNvPicPr>
+            <a:picLocks noChangeAspect="1"/>
+          </p:cNvPicPr>
+          <p:nvPr/>
+        </p:nvPicPr>
+        <p:blipFill>
+          <a:blip r:embed="rId3"/>
+          <a:stretch>
+            <a:fillRect/>
+          </a:stretch>
+        </p:blipFill>
+        <p:spPr>
+          <a:xfrm>
+            <a:off x="8924383" y="135238"/>
+            <a:ext cx="1917789" cy="2982417"/>
+          </a:xfrm>
+          <a:prstGeom prst="rect">
+            <a:avLst/>
+          </a:prstGeom>
         </p:spPr>
       </p:pic>
     </p:spTree>

</xml_diff>

<commit_message>
(Changed table + DFSM) + Examples remade
</commit_message>
<xml_diff>
--- a/task4.pptx
+++ b/task4.pptx
@@ -1835,7 +1835,7 @@
           </a:ln>
           <a:extLst>
             <a:ext uri="{C572A759-6A51-4108-AA02-DFA0A04FC94B}">
-              <ma14:wrappingTextBoxFlag xmlns:ma14="http://schemas.microsoft.com/office/mac/drawingml/2011/main" xmlns:a14="http://schemas.microsoft.com/office/drawing/2010/main" xmlns:m="http://schemas.openxmlformats.org/officeDocument/2006/math" xmlns="" val="1"/>
+              <ma14:wrappingTextBoxFlag xmlns="" xmlns:m="http://schemas.openxmlformats.org/officeDocument/2006/math" xmlns:a14="http://schemas.microsoft.com/office/drawing/2010/main" xmlns:ma14="http://schemas.microsoft.com/office/mac/drawingml/2011/main" val="1"/>
             </a:ext>
           </a:extLst>
         </p:spPr>
@@ -1874,7 +1874,7 @@
           </a:ln>
           <a:extLst>
             <a:ext uri="{C572A759-6A51-4108-AA02-DFA0A04FC94B}">
-              <ma14:wrappingTextBoxFlag xmlns:ma14="http://schemas.microsoft.com/office/mac/drawingml/2011/main" xmlns:a14="http://schemas.microsoft.com/office/drawing/2010/main" xmlns:m="http://schemas.openxmlformats.org/officeDocument/2006/math" xmlns="" val="1"/>
+              <ma14:wrappingTextBoxFlag xmlns="" xmlns:m="http://schemas.openxmlformats.org/officeDocument/2006/math" xmlns:a14="http://schemas.microsoft.com/office/drawing/2010/main" xmlns:ma14="http://schemas.microsoft.com/office/mac/drawingml/2011/main" val="1"/>
             </a:ext>
           </a:extLst>
         </p:spPr>
@@ -2918,7 +2918,7 @@
           </a:ln>
           <a:extLst>
             <a:ext uri="{C572A759-6A51-4108-AA02-DFA0A04FC94B}">
-              <ma14:wrappingTextBoxFlag xmlns:ma14="http://schemas.microsoft.com/office/mac/drawingml/2011/main" xmlns:a14="http://schemas.microsoft.com/office/drawing/2010/main" xmlns:m="http://schemas.openxmlformats.org/officeDocument/2006/math" xmlns="" val="1"/>
+              <ma14:wrappingTextBoxFlag xmlns="" xmlns:m="http://schemas.openxmlformats.org/officeDocument/2006/math" xmlns:a14="http://schemas.microsoft.com/office/drawing/2010/main" xmlns:ma14="http://schemas.microsoft.com/office/mac/drawingml/2011/main" val="1"/>
             </a:ext>
           </a:extLst>
         </p:spPr>
@@ -3000,7 +3000,7 @@
           </a:ln>
           <a:extLst>
             <a:ext uri="{C572A759-6A51-4108-AA02-DFA0A04FC94B}">
-              <ma14:wrappingTextBoxFlag xmlns:ma14="http://schemas.microsoft.com/office/mac/drawingml/2011/main" xmlns:a14="http://schemas.microsoft.com/office/drawing/2010/main" xmlns:m="http://schemas.openxmlformats.org/officeDocument/2006/math" xmlns="" val="1"/>
+              <ma14:wrappingTextBoxFlag xmlns="" xmlns:m="http://schemas.openxmlformats.org/officeDocument/2006/math" xmlns:a14="http://schemas.microsoft.com/office/drawing/2010/main" xmlns:ma14="http://schemas.microsoft.com/office/mac/drawingml/2011/main" val="1"/>
             </a:ext>
           </a:extLst>
         </p:spPr>
@@ -3047,7 +3047,7 @@
           </a:ln>
           <a:extLst>
             <a:ext uri="{C572A759-6A51-4108-AA02-DFA0A04FC94B}">
-              <ma14:wrappingTextBoxFlag xmlns:ma14="http://schemas.microsoft.com/office/mac/drawingml/2011/main" xmlns:a14="http://schemas.microsoft.com/office/drawing/2010/main" xmlns:m="http://schemas.openxmlformats.org/officeDocument/2006/math" xmlns="" val="1"/>
+              <ma14:wrappingTextBoxFlag xmlns="" xmlns:m="http://schemas.openxmlformats.org/officeDocument/2006/math" xmlns:a14="http://schemas.microsoft.com/office/drawing/2010/main" xmlns:ma14="http://schemas.microsoft.com/office/mac/drawingml/2011/main" val="1"/>
             </a:ext>
           </a:extLst>
         </p:spPr>
@@ -3213,21 +3213,21 @@
                 <a:gridCol w="1152547">
                   <a:extLst>
                     <a:ext uri="{9D8B030D-6E8A-4147-A177-3AD203B41FA5}">
-                      <a16:colId xmlns:a16="http://schemas.microsoft.com/office/drawing/2014/main" xmlns="" val="20000"/>
+                      <a16:colId xmlns:a16="http://schemas.microsoft.com/office/drawing/2014/main" val="20000"/>
                     </a:ext>
                   </a:extLst>
                 </a:gridCol>
                 <a:gridCol w="1152547">
                   <a:extLst>
                     <a:ext uri="{9D8B030D-6E8A-4147-A177-3AD203B41FA5}">
-                      <a16:colId xmlns:a16="http://schemas.microsoft.com/office/drawing/2014/main" xmlns="" val="20001"/>
+                      <a16:colId xmlns:a16="http://schemas.microsoft.com/office/drawing/2014/main" val="20001"/>
                     </a:ext>
                   </a:extLst>
                 </a:gridCol>
                 <a:gridCol w="1152547">
                   <a:extLst>
                     <a:ext uri="{9D8B030D-6E8A-4147-A177-3AD203B41FA5}">
-                      <a16:colId xmlns:a16="http://schemas.microsoft.com/office/drawing/2014/main" xmlns="" val="20002"/>
+                      <a16:colId xmlns:a16="http://schemas.microsoft.com/office/drawing/2014/main" val="20002"/>
                     </a:ext>
                   </a:extLst>
                 </a:gridCol>
@@ -3283,7 +3283,7 @@
                 </a:tc>
                 <a:extLst>
                   <a:ext uri="{0D108BD9-81ED-4DB2-BD59-A6C34878D82A}">
-                    <a16:rowId xmlns:a16="http://schemas.microsoft.com/office/drawing/2014/main" xmlns="" val="10000"/>
+                    <a16:rowId xmlns:a16="http://schemas.microsoft.com/office/drawing/2014/main" val="10000"/>
                   </a:ext>
                 </a:extLst>
               </a:tr>
@@ -3338,7 +3338,7 @@
                 </a:tc>
                 <a:extLst>
                   <a:ext uri="{0D108BD9-81ED-4DB2-BD59-A6C34878D82A}">
-                    <a16:rowId xmlns:a16="http://schemas.microsoft.com/office/drawing/2014/main" xmlns="" val="10001"/>
+                    <a16:rowId xmlns:a16="http://schemas.microsoft.com/office/drawing/2014/main" val="10001"/>
                   </a:ext>
                 </a:extLst>
               </a:tr>
@@ -3393,7 +3393,7 @@
                 </a:tc>
                 <a:extLst>
                   <a:ext uri="{0D108BD9-81ED-4DB2-BD59-A6C34878D82A}">
-                    <a16:rowId xmlns:a16="http://schemas.microsoft.com/office/drawing/2014/main" xmlns="" val="10002"/>
+                    <a16:rowId xmlns:a16="http://schemas.microsoft.com/office/drawing/2014/main" val="10002"/>
                   </a:ext>
                 </a:extLst>
               </a:tr>
@@ -3448,7 +3448,7 @@
                 </a:tc>
                 <a:extLst>
                   <a:ext uri="{0D108BD9-81ED-4DB2-BD59-A6C34878D82A}">
-                    <a16:rowId xmlns:a16="http://schemas.microsoft.com/office/drawing/2014/main" xmlns="" val="10003"/>
+                    <a16:rowId xmlns:a16="http://schemas.microsoft.com/office/drawing/2014/main" val="10003"/>
                   </a:ext>
                 </a:extLst>
               </a:tr>
@@ -3503,7 +3503,7 @@
                 </a:tc>
                 <a:extLst>
                   <a:ext uri="{0D108BD9-81ED-4DB2-BD59-A6C34878D82A}">
-                    <a16:rowId xmlns:a16="http://schemas.microsoft.com/office/drawing/2014/main" xmlns="" val="10004"/>
+                    <a16:rowId xmlns:a16="http://schemas.microsoft.com/office/drawing/2014/main" val="10004"/>
                   </a:ext>
                 </a:extLst>
               </a:tr>
@@ -3530,7 +3530,7 @@
           </a:ln>
           <a:extLst>
             <a:ext uri="{C572A759-6A51-4108-AA02-DFA0A04FC94B}">
-              <ma14:wrappingTextBoxFlag xmlns:ma14="http://schemas.microsoft.com/office/mac/drawingml/2011/main" xmlns:a14="http://schemas.microsoft.com/office/drawing/2010/main" xmlns:m="http://schemas.openxmlformats.org/officeDocument/2006/math" xmlns="" val="1"/>
+              <ma14:wrappingTextBoxFlag xmlns="" xmlns:m="http://schemas.openxmlformats.org/officeDocument/2006/math" xmlns:a14="http://schemas.microsoft.com/office/drawing/2010/main" xmlns:ma14="http://schemas.microsoft.com/office/mac/drawingml/2011/main" val="1"/>
             </a:ext>
           </a:extLst>
         </p:spPr>
@@ -3689,7 +3689,7 @@
           </a:ln>
           <a:extLst>
             <a:ext uri="{C572A759-6A51-4108-AA02-DFA0A04FC94B}">
-              <ma14:wrappingTextBoxFlag xmlns:ma14="http://schemas.microsoft.com/office/mac/drawingml/2011/main" xmlns:a14="http://schemas.microsoft.com/office/drawing/2010/main" xmlns:m="http://schemas.openxmlformats.org/officeDocument/2006/math" xmlns="" val="1"/>
+              <ma14:wrappingTextBoxFlag xmlns="" xmlns:m="http://schemas.openxmlformats.org/officeDocument/2006/math" xmlns:a14="http://schemas.microsoft.com/office/drawing/2010/main" xmlns:ma14="http://schemas.microsoft.com/office/mac/drawingml/2011/main" val="1"/>
             </a:ext>
           </a:extLst>
         </p:spPr>
@@ -3955,21 +3955,21 @@
                 <a:gridCol w="839281">
                   <a:extLst>
                     <a:ext uri="{9D8B030D-6E8A-4147-A177-3AD203B41FA5}">
-                      <a16:colId xmlns:a16="http://schemas.microsoft.com/office/drawing/2014/main" xmlns="" val="20000"/>
+                      <a16:colId xmlns:a16="http://schemas.microsoft.com/office/drawing/2014/main" val="20000"/>
                     </a:ext>
                   </a:extLst>
                 </a:gridCol>
                 <a:gridCol w="839281">
                   <a:extLst>
                     <a:ext uri="{9D8B030D-6E8A-4147-A177-3AD203B41FA5}">
-                      <a16:colId xmlns:a16="http://schemas.microsoft.com/office/drawing/2014/main" xmlns="" val="20001"/>
+                      <a16:colId xmlns:a16="http://schemas.microsoft.com/office/drawing/2014/main" val="20001"/>
                     </a:ext>
                   </a:extLst>
                 </a:gridCol>
                 <a:gridCol w="839281">
                   <a:extLst>
                     <a:ext uri="{9D8B030D-6E8A-4147-A177-3AD203B41FA5}">
-                      <a16:colId xmlns:a16="http://schemas.microsoft.com/office/drawing/2014/main" xmlns="" val="20002"/>
+                      <a16:colId xmlns:a16="http://schemas.microsoft.com/office/drawing/2014/main" val="20002"/>
                     </a:ext>
                   </a:extLst>
                 </a:gridCol>
@@ -4025,7 +4025,7 @@
                 </a:tc>
                 <a:extLst>
                   <a:ext uri="{0D108BD9-81ED-4DB2-BD59-A6C34878D82A}">
-                    <a16:rowId xmlns:a16="http://schemas.microsoft.com/office/drawing/2014/main" xmlns="" val="10000"/>
+                    <a16:rowId xmlns:a16="http://schemas.microsoft.com/office/drawing/2014/main" val="10000"/>
                   </a:ext>
                 </a:extLst>
               </a:tr>
@@ -4080,7 +4080,7 @@
                 </a:tc>
                 <a:extLst>
                   <a:ext uri="{0D108BD9-81ED-4DB2-BD59-A6C34878D82A}">
-                    <a16:rowId xmlns:a16="http://schemas.microsoft.com/office/drawing/2014/main" xmlns="" val="10001"/>
+                    <a16:rowId xmlns:a16="http://schemas.microsoft.com/office/drawing/2014/main" val="10001"/>
                   </a:ext>
                 </a:extLst>
               </a:tr>
@@ -4135,7 +4135,7 @@
                 </a:tc>
                 <a:extLst>
                   <a:ext uri="{0D108BD9-81ED-4DB2-BD59-A6C34878D82A}">
-                    <a16:rowId xmlns:a16="http://schemas.microsoft.com/office/drawing/2014/main" xmlns="" val="10002"/>
+                    <a16:rowId xmlns:a16="http://schemas.microsoft.com/office/drawing/2014/main" val="10002"/>
                   </a:ext>
                 </a:extLst>
               </a:tr>
@@ -4190,7 +4190,7 @@
                 </a:tc>
                 <a:extLst>
                   <a:ext uri="{0D108BD9-81ED-4DB2-BD59-A6C34878D82A}">
-                    <a16:rowId xmlns:a16="http://schemas.microsoft.com/office/drawing/2014/main" xmlns="" val="10003"/>
+                    <a16:rowId xmlns:a16="http://schemas.microsoft.com/office/drawing/2014/main" val="10003"/>
                   </a:ext>
                 </a:extLst>
               </a:tr>
@@ -4245,7 +4245,7 @@
                 </a:tc>
                 <a:extLst>
                   <a:ext uri="{0D108BD9-81ED-4DB2-BD59-A6C34878D82A}">
-                    <a16:rowId xmlns:a16="http://schemas.microsoft.com/office/drawing/2014/main" xmlns="" val="10004"/>
+                    <a16:rowId xmlns:a16="http://schemas.microsoft.com/office/drawing/2014/main" val="10004"/>
                   </a:ext>
                 </a:extLst>
               </a:tr>
@@ -4479,21 +4479,21 @@
                 <a:gridCol w="839281">
                   <a:extLst>
                     <a:ext uri="{9D8B030D-6E8A-4147-A177-3AD203B41FA5}">
-                      <a16:colId xmlns:a16="http://schemas.microsoft.com/office/drawing/2014/main" xmlns="" val="20000"/>
+                      <a16:colId xmlns:a16="http://schemas.microsoft.com/office/drawing/2014/main" val="20000"/>
                     </a:ext>
                   </a:extLst>
                 </a:gridCol>
                 <a:gridCol w="839281">
                   <a:extLst>
                     <a:ext uri="{9D8B030D-6E8A-4147-A177-3AD203B41FA5}">
-                      <a16:colId xmlns:a16="http://schemas.microsoft.com/office/drawing/2014/main" xmlns="" val="20001"/>
+                      <a16:colId xmlns:a16="http://schemas.microsoft.com/office/drawing/2014/main" val="20001"/>
                     </a:ext>
                   </a:extLst>
                 </a:gridCol>
                 <a:gridCol w="839281">
                   <a:extLst>
                     <a:ext uri="{9D8B030D-6E8A-4147-A177-3AD203B41FA5}">
-                      <a16:colId xmlns:a16="http://schemas.microsoft.com/office/drawing/2014/main" xmlns="" val="20002"/>
+                      <a16:colId xmlns:a16="http://schemas.microsoft.com/office/drawing/2014/main" val="20002"/>
                     </a:ext>
                   </a:extLst>
                 </a:gridCol>
@@ -4549,7 +4549,7 @@
                 </a:tc>
                 <a:extLst>
                   <a:ext uri="{0D108BD9-81ED-4DB2-BD59-A6C34878D82A}">
-                    <a16:rowId xmlns:a16="http://schemas.microsoft.com/office/drawing/2014/main" xmlns="" val="10000"/>
+                    <a16:rowId xmlns:a16="http://schemas.microsoft.com/office/drawing/2014/main" val="10000"/>
                   </a:ext>
                 </a:extLst>
               </a:tr>
@@ -4604,7 +4604,7 @@
                 </a:tc>
                 <a:extLst>
                   <a:ext uri="{0D108BD9-81ED-4DB2-BD59-A6C34878D82A}">
-                    <a16:rowId xmlns:a16="http://schemas.microsoft.com/office/drawing/2014/main" xmlns="" val="10001"/>
+                    <a16:rowId xmlns:a16="http://schemas.microsoft.com/office/drawing/2014/main" val="10001"/>
                   </a:ext>
                 </a:extLst>
               </a:tr>
@@ -4720,21 +4720,21 @@
                 <a:gridCol w="839281">
                   <a:extLst>
                     <a:ext uri="{9D8B030D-6E8A-4147-A177-3AD203B41FA5}">
-                      <a16:colId xmlns:a16="http://schemas.microsoft.com/office/drawing/2014/main" xmlns="" val="20000"/>
+                      <a16:colId xmlns:a16="http://schemas.microsoft.com/office/drawing/2014/main" val="20000"/>
                     </a:ext>
                   </a:extLst>
                 </a:gridCol>
                 <a:gridCol w="839281">
                   <a:extLst>
                     <a:ext uri="{9D8B030D-6E8A-4147-A177-3AD203B41FA5}">
-                      <a16:colId xmlns:a16="http://schemas.microsoft.com/office/drawing/2014/main" xmlns="" val="20001"/>
+                      <a16:colId xmlns:a16="http://schemas.microsoft.com/office/drawing/2014/main" val="20001"/>
                     </a:ext>
                   </a:extLst>
                 </a:gridCol>
                 <a:gridCol w="839281">
                   <a:extLst>
                     <a:ext uri="{9D8B030D-6E8A-4147-A177-3AD203B41FA5}">
-                      <a16:colId xmlns:a16="http://schemas.microsoft.com/office/drawing/2014/main" xmlns="" val="20002"/>
+                      <a16:colId xmlns:a16="http://schemas.microsoft.com/office/drawing/2014/main" val="20002"/>
                     </a:ext>
                   </a:extLst>
                 </a:gridCol>
@@ -4790,7 +4790,7 @@
                 </a:tc>
                 <a:extLst>
                   <a:ext uri="{0D108BD9-81ED-4DB2-BD59-A6C34878D82A}">
-                    <a16:rowId xmlns:a16="http://schemas.microsoft.com/office/drawing/2014/main" xmlns="" val="10000"/>
+                    <a16:rowId xmlns:a16="http://schemas.microsoft.com/office/drawing/2014/main" val="10000"/>
                   </a:ext>
                 </a:extLst>
               </a:tr>
@@ -4845,7 +4845,7 @@
                 </a:tc>
                 <a:extLst>
                   <a:ext uri="{0D108BD9-81ED-4DB2-BD59-A6C34878D82A}">
-                    <a16:rowId xmlns:a16="http://schemas.microsoft.com/office/drawing/2014/main" xmlns="" val="10001"/>
+                    <a16:rowId xmlns:a16="http://schemas.microsoft.com/office/drawing/2014/main" val="10001"/>
                   </a:ext>
                 </a:extLst>
               </a:tr>
@@ -4900,7 +4900,7 @@
                 </a:tc>
                 <a:extLst>
                   <a:ext uri="{0D108BD9-81ED-4DB2-BD59-A6C34878D82A}">
-                    <a16:rowId xmlns:a16="http://schemas.microsoft.com/office/drawing/2014/main" xmlns="" val="10002"/>
+                    <a16:rowId xmlns:a16="http://schemas.microsoft.com/office/drawing/2014/main" val="10002"/>
                   </a:ext>
                 </a:extLst>
               </a:tr>
@@ -4955,7 +4955,7 @@
                 </a:tc>
                 <a:extLst>
                   <a:ext uri="{0D108BD9-81ED-4DB2-BD59-A6C34878D82A}">
-                    <a16:rowId xmlns:a16="http://schemas.microsoft.com/office/drawing/2014/main" xmlns="" val="10003"/>
+                    <a16:rowId xmlns:a16="http://schemas.microsoft.com/office/drawing/2014/main" val="10003"/>
                   </a:ext>
                 </a:extLst>
               </a:tr>
@@ -5010,7 +5010,7 @@
                 </a:tc>
                 <a:extLst>
                   <a:ext uri="{0D108BD9-81ED-4DB2-BD59-A6C34878D82A}">
-                    <a16:rowId xmlns:a16="http://schemas.microsoft.com/office/drawing/2014/main" xmlns="" val="10004"/>
+                    <a16:rowId xmlns:a16="http://schemas.microsoft.com/office/drawing/2014/main" val="10004"/>
                   </a:ext>
                 </a:extLst>
               </a:tr>
@@ -5216,21 +5216,21 @@
                 <a:gridCol w="898547">
                   <a:extLst>
                     <a:ext uri="{9D8B030D-6E8A-4147-A177-3AD203B41FA5}">
-                      <a16:colId xmlns:a16="http://schemas.microsoft.com/office/drawing/2014/main" xmlns="" val="20000"/>
+                      <a16:colId xmlns:a16="http://schemas.microsoft.com/office/drawing/2014/main" val="20000"/>
                     </a:ext>
                   </a:extLst>
                 </a:gridCol>
                 <a:gridCol w="898547">
                   <a:extLst>
                     <a:ext uri="{9D8B030D-6E8A-4147-A177-3AD203B41FA5}">
-                      <a16:colId xmlns:a16="http://schemas.microsoft.com/office/drawing/2014/main" xmlns="" val="20001"/>
+                      <a16:colId xmlns:a16="http://schemas.microsoft.com/office/drawing/2014/main" val="20001"/>
                     </a:ext>
                   </a:extLst>
                 </a:gridCol>
                 <a:gridCol w="898547">
                   <a:extLst>
                     <a:ext uri="{9D8B030D-6E8A-4147-A177-3AD203B41FA5}">
-                      <a16:colId xmlns:a16="http://schemas.microsoft.com/office/drawing/2014/main" xmlns="" val="20002"/>
+                      <a16:colId xmlns:a16="http://schemas.microsoft.com/office/drawing/2014/main" val="20002"/>
                     </a:ext>
                   </a:extLst>
                 </a:gridCol>
@@ -5286,7 +5286,7 @@
                 </a:tc>
                 <a:extLst>
                   <a:ext uri="{0D108BD9-81ED-4DB2-BD59-A6C34878D82A}">
-                    <a16:rowId xmlns:a16="http://schemas.microsoft.com/office/drawing/2014/main" xmlns="" val="10000"/>
+                    <a16:rowId xmlns:a16="http://schemas.microsoft.com/office/drawing/2014/main" val="10000"/>
                   </a:ext>
                 </a:extLst>
               </a:tr>
@@ -5341,7 +5341,7 @@
                 </a:tc>
                 <a:extLst>
                   <a:ext uri="{0D108BD9-81ED-4DB2-BD59-A6C34878D82A}">
-                    <a16:rowId xmlns:a16="http://schemas.microsoft.com/office/drawing/2014/main" xmlns="" val="10001"/>
+                    <a16:rowId xmlns:a16="http://schemas.microsoft.com/office/drawing/2014/main" val="10001"/>
                   </a:ext>
                 </a:extLst>
               </a:tr>
@@ -5396,7 +5396,7 @@
                 </a:tc>
                 <a:extLst>
                   <a:ext uri="{0D108BD9-81ED-4DB2-BD59-A6C34878D82A}">
-                    <a16:rowId xmlns:a16="http://schemas.microsoft.com/office/drawing/2014/main" xmlns="" val="10002"/>
+                    <a16:rowId xmlns:a16="http://schemas.microsoft.com/office/drawing/2014/main" val="10002"/>
                   </a:ext>
                 </a:extLst>
               </a:tr>
@@ -5512,21 +5512,21 @@
                 <a:gridCol w="839281">
                   <a:extLst>
                     <a:ext uri="{9D8B030D-6E8A-4147-A177-3AD203B41FA5}">
-                      <a16:colId xmlns:a16="http://schemas.microsoft.com/office/drawing/2014/main" xmlns="" val="20000"/>
+                      <a16:colId xmlns:a16="http://schemas.microsoft.com/office/drawing/2014/main" val="20000"/>
                     </a:ext>
                   </a:extLst>
                 </a:gridCol>
                 <a:gridCol w="839281">
                   <a:extLst>
                     <a:ext uri="{9D8B030D-6E8A-4147-A177-3AD203B41FA5}">
-                      <a16:colId xmlns:a16="http://schemas.microsoft.com/office/drawing/2014/main" xmlns="" val="20001"/>
+                      <a16:colId xmlns:a16="http://schemas.microsoft.com/office/drawing/2014/main" val="20001"/>
                     </a:ext>
                   </a:extLst>
                 </a:gridCol>
                 <a:gridCol w="839281">
                   <a:extLst>
                     <a:ext uri="{9D8B030D-6E8A-4147-A177-3AD203B41FA5}">
-                      <a16:colId xmlns:a16="http://schemas.microsoft.com/office/drawing/2014/main" xmlns="" val="20002"/>
+                      <a16:colId xmlns:a16="http://schemas.microsoft.com/office/drawing/2014/main" val="20002"/>
                     </a:ext>
                   </a:extLst>
                 </a:gridCol>
@@ -5582,7 +5582,7 @@
                 </a:tc>
                 <a:extLst>
                   <a:ext uri="{0D108BD9-81ED-4DB2-BD59-A6C34878D82A}">
-                    <a16:rowId xmlns:a16="http://schemas.microsoft.com/office/drawing/2014/main" xmlns="" val="10000"/>
+                    <a16:rowId xmlns:a16="http://schemas.microsoft.com/office/drawing/2014/main" val="10000"/>
                   </a:ext>
                 </a:extLst>
               </a:tr>
@@ -5637,7 +5637,7 @@
                 </a:tc>
                 <a:extLst>
                   <a:ext uri="{0D108BD9-81ED-4DB2-BD59-A6C34878D82A}">
-                    <a16:rowId xmlns:a16="http://schemas.microsoft.com/office/drawing/2014/main" xmlns="" val="10001"/>
+                    <a16:rowId xmlns:a16="http://schemas.microsoft.com/office/drawing/2014/main" val="10001"/>
                   </a:ext>
                 </a:extLst>
               </a:tr>
@@ -5692,7 +5692,7 @@
                 </a:tc>
                 <a:extLst>
                   <a:ext uri="{0D108BD9-81ED-4DB2-BD59-A6C34878D82A}">
-                    <a16:rowId xmlns:a16="http://schemas.microsoft.com/office/drawing/2014/main" xmlns="" val="10002"/>
+                    <a16:rowId xmlns:a16="http://schemas.microsoft.com/office/drawing/2014/main" val="10002"/>
                   </a:ext>
                 </a:extLst>
               </a:tr>
@@ -5747,7 +5747,7 @@
                 </a:tc>
                 <a:extLst>
                   <a:ext uri="{0D108BD9-81ED-4DB2-BD59-A6C34878D82A}">
-                    <a16:rowId xmlns:a16="http://schemas.microsoft.com/office/drawing/2014/main" xmlns="" val="10003"/>
+                    <a16:rowId xmlns:a16="http://schemas.microsoft.com/office/drawing/2014/main" val="10003"/>
                   </a:ext>
                 </a:extLst>
               </a:tr>
@@ -5802,7 +5802,7 @@
                 </a:tc>
                 <a:extLst>
                   <a:ext uri="{0D108BD9-81ED-4DB2-BD59-A6C34878D82A}">
-                    <a16:rowId xmlns:a16="http://schemas.microsoft.com/office/drawing/2014/main" xmlns="" val="10004"/>
+                    <a16:rowId xmlns:a16="http://schemas.microsoft.com/office/drawing/2014/main" val="10004"/>
                   </a:ext>
                 </a:extLst>
               </a:tr>
@@ -5924,21 +5924,21 @@
                 <a:gridCol w="827211">
                   <a:extLst>
                     <a:ext uri="{9D8B030D-6E8A-4147-A177-3AD203B41FA5}">
-                      <a16:colId xmlns:a16="http://schemas.microsoft.com/office/drawing/2014/main" xmlns="" val="20000"/>
+                      <a16:colId xmlns:a16="http://schemas.microsoft.com/office/drawing/2014/main" val="20000"/>
                     </a:ext>
                   </a:extLst>
                 </a:gridCol>
                 <a:gridCol w="827211">
                   <a:extLst>
                     <a:ext uri="{9D8B030D-6E8A-4147-A177-3AD203B41FA5}">
-                      <a16:colId xmlns:a16="http://schemas.microsoft.com/office/drawing/2014/main" xmlns="" val="20001"/>
+                      <a16:colId xmlns:a16="http://schemas.microsoft.com/office/drawing/2014/main" val="20001"/>
                     </a:ext>
                   </a:extLst>
                 </a:gridCol>
                 <a:gridCol w="827211">
                   <a:extLst>
                     <a:ext uri="{9D8B030D-6E8A-4147-A177-3AD203B41FA5}">
-                      <a16:colId xmlns:a16="http://schemas.microsoft.com/office/drawing/2014/main" xmlns="" val="20002"/>
+                      <a16:colId xmlns:a16="http://schemas.microsoft.com/office/drawing/2014/main" val="20002"/>
                     </a:ext>
                   </a:extLst>
                 </a:gridCol>
@@ -5994,7 +5994,7 @@
                 </a:tc>
                 <a:extLst>
                   <a:ext uri="{0D108BD9-81ED-4DB2-BD59-A6C34878D82A}">
-                    <a16:rowId xmlns:a16="http://schemas.microsoft.com/office/drawing/2014/main" xmlns="" val="10000"/>
+                    <a16:rowId xmlns:a16="http://schemas.microsoft.com/office/drawing/2014/main" val="10000"/>
                   </a:ext>
                 </a:extLst>
               </a:tr>
@@ -6049,7 +6049,7 @@
                 </a:tc>
                 <a:extLst>
                   <a:ext uri="{0D108BD9-81ED-4DB2-BD59-A6C34878D82A}">
-                    <a16:rowId xmlns:a16="http://schemas.microsoft.com/office/drawing/2014/main" xmlns="" val="10001"/>
+                    <a16:rowId xmlns:a16="http://schemas.microsoft.com/office/drawing/2014/main" val="10001"/>
                   </a:ext>
                 </a:extLst>
               </a:tr>
@@ -6104,7 +6104,7 @@
                 </a:tc>
                 <a:extLst>
                   <a:ext uri="{0D108BD9-81ED-4DB2-BD59-A6C34878D82A}">
-                    <a16:rowId xmlns:a16="http://schemas.microsoft.com/office/drawing/2014/main" xmlns="" val="10002"/>
+                    <a16:rowId xmlns:a16="http://schemas.microsoft.com/office/drawing/2014/main" val="10002"/>
                   </a:ext>
                 </a:extLst>
               </a:tr>
@@ -6159,7 +6159,7 @@
                 </a:tc>
                 <a:extLst>
                   <a:ext uri="{0D108BD9-81ED-4DB2-BD59-A6C34878D82A}">
-                    <a16:rowId xmlns:a16="http://schemas.microsoft.com/office/drawing/2014/main" xmlns="" val="10003"/>
+                    <a16:rowId xmlns:a16="http://schemas.microsoft.com/office/drawing/2014/main" val="10003"/>
                   </a:ext>
                 </a:extLst>
               </a:tr>
@@ -6275,21 +6275,21 @@
                 <a:gridCol w="839281">
                   <a:extLst>
                     <a:ext uri="{9D8B030D-6E8A-4147-A177-3AD203B41FA5}">
-                      <a16:colId xmlns:a16="http://schemas.microsoft.com/office/drawing/2014/main" xmlns="" val="20000"/>
+                      <a16:colId xmlns:a16="http://schemas.microsoft.com/office/drawing/2014/main" val="20000"/>
                     </a:ext>
                   </a:extLst>
                 </a:gridCol>
                 <a:gridCol w="839281">
                   <a:extLst>
                     <a:ext uri="{9D8B030D-6E8A-4147-A177-3AD203B41FA5}">
-                      <a16:colId xmlns:a16="http://schemas.microsoft.com/office/drawing/2014/main" xmlns="" val="20001"/>
+                      <a16:colId xmlns:a16="http://schemas.microsoft.com/office/drawing/2014/main" val="20001"/>
                     </a:ext>
                   </a:extLst>
                 </a:gridCol>
                 <a:gridCol w="839281">
                   <a:extLst>
                     <a:ext uri="{9D8B030D-6E8A-4147-A177-3AD203B41FA5}">
-                      <a16:colId xmlns:a16="http://schemas.microsoft.com/office/drawing/2014/main" xmlns="" val="20002"/>
+                      <a16:colId xmlns:a16="http://schemas.microsoft.com/office/drawing/2014/main" val="20002"/>
                     </a:ext>
                   </a:extLst>
                 </a:gridCol>
@@ -6345,7 +6345,7 @@
                 </a:tc>
                 <a:extLst>
                   <a:ext uri="{0D108BD9-81ED-4DB2-BD59-A6C34878D82A}">
-                    <a16:rowId xmlns:a16="http://schemas.microsoft.com/office/drawing/2014/main" xmlns="" val="10000"/>
+                    <a16:rowId xmlns:a16="http://schemas.microsoft.com/office/drawing/2014/main" val="10000"/>
                   </a:ext>
                 </a:extLst>
               </a:tr>
@@ -6400,7 +6400,7 @@
                 </a:tc>
                 <a:extLst>
                   <a:ext uri="{0D108BD9-81ED-4DB2-BD59-A6C34878D82A}">
-                    <a16:rowId xmlns:a16="http://schemas.microsoft.com/office/drawing/2014/main" xmlns="" val="10001"/>
+                    <a16:rowId xmlns:a16="http://schemas.microsoft.com/office/drawing/2014/main" val="10001"/>
                   </a:ext>
                 </a:extLst>
               </a:tr>
@@ -6455,7 +6455,7 @@
                 </a:tc>
                 <a:extLst>
                   <a:ext uri="{0D108BD9-81ED-4DB2-BD59-A6C34878D82A}">
-                    <a16:rowId xmlns:a16="http://schemas.microsoft.com/office/drawing/2014/main" xmlns="" val="10002"/>
+                    <a16:rowId xmlns:a16="http://schemas.microsoft.com/office/drawing/2014/main" val="10002"/>
                   </a:ext>
                 </a:extLst>
               </a:tr>
@@ -6510,7 +6510,7 @@
                 </a:tc>
                 <a:extLst>
                   <a:ext uri="{0D108BD9-81ED-4DB2-BD59-A6C34878D82A}">
-                    <a16:rowId xmlns:a16="http://schemas.microsoft.com/office/drawing/2014/main" xmlns="" val="10003"/>
+                    <a16:rowId xmlns:a16="http://schemas.microsoft.com/office/drawing/2014/main" val="10003"/>
                   </a:ext>
                 </a:extLst>
               </a:tr>
@@ -6565,7 +6565,7 @@
                 </a:tc>
                 <a:extLst>
                   <a:ext uri="{0D108BD9-81ED-4DB2-BD59-A6C34878D82A}">
-                    <a16:rowId xmlns:a16="http://schemas.microsoft.com/office/drawing/2014/main" xmlns="" val="10004"/>
+                    <a16:rowId xmlns:a16="http://schemas.microsoft.com/office/drawing/2014/main" val="10004"/>
                   </a:ext>
                 </a:extLst>
               </a:tr>
@@ -6650,21 +6650,21 @@
                 <a:gridCol w="839281">
                   <a:extLst>
                     <a:ext uri="{9D8B030D-6E8A-4147-A177-3AD203B41FA5}">
-                      <a16:colId xmlns:a16="http://schemas.microsoft.com/office/drawing/2014/main" xmlns="" val="20000"/>
+                      <a16:colId xmlns:a16="http://schemas.microsoft.com/office/drawing/2014/main" val="20000"/>
                     </a:ext>
                   </a:extLst>
                 </a:gridCol>
                 <a:gridCol w="839281">
                   <a:extLst>
                     <a:ext uri="{9D8B030D-6E8A-4147-A177-3AD203B41FA5}">
-                      <a16:colId xmlns:a16="http://schemas.microsoft.com/office/drawing/2014/main" xmlns="" val="20001"/>
+                      <a16:colId xmlns:a16="http://schemas.microsoft.com/office/drawing/2014/main" val="20001"/>
                     </a:ext>
                   </a:extLst>
                 </a:gridCol>
                 <a:gridCol w="839281">
                   <a:extLst>
                     <a:ext uri="{9D8B030D-6E8A-4147-A177-3AD203B41FA5}">
-                      <a16:colId xmlns:a16="http://schemas.microsoft.com/office/drawing/2014/main" xmlns="" val="20002"/>
+                      <a16:colId xmlns:a16="http://schemas.microsoft.com/office/drawing/2014/main" val="20002"/>
                     </a:ext>
                   </a:extLst>
                 </a:gridCol>
@@ -6720,7 +6720,7 @@
                 </a:tc>
                 <a:extLst>
                   <a:ext uri="{0D108BD9-81ED-4DB2-BD59-A6C34878D82A}">
-                    <a16:rowId xmlns:a16="http://schemas.microsoft.com/office/drawing/2014/main" xmlns="" val="10000"/>
+                    <a16:rowId xmlns:a16="http://schemas.microsoft.com/office/drawing/2014/main" val="10000"/>
                   </a:ext>
                 </a:extLst>
               </a:tr>
@@ -6775,7 +6775,7 @@
                 </a:tc>
                 <a:extLst>
                   <a:ext uri="{0D108BD9-81ED-4DB2-BD59-A6C34878D82A}">
-                    <a16:rowId xmlns:a16="http://schemas.microsoft.com/office/drawing/2014/main" xmlns="" val="10001"/>
+                    <a16:rowId xmlns:a16="http://schemas.microsoft.com/office/drawing/2014/main" val="10001"/>
                   </a:ext>
                 </a:extLst>
               </a:tr>
@@ -6830,7 +6830,7 @@
                 </a:tc>
                 <a:extLst>
                   <a:ext uri="{0D108BD9-81ED-4DB2-BD59-A6C34878D82A}">
-                    <a16:rowId xmlns:a16="http://schemas.microsoft.com/office/drawing/2014/main" xmlns="" val="10002"/>
+                    <a16:rowId xmlns:a16="http://schemas.microsoft.com/office/drawing/2014/main" val="10002"/>
                   </a:ext>
                 </a:extLst>
               </a:tr>
@@ -6885,7 +6885,7 @@
                 </a:tc>
                 <a:extLst>
                   <a:ext uri="{0D108BD9-81ED-4DB2-BD59-A6C34878D82A}">
-                    <a16:rowId xmlns:a16="http://schemas.microsoft.com/office/drawing/2014/main" xmlns="" val="10003"/>
+                    <a16:rowId xmlns:a16="http://schemas.microsoft.com/office/drawing/2014/main" val="10003"/>
                   </a:ext>
                 </a:extLst>
               </a:tr>
@@ -6940,7 +6940,7 @@
                 </a:tc>
                 <a:extLst>
                   <a:ext uri="{0D108BD9-81ED-4DB2-BD59-A6C34878D82A}">
-                    <a16:rowId xmlns:a16="http://schemas.microsoft.com/office/drawing/2014/main" xmlns="" val="10004"/>
+                    <a16:rowId xmlns:a16="http://schemas.microsoft.com/office/drawing/2014/main" val="10004"/>
                   </a:ext>
                 </a:extLst>
               </a:tr>
@@ -7056,21 +7056,21 @@
                 <a:gridCol w="839281">
                   <a:extLst>
                     <a:ext uri="{9D8B030D-6E8A-4147-A177-3AD203B41FA5}">
-                      <a16:colId xmlns:a16="http://schemas.microsoft.com/office/drawing/2014/main" xmlns="" val="20000"/>
+                      <a16:colId xmlns:a16="http://schemas.microsoft.com/office/drawing/2014/main" val="20000"/>
                     </a:ext>
                   </a:extLst>
                 </a:gridCol>
                 <a:gridCol w="839281">
                   <a:extLst>
                     <a:ext uri="{9D8B030D-6E8A-4147-A177-3AD203B41FA5}">
-                      <a16:colId xmlns:a16="http://schemas.microsoft.com/office/drawing/2014/main" xmlns="" val="20001"/>
+                      <a16:colId xmlns:a16="http://schemas.microsoft.com/office/drawing/2014/main" val="20001"/>
                     </a:ext>
                   </a:extLst>
                 </a:gridCol>
                 <a:gridCol w="839281">
                   <a:extLst>
                     <a:ext uri="{9D8B030D-6E8A-4147-A177-3AD203B41FA5}">
-                      <a16:colId xmlns:a16="http://schemas.microsoft.com/office/drawing/2014/main" xmlns="" val="20002"/>
+                      <a16:colId xmlns:a16="http://schemas.microsoft.com/office/drawing/2014/main" val="20002"/>
                     </a:ext>
                   </a:extLst>
                 </a:gridCol>
@@ -7126,7 +7126,7 @@
                 </a:tc>
                 <a:extLst>
                   <a:ext uri="{0D108BD9-81ED-4DB2-BD59-A6C34878D82A}">
-                    <a16:rowId xmlns:a16="http://schemas.microsoft.com/office/drawing/2014/main" xmlns="" val="10000"/>
+                    <a16:rowId xmlns:a16="http://schemas.microsoft.com/office/drawing/2014/main" val="10000"/>
                   </a:ext>
                 </a:extLst>
               </a:tr>
@@ -7181,7 +7181,7 @@
                 </a:tc>
                 <a:extLst>
                   <a:ext uri="{0D108BD9-81ED-4DB2-BD59-A6C34878D82A}">
-                    <a16:rowId xmlns:a16="http://schemas.microsoft.com/office/drawing/2014/main" xmlns="" val="10001"/>
+                    <a16:rowId xmlns:a16="http://schemas.microsoft.com/office/drawing/2014/main" val="10001"/>
                   </a:ext>
                 </a:extLst>
               </a:tr>
@@ -7236,7 +7236,7 @@
                 </a:tc>
                 <a:extLst>
                   <a:ext uri="{0D108BD9-81ED-4DB2-BD59-A6C34878D82A}">
-                    <a16:rowId xmlns:a16="http://schemas.microsoft.com/office/drawing/2014/main" xmlns="" val="10002"/>
+                    <a16:rowId xmlns:a16="http://schemas.microsoft.com/office/drawing/2014/main" val="10002"/>
                   </a:ext>
                 </a:extLst>
               </a:tr>
@@ -7291,7 +7291,7 @@
                 </a:tc>
                 <a:extLst>
                   <a:ext uri="{0D108BD9-81ED-4DB2-BD59-A6C34878D82A}">
-                    <a16:rowId xmlns:a16="http://schemas.microsoft.com/office/drawing/2014/main" xmlns="" val="10003"/>
+                    <a16:rowId xmlns:a16="http://schemas.microsoft.com/office/drawing/2014/main" val="10003"/>
                   </a:ext>
                 </a:extLst>
               </a:tr>
@@ -7346,7 +7346,7 @@
                 </a:tc>
                 <a:extLst>
                   <a:ext uri="{0D108BD9-81ED-4DB2-BD59-A6C34878D82A}">
-                    <a16:rowId xmlns:a16="http://schemas.microsoft.com/office/drawing/2014/main" xmlns="" val="10004"/>
+                    <a16:rowId xmlns:a16="http://schemas.microsoft.com/office/drawing/2014/main" val="10004"/>
                   </a:ext>
                 </a:extLst>
               </a:tr>
@@ -7468,21 +7468,21 @@
                 <a:gridCol w="839281">
                   <a:extLst>
                     <a:ext uri="{9D8B030D-6E8A-4147-A177-3AD203B41FA5}">
-                      <a16:colId xmlns:a16="http://schemas.microsoft.com/office/drawing/2014/main" xmlns="" val="20000"/>
+                      <a16:colId xmlns:a16="http://schemas.microsoft.com/office/drawing/2014/main" val="20000"/>
                     </a:ext>
                   </a:extLst>
                 </a:gridCol>
                 <a:gridCol w="839281">
                   <a:extLst>
                     <a:ext uri="{9D8B030D-6E8A-4147-A177-3AD203B41FA5}">
-                      <a16:colId xmlns:a16="http://schemas.microsoft.com/office/drawing/2014/main" xmlns="" val="20001"/>
+                      <a16:colId xmlns:a16="http://schemas.microsoft.com/office/drawing/2014/main" val="20001"/>
                     </a:ext>
                   </a:extLst>
                 </a:gridCol>
                 <a:gridCol w="839281">
                   <a:extLst>
                     <a:ext uri="{9D8B030D-6E8A-4147-A177-3AD203B41FA5}">
-                      <a16:colId xmlns:a16="http://schemas.microsoft.com/office/drawing/2014/main" xmlns="" val="20002"/>
+                      <a16:colId xmlns:a16="http://schemas.microsoft.com/office/drawing/2014/main" val="20002"/>
                     </a:ext>
                   </a:extLst>
                 </a:gridCol>
@@ -7538,7 +7538,7 @@
                 </a:tc>
                 <a:extLst>
                   <a:ext uri="{0D108BD9-81ED-4DB2-BD59-A6C34878D82A}">
-                    <a16:rowId xmlns:a16="http://schemas.microsoft.com/office/drawing/2014/main" xmlns="" val="10000"/>
+                    <a16:rowId xmlns:a16="http://schemas.microsoft.com/office/drawing/2014/main" val="10000"/>
                   </a:ext>
                 </a:extLst>
               </a:tr>
@@ -7593,7 +7593,7 @@
                 </a:tc>
                 <a:extLst>
                   <a:ext uri="{0D108BD9-81ED-4DB2-BD59-A6C34878D82A}">
-                    <a16:rowId xmlns:a16="http://schemas.microsoft.com/office/drawing/2014/main" xmlns="" val="10001"/>
+                    <a16:rowId xmlns:a16="http://schemas.microsoft.com/office/drawing/2014/main" val="10001"/>
                   </a:ext>
                 </a:extLst>
               </a:tr>
@@ -7648,7 +7648,7 @@
                 </a:tc>
                 <a:extLst>
                   <a:ext uri="{0D108BD9-81ED-4DB2-BD59-A6C34878D82A}">
-                    <a16:rowId xmlns:a16="http://schemas.microsoft.com/office/drawing/2014/main" xmlns="" val="10002"/>
+                    <a16:rowId xmlns:a16="http://schemas.microsoft.com/office/drawing/2014/main" val="10002"/>
                   </a:ext>
                 </a:extLst>
               </a:tr>
@@ -7703,7 +7703,7 @@
                 </a:tc>
                 <a:extLst>
                   <a:ext uri="{0D108BD9-81ED-4DB2-BD59-A6C34878D82A}">
-                    <a16:rowId xmlns:a16="http://schemas.microsoft.com/office/drawing/2014/main" xmlns="" val="10003"/>
+                    <a16:rowId xmlns:a16="http://schemas.microsoft.com/office/drawing/2014/main" val="10003"/>
                   </a:ext>
                 </a:extLst>
               </a:tr>
@@ -7758,7 +7758,7 @@
                 </a:tc>
                 <a:extLst>
                   <a:ext uri="{0D108BD9-81ED-4DB2-BD59-A6C34878D82A}">
-                    <a16:rowId xmlns:a16="http://schemas.microsoft.com/office/drawing/2014/main" xmlns="" val="10004"/>
+                    <a16:rowId xmlns:a16="http://schemas.microsoft.com/office/drawing/2014/main" val="10004"/>
                   </a:ext>
                 </a:extLst>
               </a:tr>
@@ -7813,7 +7813,7 @@
                 </a:tc>
                 <a:extLst>
                   <a:ext uri="{0D108BD9-81ED-4DB2-BD59-A6C34878D82A}">
-                    <a16:rowId xmlns:a16="http://schemas.microsoft.com/office/drawing/2014/main" xmlns="" val="10005"/>
+                    <a16:rowId xmlns:a16="http://schemas.microsoft.com/office/drawing/2014/main" val="10005"/>
                   </a:ext>
                 </a:extLst>
               </a:tr>
@@ -7929,21 +7929,21 @@
                 <a:gridCol w="839281">
                   <a:extLst>
                     <a:ext uri="{9D8B030D-6E8A-4147-A177-3AD203B41FA5}">
-                      <a16:colId xmlns:a16="http://schemas.microsoft.com/office/drawing/2014/main" xmlns="" val="20000"/>
+                      <a16:colId xmlns:a16="http://schemas.microsoft.com/office/drawing/2014/main" val="20000"/>
                     </a:ext>
                   </a:extLst>
                 </a:gridCol>
                 <a:gridCol w="839281">
                   <a:extLst>
                     <a:ext uri="{9D8B030D-6E8A-4147-A177-3AD203B41FA5}">
-                      <a16:colId xmlns:a16="http://schemas.microsoft.com/office/drawing/2014/main" xmlns="" val="20001"/>
+                      <a16:colId xmlns:a16="http://schemas.microsoft.com/office/drawing/2014/main" val="20001"/>
                     </a:ext>
                   </a:extLst>
                 </a:gridCol>
                 <a:gridCol w="839281">
                   <a:extLst>
                     <a:ext uri="{9D8B030D-6E8A-4147-A177-3AD203B41FA5}">
-                      <a16:colId xmlns:a16="http://schemas.microsoft.com/office/drawing/2014/main" xmlns="" val="20002"/>
+                      <a16:colId xmlns:a16="http://schemas.microsoft.com/office/drawing/2014/main" val="20002"/>
                     </a:ext>
                   </a:extLst>
                 </a:gridCol>
@@ -7999,7 +7999,7 @@
                 </a:tc>
                 <a:extLst>
                   <a:ext uri="{0D108BD9-81ED-4DB2-BD59-A6C34878D82A}">
-                    <a16:rowId xmlns:a16="http://schemas.microsoft.com/office/drawing/2014/main" xmlns="" val="10000"/>
+                    <a16:rowId xmlns:a16="http://schemas.microsoft.com/office/drawing/2014/main" val="10000"/>
                   </a:ext>
                 </a:extLst>
               </a:tr>
@@ -8054,7 +8054,7 @@
                 </a:tc>
                 <a:extLst>
                   <a:ext uri="{0D108BD9-81ED-4DB2-BD59-A6C34878D82A}">
-                    <a16:rowId xmlns:a16="http://schemas.microsoft.com/office/drawing/2014/main" xmlns="" val="10001"/>
+                    <a16:rowId xmlns:a16="http://schemas.microsoft.com/office/drawing/2014/main" val="10001"/>
                   </a:ext>
                 </a:extLst>
               </a:tr>
@@ -8109,7 +8109,7 @@
                 </a:tc>
                 <a:extLst>
                   <a:ext uri="{0D108BD9-81ED-4DB2-BD59-A6C34878D82A}">
-                    <a16:rowId xmlns:a16="http://schemas.microsoft.com/office/drawing/2014/main" xmlns="" val="10002"/>
+                    <a16:rowId xmlns:a16="http://schemas.microsoft.com/office/drawing/2014/main" val="10002"/>
                   </a:ext>
                 </a:extLst>
               </a:tr>
@@ -8164,7 +8164,7 @@
                 </a:tc>
                 <a:extLst>
                   <a:ext uri="{0D108BD9-81ED-4DB2-BD59-A6C34878D82A}">
-                    <a16:rowId xmlns:a16="http://schemas.microsoft.com/office/drawing/2014/main" xmlns="" val="10003"/>
+                    <a16:rowId xmlns:a16="http://schemas.microsoft.com/office/drawing/2014/main" val="10003"/>
                   </a:ext>
                 </a:extLst>
               </a:tr>
@@ -8219,7 +8219,7 @@
                 </a:tc>
                 <a:extLst>
                   <a:ext uri="{0D108BD9-81ED-4DB2-BD59-A6C34878D82A}">
-                    <a16:rowId xmlns:a16="http://schemas.microsoft.com/office/drawing/2014/main" xmlns="" val="10004"/>
+                    <a16:rowId xmlns:a16="http://schemas.microsoft.com/office/drawing/2014/main" val="10004"/>
                   </a:ext>
                 </a:extLst>
               </a:tr>
@@ -8413,21 +8413,21 @@
                 <a:gridCol w="944664">
                   <a:extLst>
                     <a:ext uri="{9D8B030D-6E8A-4147-A177-3AD203B41FA5}">
-                      <a16:colId xmlns:a16="http://schemas.microsoft.com/office/drawing/2014/main" xmlns="" val="20000"/>
+                      <a16:colId xmlns:a16="http://schemas.microsoft.com/office/drawing/2014/main" val="20000"/>
                     </a:ext>
                   </a:extLst>
                 </a:gridCol>
                 <a:gridCol w="944664">
                   <a:extLst>
                     <a:ext uri="{9D8B030D-6E8A-4147-A177-3AD203B41FA5}">
-                      <a16:colId xmlns:a16="http://schemas.microsoft.com/office/drawing/2014/main" xmlns="" val="20001"/>
+                      <a16:colId xmlns:a16="http://schemas.microsoft.com/office/drawing/2014/main" val="20001"/>
                     </a:ext>
                   </a:extLst>
                 </a:gridCol>
                 <a:gridCol w="944664">
                   <a:extLst>
                     <a:ext uri="{9D8B030D-6E8A-4147-A177-3AD203B41FA5}">
-                      <a16:colId xmlns:a16="http://schemas.microsoft.com/office/drawing/2014/main" xmlns="" val="20002"/>
+                      <a16:colId xmlns:a16="http://schemas.microsoft.com/office/drawing/2014/main" val="20002"/>
                     </a:ext>
                   </a:extLst>
                 </a:gridCol>
@@ -8483,7 +8483,7 @@
                 </a:tc>
                 <a:extLst>
                   <a:ext uri="{0D108BD9-81ED-4DB2-BD59-A6C34878D82A}">
-                    <a16:rowId xmlns:a16="http://schemas.microsoft.com/office/drawing/2014/main" xmlns="" val="10000"/>
+                    <a16:rowId xmlns:a16="http://schemas.microsoft.com/office/drawing/2014/main" val="10000"/>
                   </a:ext>
                 </a:extLst>
               </a:tr>
@@ -8538,7 +8538,7 @@
                 </a:tc>
                 <a:extLst>
                   <a:ext uri="{0D108BD9-81ED-4DB2-BD59-A6C34878D82A}">
-                    <a16:rowId xmlns:a16="http://schemas.microsoft.com/office/drawing/2014/main" xmlns="" val="10001"/>
+                    <a16:rowId xmlns:a16="http://schemas.microsoft.com/office/drawing/2014/main" val="10001"/>
                   </a:ext>
                 </a:extLst>
               </a:tr>
@@ -8593,7 +8593,7 @@
                 </a:tc>
                 <a:extLst>
                   <a:ext uri="{0D108BD9-81ED-4DB2-BD59-A6C34878D82A}">
-                    <a16:rowId xmlns:a16="http://schemas.microsoft.com/office/drawing/2014/main" xmlns="" val="10002"/>
+                    <a16:rowId xmlns:a16="http://schemas.microsoft.com/office/drawing/2014/main" val="10002"/>
                   </a:ext>
                 </a:extLst>
               </a:tr>
@@ -8648,7 +8648,7 @@
                 </a:tc>
                 <a:extLst>
                   <a:ext uri="{0D108BD9-81ED-4DB2-BD59-A6C34878D82A}">
-                    <a16:rowId xmlns:a16="http://schemas.microsoft.com/office/drawing/2014/main" xmlns="" val="10003"/>
+                    <a16:rowId xmlns:a16="http://schemas.microsoft.com/office/drawing/2014/main" val="10003"/>
                   </a:ext>
                 </a:extLst>
               </a:tr>
@@ -8703,7 +8703,7 @@
                 </a:tc>
                 <a:extLst>
                   <a:ext uri="{0D108BD9-81ED-4DB2-BD59-A6C34878D82A}">
-                    <a16:rowId xmlns:a16="http://schemas.microsoft.com/office/drawing/2014/main" xmlns="" val="10004"/>
+                    <a16:rowId xmlns:a16="http://schemas.microsoft.com/office/drawing/2014/main" val="10004"/>
                   </a:ext>
                 </a:extLst>
               </a:tr>
@@ -8758,7 +8758,7 @@
                 </a:tc>
                 <a:extLst>
                   <a:ext uri="{0D108BD9-81ED-4DB2-BD59-A6C34878D82A}">
-                    <a16:rowId xmlns:a16="http://schemas.microsoft.com/office/drawing/2014/main" xmlns="" val="10005"/>
+                    <a16:rowId xmlns:a16="http://schemas.microsoft.com/office/drawing/2014/main" val="10005"/>
                   </a:ext>
                 </a:extLst>
               </a:tr>
@@ -8813,7 +8813,7 @@
                 </a:tc>
                 <a:extLst>
                   <a:ext uri="{0D108BD9-81ED-4DB2-BD59-A6C34878D82A}">
-                    <a16:rowId xmlns:a16="http://schemas.microsoft.com/office/drawing/2014/main" xmlns="" val="10006"/>
+                    <a16:rowId xmlns:a16="http://schemas.microsoft.com/office/drawing/2014/main" val="10006"/>
                   </a:ext>
                 </a:extLst>
               </a:tr>
@@ -8957,21 +8957,21 @@
                 <a:gridCol w="944664">
                   <a:extLst>
                     <a:ext uri="{9D8B030D-6E8A-4147-A177-3AD203B41FA5}">
-                      <a16:colId xmlns:a16="http://schemas.microsoft.com/office/drawing/2014/main" xmlns="" val="20000"/>
+                      <a16:colId xmlns:a16="http://schemas.microsoft.com/office/drawing/2014/main" val="20000"/>
                     </a:ext>
                   </a:extLst>
                 </a:gridCol>
                 <a:gridCol w="944664">
                   <a:extLst>
                     <a:ext uri="{9D8B030D-6E8A-4147-A177-3AD203B41FA5}">
-                      <a16:colId xmlns:a16="http://schemas.microsoft.com/office/drawing/2014/main" xmlns="" val="20001"/>
+                      <a16:colId xmlns:a16="http://schemas.microsoft.com/office/drawing/2014/main" val="20001"/>
                     </a:ext>
                   </a:extLst>
                 </a:gridCol>
                 <a:gridCol w="944664">
                   <a:extLst>
                     <a:ext uri="{9D8B030D-6E8A-4147-A177-3AD203B41FA5}">
-                      <a16:colId xmlns:a16="http://schemas.microsoft.com/office/drawing/2014/main" xmlns="" val="20002"/>
+                      <a16:colId xmlns:a16="http://schemas.microsoft.com/office/drawing/2014/main" val="20002"/>
                     </a:ext>
                   </a:extLst>
                 </a:gridCol>
@@ -9027,7 +9027,7 @@
                 </a:tc>
                 <a:extLst>
                   <a:ext uri="{0D108BD9-81ED-4DB2-BD59-A6C34878D82A}">
-                    <a16:rowId xmlns:a16="http://schemas.microsoft.com/office/drawing/2014/main" xmlns="" val="10000"/>
+                    <a16:rowId xmlns:a16="http://schemas.microsoft.com/office/drawing/2014/main" val="10000"/>
                   </a:ext>
                 </a:extLst>
               </a:tr>
@@ -9082,7 +9082,7 @@
                 </a:tc>
                 <a:extLst>
                   <a:ext uri="{0D108BD9-81ED-4DB2-BD59-A6C34878D82A}">
-                    <a16:rowId xmlns:a16="http://schemas.microsoft.com/office/drawing/2014/main" xmlns="" val="10001"/>
+                    <a16:rowId xmlns:a16="http://schemas.microsoft.com/office/drawing/2014/main" val="10001"/>
                   </a:ext>
                 </a:extLst>
               </a:tr>
@@ -9137,7 +9137,7 @@
                 </a:tc>
                 <a:extLst>
                   <a:ext uri="{0D108BD9-81ED-4DB2-BD59-A6C34878D82A}">
-                    <a16:rowId xmlns:a16="http://schemas.microsoft.com/office/drawing/2014/main" xmlns="" val="10002"/>
+                    <a16:rowId xmlns:a16="http://schemas.microsoft.com/office/drawing/2014/main" val="10002"/>
                   </a:ext>
                 </a:extLst>
               </a:tr>
@@ -9192,7 +9192,7 @@
                 </a:tc>
                 <a:extLst>
                   <a:ext uri="{0D108BD9-81ED-4DB2-BD59-A6C34878D82A}">
-                    <a16:rowId xmlns:a16="http://schemas.microsoft.com/office/drawing/2014/main" xmlns="" val="10003"/>
+                    <a16:rowId xmlns:a16="http://schemas.microsoft.com/office/drawing/2014/main" val="10003"/>
                   </a:ext>
                 </a:extLst>
               </a:tr>
@@ -9247,7 +9247,7 @@
                 </a:tc>
                 <a:extLst>
                   <a:ext uri="{0D108BD9-81ED-4DB2-BD59-A6C34878D82A}">
-                    <a16:rowId xmlns:a16="http://schemas.microsoft.com/office/drawing/2014/main" xmlns="" val="10004"/>
+                    <a16:rowId xmlns:a16="http://schemas.microsoft.com/office/drawing/2014/main" val="10004"/>
                   </a:ext>
                 </a:extLst>
               </a:tr>
@@ -9302,7 +9302,7 @@
                 </a:tc>
                 <a:extLst>
                   <a:ext uri="{0D108BD9-81ED-4DB2-BD59-A6C34878D82A}">
-                    <a16:rowId xmlns:a16="http://schemas.microsoft.com/office/drawing/2014/main" xmlns="" val="10005"/>
+                    <a16:rowId xmlns:a16="http://schemas.microsoft.com/office/drawing/2014/main" val="10005"/>
                   </a:ext>
                 </a:extLst>
               </a:tr>
@@ -9357,7 +9357,7 @@
                 </a:tc>
                 <a:extLst>
                   <a:ext uri="{0D108BD9-81ED-4DB2-BD59-A6C34878D82A}">
-                    <a16:rowId xmlns:a16="http://schemas.microsoft.com/office/drawing/2014/main" xmlns="" val="10006"/>
+                    <a16:rowId xmlns:a16="http://schemas.microsoft.com/office/drawing/2014/main" val="10006"/>
                   </a:ext>
                 </a:extLst>
               </a:tr>
@@ -9686,7 +9686,7 @@
           <p:cNvPr id="5" name="Рисунок 8" descr="Рисунок 8">
             <a:extLst>
               <a:ext uri="{FF2B5EF4-FFF2-40B4-BE49-F238E27FC236}">
-                <a16:creationId xmlns:a16="http://schemas.microsoft.com/office/drawing/2014/main" xmlns="" id="{BB93CBC2-7075-4733-9EB5-B462482818D2}"/>
+                <a16:creationId xmlns:a16="http://schemas.microsoft.com/office/drawing/2014/main" id="{BB93CBC2-7075-4733-9EB5-B462482818D2}"/>
               </a:ext>
             </a:extLst>
           </p:cNvPr>
@@ -9719,7 +9719,7 @@
           <p:cNvPr id="4" name="Рисунок 2" descr="Рисунок 2">
             <a:extLst>
               <a:ext uri="{FF2B5EF4-FFF2-40B4-BE49-F238E27FC236}">
-                <a16:creationId xmlns:a16="http://schemas.microsoft.com/office/drawing/2014/main" xmlns="" id="{6450F734-9087-4B22-943A-B0BADC84C4CA}"/>
+                <a16:creationId xmlns:a16="http://schemas.microsoft.com/office/drawing/2014/main" id="{6450F734-9087-4B22-943A-B0BADC84C4CA}"/>
               </a:ext>
             </a:extLst>
           </p:cNvPr>
@@ -9752,7 +9752,7 @@
           <p:cNvPr id="2" name="Заголовок 1">
             <a:extLst>
               <a:ext uri="{FF2B5EF4-FFF2-40B4-BE49-F238E27FC236}">
-                <a16:creationId xmlns:a16="http://schemas.microsoft.com/office/drawing/2014/main" xmlns="" id="{FC3C89D1-AE3E-4005-AA14-F20A55005C91}"/>
+                <a16:creationId xmlns:a16="http://schemas.microsoft.com/office/drawing/2014/main" id="{FC3C89D1-AE3E-4005-AA14-F20A55005C91}"/>
               </a:ext>
             </a:extLst>
           </p:cNvPr>
@@ -9785,7 +9785,7 @@
           <p:cNvPr id="3" name="Текст 2">
             <a:extLst>
               <a:ext uri="{FF2B5EF4-FFF2-40B4-BE49-F238E27FC236}">
-                <a16:creationId xmlns:a16="http://schemas.microsoft.com/office/drawing/2014/main" xmlns="" id="{CEAF292A-C54D-4418-8B7B-706922B1C408}"/>
+                <a16:creationId xmlns:a16="http://schemas.microsoft.com/office/drawing/2014/main" id="{CEAF292A-C54D-4418-8B7B-706922B1C408}"/>
               </a:ext>
             </a:extLst>
           </p:cNvPr>
@@ -9876,7 +9876,7 @@
           <p:cNvPr id="6" name="Текст 2">
             <a:extLst>
               <a:ext uri="{FF2B5EF4-FFF2-40B4-BE49-F238E27FC236}">
-                <a16:creationId xmlns:a16="http://schemas.microsoft.com/office/drawing/2014/main" xmlns="" id="{C1A8F85C-223C-4760-AB63-5A0C5E88272E}"/>
+                <a16:creationId xmlns:a16="http://schemas.microsoft.com/office/drawing/2014/main" id="{C1A8F85C-223C-4760-AB63-5A0C5E88272E}"/>
               </a:ext>
             </a:extLst>
           </p:cNvPr>
@@ -9898,7 +9898,7 @@
           </a:ln>
           <a:extLst>
             <a:ext uri="{C572A759-6A51-4108-AA02-DFA0A04FC94B}">
-              <ma14:wrappingTextBoxFlag xmlns:ma14="http://schemas.microsoft.com/office/mac/drawingml/2011/main" xmlns:a14="http://schemas.microsoft.com/office/drawing/2010/main" xmlns:m="http://schemas.openxmlformats.org/officeDocument/2006/math" xmlns="" val="1"/>
+              <ma14:wrappingTextBoxFlag xmlns="" xmlns:m="http://schemas.openxmlformats.org/officeDocument/2006/math" xmlns:a14="http://schemas.microsoft.com/office/drawing/2010/main" xmlns:ma14="http://schemas.microsoft.com/office/mac/drawingml/2011/main" val="1"/>
             </a:ext>
           </a:extLst>
         </p:spPr>
@@ -10303,7 +10303,7 @@
           </a:ln>
           <a:extLst>
             <a:ext uri="{C572A759-6A51-4108-AA02-DFA0A04FC94B}">
-              <ma14:wrappingTextBoxFlag xmlns:ma14="http://schemas.microsoft.com/office/mac/drawingml/2011/main" xmlns:a14="http://schemas.microsoft.com/office/drawing/2010/main" xmlns:m="http://schemas.openxmlformats.org/officeDocument/2006/math" xmlns="" val="1"/>
+              <ma14:wrappingTextBoxFlag xmlns="" xmlns:m="http://schemas.openxmlformats.org/officeDocument/2006/math" xmlns:a14="http://schemas.microsoft.com/office/drawing/2010/main" xmlns:ma14="http://schemas.microsoft.com/office/mac/drawingml/2011/main" val="1"/>
             </a:ext>
           </a:extLst>
         </p:spPr>
@@ -10687,7 +10687,7 @@
           </a:ln>
           <a:extLst>
             <a:ext uri="{C572A759-6A51-4108-AA02-DFA0A04FC94B}">
-              <ma14:wrappingTextBoxFlag xmlns:ma14="http://schemas.microsoft.com/office/mac/drawingml/2011/main" xmlns:a14="http://schemas.microsoft.com/office/drawing/2010/main" xmlns:m="http://schemas.openxmlformats.org/officeDocument/2006/math" xmlns="" val="1"/>
+              <ma14:wrappingTextBoxFlag xmlns="" xmlns:m="http://schemas.openxmlformats.org/officeDocument/2006/math" xmlns:a14="http://schemas.microsoft.com/office/drawing/2010/main" xmlns:ma14="http://schemas.microsoft.com/office/mac/drawingml/2011/main" val="1"/>
             </a:ext>
           </a:extLst>
         </p:spPr>
@@ -11161,21 +11161,21 @@
                 <a:gridCol w="862607">
                   <a:extLst>
                     <a:ext uri="{9D8B030D-6E8A-4147-A177-3AD203B41FA5}">
-                      <a16:colId xmlns:a16="http://schemas.microsoft.com/office/drawing/2014/main" xmlns="" val="20000"/>
+                      <a16:colId xmlns:a16="http://schemas.microsoft.com/office/drawing/2014/main" val="20000"/>
                     </a:ext>
                   </a:extLst>
                 </a:gridCol>
                 <a:gridCol w="862607">
                   <a:extLst>
                     <a:ext uri="{9D8B030D-6E8A-4147-A177-3AD203B41FA5}">
-                      <a16:colId xmlns:a16="http://schemas.microsoft.com/office/drawing/2014/main" xmlns="" val="20001"/>
+                      <a16:colId xmlns:a16="http://schemas.microsoft.com/office/drawing/2014/main" val="20001"/>
                     </a:ext>
                   </a:extLst>
                 </a:gridCol>
                 <a:gridCol w="862607">
                   <a:extLst>
                     <a:ext uri="{9D8B030D-6E8A-4147-A177-3AD203B41FA5}">
-                      <a16:colId xmlns:a16="http://schemas.microsoft.com/office/drawing/2014/main" xmlns="" val="20002"/>
+                      <a16:colId xmlns:a16="http://schemas.microsoft.com/office/drawing/2014/main" val="20002"/>
                     </a:ext>
                   </a:extLst>
                 </a:gridCol>
@@ -11231,7 +11231,7 @@
                 </a:tc>
                 <a:extLst>
                   <a:ext uri="{0D108BD9-81ED-4DB2-BD59-A6C34878D82A}">
-                    <a16:rowId xmlns:a16="http://schemas.microsoft.com/office/drawing/2014/main" xmlns="" val="10000"/>
+                    <a16:rowId xmlns:a16="http://schemas.microsoft.com/office/drawing/2014/main" val="10000"/>
                   </a:ext>
                 </a:extLst>
               </a:tr>
@@ -11286,7 +11286,7 @@
                 </a:tc>
                 <a:extLst>
                   <a:ext uri="{0D108BD9-81ED-4DB2-BD59-A6C34878D82A}">
-                    <a16:rowId xmlns:a16="http://schemas.microsoft.com/office/drawing/2014/main" xmlns="" val="10001"/>
+                    <a16:rowId xmlns:a16="http://schemas.microsoft.com/office/drawing/2014/main" val="10001"/>
                   </a:ext>
                 </a:extLst>
               </a:tr>
@@ -11341,7 +11341,7 @@
                 </a:tc>
                 <a:extLst>
                   <a:ext uri="{0D108BD9-81ED-4DB2-BD59-A6C34878D82A}">
-                    <a16:rowId xmlns:a16="http://schemas.microsoft.com/office/drawing/2014/main" xmlns="" val="10002"/>
+                    <a16:rowId xmlns:a16="http://schemas.microsoft.com/office/drawing/2014/main" val="10002"/>
                   </a:ext>
                 </a:extLst>
               </a:tr>
@@ -11396,7 +11396,7 @@
                 </a:tc>
                 <a:extLst>
                   <a:ext uri="{0D108BD9-81ED-4DB2-BD59-A6C34878D82A}">
-                    <a16:rowId xmlns:a16="http://schemas.microsoft.com/office/drawing/2014/main" xmlns="" val="10003"/>
+                    <a16:rowId xmlns:a16="http://schemas.microsoft.com/office/drawing/2014/main" val="10003"/>
                   </a:ext>
                 </a:extLst>
               </a:tr>
@@ -11451,7 +11451,7 @@
                 </a:tc>
                 <a:extLst>
                   <a:ext uri="{0D108BD9-81ED-4DB2-BD59-A6C34878D82A}">
-                    <a16:rowId xmlns:a16="http://schemas.microsoft.com/office/drawing/2014/main" xmlns="" val="10004"/>
+                    <a16:rowId xmlns:a16="http://schemas.microsoft.com/office/drawing/2014/main" val="10004"/>
                   </a:ext>
                 </a:extLst>
               </a:tr>
@@ -11506,7 +11506,7 @@
                 </a:tc>
                 <a:extLst>
                   <a:ext uri="{0D108BD9-81ED-4DB2-BD59-A6C34878D82A}">
-                    <a16:rowId xmlns:a16="http://schemas.microsoft.com/office/drawing/2014/main" xmlns="" val="10005"/>
+                    <a16:rowId xmlns:a16="http://schemas.microsoft.com/office/drawing/2014/main" val="10005"/>
                   </a:ext>
                 </a:extLst>
               </a:tr>
@@ -11561,7 +11561,7 @@
                 </a:tc>
                 <a:extLst>
                   <a:ext uri="{0D108BD9-81ED-4DB2-BD59-A6C34878D82A}">
-                    <a16:rowId xmlns:a16="http://schemas.microsoft.com/office/drawing/2014/main" xmlns="" val="10006"/>
+                    <a16:rowId xmlns:a16="http://schemas.microsoft.com/office/drawing/2014/main" val="10006"/>
                   </a:ext>
                 </a:extLst>
               </a:tr>
@@ -11791,7 +11791,7 @@
           </a:ln>
           <a:extLst>
             <a:ext uri="{C572A759-6A51-4108-AA02-DFA0A04FC94B}">
-              <ma14:wrappingTextBoxFlag xmlns:ma14="http://schemas.microsoft.com/office/mac/drawingml/2011/main" xmlns:a14="http://schemas.microsoft.com/office/drawing/2010/main" xmlns:m="http://schemas.openxmlformats.org/officeDocument/2006/math" xmlns="" val="1"/>
+              <ma14:wrappingTextBoxFlag xmlns="" xmlns:m="http://schemas.openxmlformats.org/officeDocument/2006/math" xmlns:a14="http://schemas.microsoft.com/office/drawing/2010/main" xmlns:ma14="http://schemas.microsoft.com/office/mac/drawingml/2011/main" val="1"/>
             </a:ext>
           </a:extLst>
         </p:spPr>
@@ -12698,7 +12698,7 @@
           </a:ln>
           <a:extLst>
             <a:ext uri="{C572A759-6A51-4108-AA02-DFA0A04FC94B}">
-              <ma14:wrappingTextBoxFlag xmlns:ma14="http://schemas.microsoft.com/office/mac/drawingml/2011/main" xmlns:a14="http://schemas.microsoft.com/office/drawing/2010/main" xmlns:m="http://schemas.openxmlformats.org/officeDocument/2006/math" xmlns="" val="1"/>
+              <ma14:wrappingTextBoxFlag xmlns="" xmlns:m="http://schemas.openxmlformats.org/officeDocument/2006/math" xmlns:a14="http://schemas.microsoft.com/office/drawing/2010/main" xmlns:ma14="http://schemas.microsoft.com/office/mac/drawingml/2011/main" val="1"/>
             </a:ext>
           </a:extLst>
         </p:spPr>
@@ -13790,7 +13790,7 @@
         <p:spPr>
           <a:xfrm>
             <a:off x="150112" y="2960128"/>
-            <a:ext cx="5793489" cy="3835481"/>
+            <a:ext cx="5793489" cy="3600982"/>
           </a:xfrm>
           <a:prstGeom prst="rect">
             <a:avLst/>
@@ -13800,7 +13800,7 @@
           </a:ln>
           <a:extLst>
             <a:ext uri="{C572A759-6A51-4108-AA02-DFA0A04FC94B}">
-              <ma14:wrappingTextBoxFlag xmlns:ma14="http://schemas.microsoft.com/office/mac/drawingml/2011/main" xmlns:a14="http://schemas.microsoft.com/office/drawing/2010/main" xmlns:m="http://schemas.openxmlformats.org/officeDocument/2006/math" xmlns="" val="1"/>
+              <ma14:wrappingTextBoxFlag xmlns="" xmlns:m="http://schemas.openxmlformats.org/officeDocument/2006/math" xmlns:a14="http://schemas.microsoft.com/office/drawing/2010/main" xmlns:ma14="http://schemas.microsoft.com/office/mac/drawingml/2011/main" val="1"/>
             </a:ext>
           </a:extLst>
         </p:spPr>
@@ -13814,10 +13814,15 @@
               <a:defRPr sz="1900"/>
             </a:pPr>
             <a:r>
-              <a:t>Цепочка: </a:t>
-            </a:r>
-            <a:r>
-              <a:rPr b="1">
+              <a:rPr dirty="0" err="1"/>
+              <a:t>Цепочка</a:t>
+            </a:r>
+            <a:r>
+              <a:rPr dirty="0"/>
+              <a:t>: </a:t>
+            </a:r>
+            <a:r>
+              <a:rPr b="1" dirty="0">
                 <a:solidFill>
                   <a:srgbClr val="00B050"/>
                 </a:solidFill>
@@ -13829,7 +13834,7 @@
               <a:t>1</a:t>
             </a:r>
             <a:r>
-              <a:rPr b="1">
+              <a:rPr b="1" dirty="0">
                 <a:latin typeface="+mn-lt"/>
                 <a:ea typeface="+mn-ea"/>
                 <a:cs typeface="+mn-cs"/>
@@ -13843,18 +13848,61 @@
               <a:defRPr sz="1900"/>
             </a:pPr>
             <a:r>
-              <a:t>1.Состояние А: Символ «1» -&gt; переход в Состояние  B</a:t>
-            </a:r>
+              <a:rPr dirty="0"/>
+              <a:t>1.Состояние </a:t>
+            </a:r>
+            <a:r>
+              <a:rPr lang="en-US" dirty="0" smtClean="0"/>
+              <a:t>S</a:t>
+            </a:r>
+            <a:r>
+              <a:rPr dirty="0" smtClean="0"/>
+              <a:t>: </a:t>
+            </a:r>
+            <a:r>
+              <a:rPr dirty="0" err="1"/>
+              <a:t>Символ</a:t>
+            </a:r>
+            <a:r>
+              <a:rPr dirty="0"/>
+              <a:t> «1» -&gt; </a:t>
+            </a:r>
+            <a:r>
+              <a:rPr dirty="0" err="1"/>
+              <a:t>переход</a:t>
+            </a:r>
+            <a:r>
+              <a:rPr dirty="0"/>
+              <a:t> в </a:t>
+            </a:r>
+            <a:r>
+              <a:rPr dirty="0" err="1"/>
+              <a:t>Состояние</a:t>
+            </a:r>
+            <a:r>
+              <a:rPr dirty="0"/>
+              <a:t>  </a:t>
+            </a:r>
+            <a:r>
+              <a:rPr lang="en-US" dirty="0" smtClean="0"/>
+              <a:t>A</a:t>
+            </a:r>
+            <a:endParaRPr dirty="0"/>
           </a:p>
           <a:p>
             <a:pPr>
               <a:defRPr sz="1900"/>
             </a:pPr>
             <a:r>
-              <a:t>Цепочка: </a:t>
-            </a:r>
-            <a:r>
-              <a:rPr b="1">
+              <a:rPr dirty="0" err="1"/>
+              <a:t>Цепочка</a:t>
+            </a:r>
+            <a:r>
+              <a:rPr dirty="0"/>
+              <a:t>: </a:t>
+            </a:r>
+            <a:r>
+              <a:rPr b="1" dirty="0">
                 <a:latin typeface="+mn-lt"/>
                 <a:ea typeface="+mn-ea"/>
                 <a:cs typeface="+mn-cs"/>
@@ -13863,7 +13911,7 @@
               <a:t>1 </a:t>
             </a:r>
             <a:r>
-              <a:rPr b="1">
+              <a:rPr b="1" dirty="0">
                 <a:solidFill>
                   <a:srgbClr val="00B050"/>
                 </a:solidFill>
@@ -13875,7 +13923,7 @@
               <a:t>1 </a:t>
             </a:r>
             <a:r>
-              <a:rPr b="1">
+              <a:rPr b="1" dirty="0">
                 <a:latin typeface="+mn-lt"/>
                 <a:ea typeface="+mn-ea"/>
                 <a:cs typeface="+mn-cs"/>
@@ -13889,18 +13937,69 @@
               <a:defRPr sz="1900"/>
             </a:pPr>
             <a:r>
-              <a:t>2. Состояние B: Символ «1» -&gt; переход в Состояние С</a:t>
-            </a:r>
+              <a:rPr dirty="0"/>
+              <a:t>2. </a:t>
+            </a:r>
+            <a:r>
+              <a:rPr dirty="0" err="1"/>
+              <a:t>Состояние</a:t>
+            </a:r>
+            <a:r>
+              <a:rPr dirty="0"/>
+              <a:t> </a:t>
+            </a:r>
+            <a:r>
+              <a:rPr lang="en-US" dirty="0" smtClean="0"/>
+              <a:t>A</a:t>
+            </a:r>
+            <a:r>
+              <a:rPr dirty="0" smtClean="0"/>
+              <a:t>: </a:t>
+            </a:r>
+            <a:r>
+              <a:rPr dirty="0" err="1"/>
+              <a:t>Символ</a:t>
+            </a:r>
+            <a:r>
+              <a:rPr dirty="0"/>
+              <a:t> «1» -&gt; </a:t>
+            </a:r>
+            <a:r>
+              <a:rPr dirty="0" err="1"/>
+              <a:t>переход</a:t>
+            </a:r>
+            <a:r>
+              <a:rPr dirty="0"/>
+              <a:t> в </a:t>
+            </a:r>
+            <a:r>
+              <a:rPr dirty="0" err="1"/>
+              <a:t>Состояние</a:t>
+            </a:r>
+            <a:r>
+              <a:rPr dirty="0"/>
+              <a:t> </a:t>
+            </a:r>
+            <a:r>
+              <a:rPr lang="en-US" dirty="0" smtClean="0"/>
+              <a:t>E</a:t>
+            </a:r>
+            <a:endParaRPr dirty="0"/>
           </a:p>
           <a:p>
             <a:pPr>
               <a:defRPr sz="1900"/>
             </a:pPr>
             <a:r>
-              <a:t>Цепочка: </a:t>
-            </a:r>
-            <a:r>
-              <a:rPr b="1">
+              <a:rPr dirty="0" err="1"/>
+              <a:t>Цепочка</a:t>
+            </a:r>
+            <a:r>
+              <a:rPr dirty="0"/>
+              <a:t>: </a:t>
+            </a:r>
+            <a:r>
+              <a:rPr b="1" dirty="0">
                 <a:latin typeface="+mn-lt"/>
                 <a:ea typeface="+mn-ea"/>
                 <a:cs typeface="+mn-cs"/>
@@ -13909,7 +14008,7 @@
               <a:t>1 1 </a:t>
             </a:r>
             <a:r>
-              <a:rPr b="1">
+              <a:rPr b="1" dirty="0">
                 <a:solidFill>
                   <a:srgbClr val="00B050"/>
                 </a:solidFill>
@@ -13921,7 +14020,7 @@
               <a:t>0</a:t>
             </a:r>
             <a:r>
-              <a:rPr b="1">
+              <a:rPr b="1" dirty="0">
                 <a:latin typeface="+mn-lt"/>
                 <a:ea typeface="+mn-ea"/>
                 <a:cs typeface="+mn-cs"/>
@@ -13935,7 +14034,48 @@
               <a:defRPr sz="1900"/>
             </a:pPr>
             <a:r>
-              <a:t>3. Состояние С: Символ «0» -&gt; переход в Состояние В</a:t>
+              <a:rPr dirty="0"/>
+              <a:t>3. </a:t>
+            </a:r>
+            <a:r>
+              <a:rPr dirty="0" err="1"/>
+              <a:t>Состояние</a:t>
+            </a:r>
+            <a:r>
+              <a:rPr dirty="0"/>
+              <a:t> </a:t>
+            </a:r>
+            <a:r>
+              <a:rPr lang="en-US" dirty="0" smtClean="0"/>
+              <a:t>E</a:t>
+            </a:r>
+            <a:r>
+              <a:rPr dirty="0" smtClean="0"/>
+              <a:t>: </a:t>
+            </a:r>
+            <a:r>
+              <a:rPr dirty="0" err="1"/>
+              <a:t>Символ</a:t>
+            </a:r>
+            <a:r>
+              <a:rPr dirty="0"/>
+              <a:t> «0» -&gt; </a:t>
+            </a:r>
+            <a:r>
+              <a:rPr dirty="0" err="1"/>
+              <a:t>переход</a:t>
+            </a:r>
+            <a:r>
+              <a:rPr dirty="0"/>
+              <a:t> в </a:t>
+            </a:r>
+            <a:r>
+              <a:rPr dirty="0" err="1"/>
+              <a:t>Состояние</a:t>
+            </a:r>
+            <a:r>
+              <a:rPr dirty="0"/>
+              <a:t> В</a:t>
             </a:r>
           </a:p>
           <a:p>
@@ -13943,10 +14083,15 @@
               <a:defRPr sz="1900"/>
             </a:pPr>
             <a:r>
-              <a:t>Цепочка: </a:t>
-            </a:r>
-            <a:r>
-              <a:rPr b="1">
+              <a:rPr dirty="0" err="1"/>
+              <a:t>Цепочка</a:t>
+            </a:r>
+            <a:r>
+              <a:rPr dirty="0"/>
+              <a:t>: </a:t>
+            </a:r>
+            <a:r>
+              <a:rPr b="1" dirty="0">
                 <a:latin typeface="+mn-lt"/>
                 <a:ea typeface="+mn-ea"/>
                 <a:cs typeface="+mn-cs"/>
@@ -13955,7 +14100,7 @@
               <a:t>1 1 0 </a:t>
             </a:r>
             <a:r>
-              <a:rPr b="1">
+              <a:rPr b="1" dirty="0">
                 <a:solidFill>
                   <a:srgbClr val="00B050"/>
                 </a:solidFill>
@@ -13967,7 +14112,7 @@
               <a:t>1</a:t>
             </a:r>
             <a:r>
-              <a:rPr b="1">
+              <a:rPr b="1" dirty="0">
                 <a:latin typeface="+mn-lt"/>
                 <a:ea typeface="+mn-ea"/>
                 <a:cs typeface="+mn-cs"/>
@@ -13981,7 +14126,40 @@
               <a:defRPr sz="1900"/>
             </a:pPr>
             <a:r>
-              <a:t>4. Состояние В: Символ «1» -&gt; переход в Состояние С</a:t>
+              <a:rPr dirty="0"/>
+              <a:t>4. </a:t>
+            </a:r>
+            <a:r>
+              <a:rPr dirty="0" err="1"/>
+              <a:t>Состояние</a:t>
+            </a:r>
+            <a:r>
+              <a:rPr dirty="0"/>
+              <a:t> В: </a:t>
+            </a:r>
+            <a:r>
+              <a:rPr dirty="0" err="1"/>
+              <a:t>Символ</a:t>
+            </a:r>
+            <a:r>
+              <a:rPr dirty="0"/>
+              <a:t> «1» -&gt; </a:t>
+            </a:r>
+            <a:r>
+              <a:rPr dirty="0" err="1"/>
+              <a:t>переход</a:t>
+            </a:r>
+            <a:r>
+              <a:rPr dirty="0"/>
+              <a:t> в </a:t>
+            </a:r>
+            <a:r>
+              <a:rPr dirty="0" err="1"/>
+              <a:t>Состояние</a:t>
+            </a:r>
+            <a:r>
+              <a:rPr dirty="0"/>
+              <a:t> С</a:t>
             </a:r>
           </a:p>
           <a:p>
@@ -13989,10 +14167,15 @@
               <a:defRPr sz="1900"/>
             </a:pPr>
             <a:r>
-              <a:t>Цепочка: </a:t>
-            </a:r>
-            <a:r>
-              <a:rPr b="1">
+              <a:rPr dirty="0" err="1"/>
+              <a:t>Цепочка</a:t>
+            </a:r>
+            <a:r>
+              <a:rPr dirty="0"/>
+              <a:t>: </a:t>
+            </a:r>
+            <a:r>
+              <a:rPr b="1" dirty="0">
                 <a:latin typeface="+mn-lt"/>
                 <a:ea typeface="+mn-ea"/>
                 <a:cs typeface="+mn-cs"/>
@@ -14001,7 +14184,7 @@
               <a:t>1 1 0 1 </a:t>
             </a:r>
             <a:r>
-              <a:rPr b="1">
+              <a:rPr b="1" dirty="0">
                 <a:solidFill>
                   <a:srgbClr val="00B050"/>
                 </a:solidFill>
@@ -14012,7 +14195,7 @@
               </a:rPr>
               <a:t>1</a:t>
             </a:r>
-            <a:endParaRPr>
+            <a:endParaRPr dirty="0">
               <a:solidFill>
                 <a:srgbClr val="00B050"/>
               </a:solidFill>
@@ -14023,7 +14206,40 @@
               <a:defRPr sz="1900"/>
             </a:pPr>
             <a:r>
-              <a:t>5. Состояние С: Символ «1» -&gt; переход в Состояние D</a:t>
+              <a:rPr dirty="0"/>
+              <a:t>5. </a:t>
+            </a:r>
+            <a:r>
+              <a:rPr dirty="0" err="1"/>
+              <a:t>Состояние</a:t>
+            </a:r>
+            <a:r>
+              <a:rPr dirty="0"/>
+              <a:t> С: </a:t>
+            </a:r>
+            <a:r>
+              <a:rPr dirty="0" err="1"/>
+              <a:t>Символ</a:t>
+            </a:r>
+            <a:r>
+              <a:rPr dirty="0"/>
+              <a:t> «1» -&gt; </a:t>
+            </a:r>
+            <a:r>
+              <a:rPr dirty="0" err="1"/>
+              <a:t>переход</a:t>
+            </a:r>
+            <a:r>
+              <a:rPr dirty="0"/>
+              <a:t> в </a:t>
+            </a:r>
+            <a:r>
+              <a:rPr dirty="0" err="1"/>
+              <a:t>Состояние</a:t>
+            </a:r>
+            <a:r>
+              <a:rPr dirty="0"/>
+              <a:t> D</a:t>
             </a:r>
           </a:p>
           <a:p>
@@ -14031,10 +14247,55 @@
               <a:defRPr sz="1900"/>
             </a:pPr>
             <a:r>
-              <a:t>Пришли в конечное состояние и цепочка закончилась – строка </a:t>
-            </a:r>
-            <a:r>
-              <a:rPr b="1">
+              <a:rPr dirty="0" err="1"/>
+              <a:t>Пришли</a:t>
+            </a:r>
+            <a:r>
+              <a:rPr dirty="0"/>
+              <a:t> в </a:t>
+            </a:r>
+            <a:r>
+              <a:rPr dirty="0" err="1"/>
+              <a:t>конечное</a:t>
+            </a:r>
+            <a:r>
+              <a:rPr dirty="0"/>
+              <a:t> </a:t>
+            </a:r>
+            <a:r>
+              <a:rPr dirty="0" err="1"/>
+              <a:t>состояние</a:t>
+            </a:r>
+            <a:r>
+              <a:rPr dirty="0"/>
+              <a:t> и </a:t>
+            </a:r>
+            <a:r>
+              <a:rPr dirty="0" err="1"/>
+              <a:t>цепочка</a:t>
+            </a:r>
+            <a:r>
+              <a:rPr dirty="0"/>
+              <a:t> </a:t>
+            </a:r>
+            <a:r>
+              <a:rPr dirty="0" err="1"/>
+              <a:t>закончилась</a:t>
+            </a:r>
+            <a:r>
+              <a:rPr dirty="0"/>
+              <a:t> – </a:t>
+            </a:r>
+            <a:r>
+              <a:rPr dirty="0" err="1"/>
+              <a:t>строка</a:t>
+            </a:r>
+            <a:r>
+              <a:rPr dirty="0"/>
+              <a:t> </a:t>
+            </a:r>
+            <a:r>
+              <a:rPr b="1" dirty="0" err="1">
                 <a:latin typeface="+mn-lt"/>
                 <a:ea typeface="+mn-ea"/>
                 <a:cs typeface="+mn-cs"/>
@@ -14043,6 +14304,7 @@
               <a:t>распознана</a:t>
             </a:r>
             <a:r>
+              <a:rPr dirty="0"/>
               <a:t>.</a:t>
             </a:r>
           </a:p>
@@ -14057,7 +14319,7 @@
         <p:spPr>
           <a:xfrm>
             <a:off x="6107474" y="2960128"/>
-            <a:ext cx="5824730" cy="3543381"/>
+            <a:ext cx="5824730" cy="3600982"/>
           </a:xfrm>
           <a:prstGeom prst="rect">
             <a:avLst/>
@@ -14067,7 +14329,7 @@
           </a:ln>
           <a:extLst>
             <a:ext uri="{C572A759-6A51-4108-AA02-DFA0A04FC94B}">
-              <ma14:wrappingTextBoxFlag xmlns:ma14="http://schemas.microsoft.com/office/mac/drawingml/2011/main" xmlns:a14="http://schemas.microsoft.com/office/drawing/2010/main" xmlns:m="http://schemas.openxmlformats.org/officeDocument/2006/math" xmlns="" val="1"/>
+              <ma14:wrappingTextBoxFlag xmlns="" xmlns:m="http://schemas.openxmlformats.org/officeDocument/2006/math" xmlns:a14="http://schemas.microsoft.com/office/drawing/2010/main" xmlns:ma14="http://schemas.microsoft.com/office/mac/drawingml/2011/main" val="1"/>
             </a:ext>
           </a:extLst>
         </p:spPr>
@@ -14081,10 +14343,15 @@
               <a:defRPr sz="1900"/>
             </a:pPr>
             <a:r>
-              <a:t>Цепочка: </a:t>
-            </a:r>
-            <a:r>
-              <a:rPr b="1">
+              <a:rPr dirty="0" err="1"/>
+              <a:t>Цепочка</a:t>
+            </a:r>
+            <a:r>
+              <a:rPr dirty="0"/>
+              <a:t>: </a:t>
+            </a:r>
+            <a:r>
+              <a:rPr b="1" dirty="0">
                 <a:solidFill>
                   <a:srgbClr val="00B050"/>
                 </a:solidFill>
@@ -14096,7 +14363,7 @@
               <a:t>1</a:t>
             </a:r>
             <a:r>
-              <a:rPr b="1">
+              <a:rPr b="1" dirty="0">
                 <a:latin typeface="+mn-lt"/>
                 <a:ea typeface="+mn-ea"/>
                 <a:cs typeface="+mn-cs"/>
@@ -14110,18 +14377,61 @@
               <a:defRPr sz="1900"/>
             </a:pPr>
             <a:r>
-              <a:t>1.Состояние А: Символ «1» -&gt; переход в Состояние  B</a:t>
-            </a:r>
+              <a:rPr dirty="0"/>
+              <a:t>1.Состояние </a:t>
+            </a:r>
+            <a:r>
+              <a:rPr lang="en-US" dirty="0" smtClean="0"/>
+              <a:t>S</a:t>
+            </a:r>
+            <a:r>
+              <a:rPr dirty="0" smtClean="0"/>
+              <a:t>: </a:t>
+            </a:r>
+            <a:r>
+              <a:rPr dirty="0" err="1"/>
+              <a:t>Символ</a:t>
+            </a:r>
+            <a:r>
+              <a:rPr dirty="0"/>
+              <a:t> «1» -&gt; </a:t>
+            </a:r>
+            <a:r>
+              <a:rPr dirty="0" err="1"/>
+              <a:t>переход</a:t>
+            </a:r>
+            <a:r>
+              <a:rPr dirty="0"/>
+              <a:t> в </a:t>
+            </a:r>
+            <a:r>
+              <a:rPr dirty="0" err="1"/>
+              <a:t>Состояние</a:t>
+            </a:r>
+            <a:r>
+              <a:rPr dirty="0"/>
+              <a:t>  </a:t>
+            </a:r>
+            <a:r>
+              <a:rPr lang="en-US" dirty="0" smtClean="0"/>
+              <a:t>A</a:t>
+            </a:r>
+            <a:endParaRPr dirty="0"/>
           </a:p>
           <a:p>
             <a:pPr>
               <a:defRPr sz="1900"/>
             </a:pPr>
             <a:r>
-              <a:t>Цепочка: </a:t>
-            </a:r>
-            <a:r>
-              <a:rPr b="1">
+              <a:rPr dirty="0" err="1"/>
+              <a:t>Цепочка</a:t>
+            </a:r>
+            <a:r>
+              <a:rPr dirty="0"/>
+              <a:t>: </a:t>
+            </a:r>
+            <a:r>
+              <a:rPr b="1" dirty="0">
                 <a:latin typeface="+mn-lt"/>
                 <a:ea typeface="+mn-ea"/>
                 <a:cs typeface="+mn-cs"/>
@@ -14130,7 +14440,7 @@
               <a:t>1 </a:t>
             </a:r>
             <a:r>
-              <a:rPr b="1">
+              <a:rPr b="1" dirty="0">
                 <a:solidFill>
                   <a:srgbClr val="00B050"/>
                 </a:solidFill>
@@ -14142,7 +14452,7 @@
               <a:t>1 </a:t>
             </a:r>
             <a:r>
-              <a:rPr b="1">
+              <a:rPr b="1" dirty="0">
                 <a:latin typeface="+mn-lt"/>
                 <a:ea typeface="+mn-ea"/>
                 <a:cs typeface="+mn-cs"/>
@@ -14156,18 +14466,69 @@
               <a:defRPr sz="1900"/>
             </a:pPr>
             <a:r>
-              <a:t>2. Состояние B: Символ «1» -&gt; переход в Состояние С</a:t>
-            </a:r>
+              <a:rPr dirty="0"/>
+              <a:t>2. </a:t>
+            </a:r>
+            <a:r>
+              <a:rPr dirty="0" err="1"/>
+              <a:t>Состояние</a:t>
+            </a:r>
+            <a:r>
+              <a:rPr dirty="0"/>
+              <a:t> </a:t>
+            </a:r>
+            <a:r>
+              <a:rPr lang="en-US" dirty="0" smtClean="0"/>
+              <a:t>A</a:t>
+            </a:r>
+            <a:r>
+              <a:rPr dirty="0" smtClean="0"/>
+              <a:t>: </a:t>
+            </a:r>
+            <a:r>
+              <a:rPr dirty="0" err="1"/>
+              <a:t>Символ</a:t>
+            </a:r>
+            <a:r>
+              <a:rPr dirty="0"/>
+              <a:t> «1» -&gt; </a:t>
+            </a:r>
+            <a:r>
+              <a:rPr dirty="0" err="1"/>
+              <a:t>переход</a:t>
+            </a:r>
+            <a:r>
+              <a:rPr dirty="0"/>
+              <a:t> в </a:t>
+            </a:r>
+            <a:r>
+              <a:rPr dirty="0" err="1"/>
+              <a:t>Состояние</a:t>
+            </a:r>
+            <a:r>
+              <a:rPr dirty="0"/>
+              <a:t> </a:t>
+            </a:r>
+            <a:r>
+              <a:rPr lang="en-US" dirty="0" smtClean="0"/>
+              <a:t>E</a:t>
+            </a:r>
+            <a:endParaRPr dirty="0"/>
           </a:p>
           <a:p>
             <a:pPr>
               <a:defRPr sz="1900"/>
             </a:pPr>
             <a:r>
-              <a:t>Цепочка: </a:t>
-            </a:r>
-            <a:r>
-              <a:rPr b="1">
+              <a:rPr dirty="0" err="1"/>
+              <a:t>Цепочка</a:t>
+            </a:r>
+            <a:r>
+              <a:rPr dirty="0"/>
+              <a:t>: </a:t>
+            </a:r>
+            <a:r>
+              <a:rPr b="1" dirty="0">
                 <a:latin typeface="+mn-lt"/>
                 <a:ea typeface="+mn-ea"/>
                 <a:cs typeface="+mn-cs"/>
@@ -14176,7 +14537,7 @@
               <a:t>1 1 </a:t>
             </a:r>
             <a:r>
-              <a:rPr b="1">
+              <a:rPr b="1" dirty="0">
                 <a:solidFill>
                   <a:srgbClr val="00B050"/>
                 </a:solidFill>
@@ -14188,7 +14549,7 @@
               <a:t>0</a:t>
             </a:r>
             <a:r>
-              <a:rPr b="1">
+              <a:rPr b="1" dirty="0">
                 <a:latin typeface="+mn-lt"/>
                 <a:ea typeface="+mn-ea"/>
                 <a:cs typeface="+mn-cs"/>
@@ -14202,7 +14563,40 @@
               <a:defRPr sz="1900"/>
             </a:pPr>
             <a:r>
-              <a:t>3. Состояние С: Символ «0» -&gt; переход в Состояние В</a:t>
+              <a:rPr dirty="0"/>
+              <a:t>3. </a:t>
+            </a:r>
+            <a:r>
+              <a:rPr dirty="0" err="1"/>
+              <a:t>Состояние</a:t>
+            </a:r>
+            <a:r>
+              <a:rPr dirty="0"/>
+              <a:t> С: </a:t>
+            </a:r>
+            <a:r>
+              <a:rPr dirty="0" err="1"/>
+              <a:t>Символ</a:t>
+            </a:r>
+            <a:r>
+              <a:rPr dirty="0"/>
+              <a:t> «0» -&gt; </a:t>
+            </a:r>
+            <a:r>
+              <a:rPr dirty="0" err="1"/>
+              <a:t>переход</a:t>
+            </a:r>
+            <a:r>
+              <a:rPr dirty="0"/>
+              <a:t> в </a:t>
+            </a:r>
+            <a:r>
+              <a:rPr dirty="0" err="1"/>
+              <a:t>Состояние</a:t>
+            </a:r>
+            <a:r>
+              <a:rPr dirty="0"/>
+              <a:t> В</a:t>
             </a:r>
           </a:p>
           <a:p>
@@ -14210,10 +14604,15 @@
               <a:defRPr sz="1900"/>
             </a:pPr>
             <a:r>
-              <a:t>Цепочка: </a:t>
-            </a:r>
-            <a:r>
-              <a:rPr b="1">
+              <a:rPr dirty="0" err="1"/>
+              <a:t>Цепочка</a:t>
+            </a:r>
+            <a:r>
+              <a:rPr dirty="0"/>
+              <a:t>: </a:t>
+            </a:r>
+            <a:r>
+              <a:rPr b="1" dirty="0">
                 <a:latin typeface="+mn-lt"/>
                 <a:ea typeface="+mn-ea"/>
                 <a:cs typeface="+mn-cs"/>
@@ -14222,7 +14621,7 @@
               <a:t>1 1 0 </a:t>
             </a:r>
             <a:r>
-              <a:rPr b="1">
+              <a:rPr b="1" dirty="0">
                 <a:solidFill>
                   <a:srgbClr val="00B050"/>
                 </a:solidFill>
@@ -14234,7 +14633,7 @@
               <a:t>0</a:t>
             </a:r>
             <a:r>
-              <a:rPr b="1">
+              <a:rPr b="1" dirty="0">
                 <a:latin typeface="+mn-lt"/>
                 <a:ea typeface="+mn-ea"/>
                 <a:cs typeface="+mn-cs"/>
@@ -14248,7 +14647,40 @@
               <a:defRPr sz="1900"/>
             </a:pPr>
             <a:r>
-              <a:t>4. Состояние В: Символ «0» -&gt; остались в Состоянии В</a:t>
+              <a:rPr dirty="0"/>
+              <a:t>4. </a:t>
+            </a:r>
+            <a:r>
+              <a:rPr dirty="0" err="1"/>
+              <a:t>Состояние</a:t>
+            </a:r>
+            <a:r>
+              <a:rPr dirty="0"/>
+              <a:t> В: </a:t>
+            </a:r>
+            <a:r>
+              <a:rPr dirty="0" err="1"/>
+              <a:t>Символ</a:t>
+            </a:r>
+            <a:r>
+              <a:rPr dirty="0"/>
+              <a:t> «0» -&gt; </a:t>
+            </a:r>
+            <a:r>
+              <a:rPr dirty="0" err="1"/>
+              <a:t>остались</a:t>
+            </a:r>
+            <a:r>
+              <a:rPr dirty="0"/>
+              <a:t> в </a:t>
+            </a:r>
+            <a:r>
+              <a:rPr dirty="0" err="1"/>
+              <a:t>Состоянии</a:t>
+            </a:r>
+            <a:r>
+              <a:rPr dirty="0"/>
+              <a:t> В</a:t>
             </a:r>
           </a:p>
           <a:p>
@@ -14256,10 +14688,15 @@
               <a:defRPr sz="1900"/>
             </a:pPr>
             <a:r>
-              <a:t>Цепочка: </a:t>
-            </a:r>
-            <a:r>
-              <a:rPr b="1">
+              <a:rPr dirty="0" err="1"/>
+              <a:t>Цепочка</a:t>
+            </a:r>
+            <a:r>
+              <a:rPr dirty="0"/>
+              <a:t>: </a:t>
+            </a:r>
+            <a:r>
+              <a:rPr b="1" dirty="0">
                 <a:latin typeface="+mn-lt"/>
                 <a:ea typeface="+mn-ea"/>
                 <a:cs typeface="+mn-cs"/>
@@ -14268,7 +14705,7 @@
               <a:t>1 1 0 0 </a:t>
             </a:r>
             <a:r>
-              <a:rPr b="1">
+              <a:rPr b="1" dirty="0">
                 <a:solidFill>
                   <a:srgbClr val="00B050"/>
                 </a:solidFill>
@@ -14279,7 +14716,7 @@
               </a:rPr>
               <a:t>0</a:t>
             </a:r>
-            <a:endParaRPr>
+            <a:endParaRPr dirty="0">
               <a:solidFill>
                 <a:srgbClr val="00B050"/>
               </a:solidFill>
@@ -14290,7 +14727,40 @@
               <a:defRPr sz="1900"/>
             </a:pPr>
             <a:r>
-              <a:t>5. Состояние В: Символ «0» -&gt; остались в Состояние В</a:t>
+              <a:rPr dirty="0"/>
+              <a:t>5. </a:t>
+            </a:r>
+            <a:r>
+              <a:rPr dirty="0" err="1"/>
+              <a:t>Состояние</a:t>
+            </a:r>
+            <a:r>
+              <a:rPr dirty="0"/>
+              <a:t> В: </a:t>
+            </a:r>
+            <a:r>
+              <a:rPr dirty="0" err="1"/>
+              <a:t>Символ</a:t>
+            </a:r>
+            <a:r>
+              <a:rPr dirty="0"/>
+              <a:t> «0» -&gt; </a:t>
+            </a:r>
+            <a:r>
+              <a:rPr dirty="0" err="1"/>
+              <a:t>остались</a:t>
+            </a:r>
+            <a:r>
+              <a:rPr dirty="0"/>
+              <a:t> в </a:t>
+            </a:r>
+            <a:r>
+              <a:rPr dirty="0" err="1"/>
+              <a:t>Состояние</a:t>
+            </a:r>
+            <a:r>
+              <a:rPr dirty="0"/>
+              <a:t> В</a:t>
             </a:r>
           </a:p>
           <a:p>
@@ -14298,18 +14768,90 @@
               <a:defRPr sz="1900"/>
             </a:pPr>
             <a:r>
-              <a:t>Не пришли в конечное состояние и цепочка закончилась – строка </a:t>
-            </a:r>
-            <a:r>
-              <a:rPr b="1">
+              <a:rPr dirty="0" err="1"/>
+              <a:t>Не</a:t>
+            </a:r>
+            <a:r>
+              <a:rPr dirty="0"/>
+              <a:t> </a:t>
+            </a:r>
+            <a:r>
+              <a:rPr dirty="0" err="1"/>
+              <a:t>пришли</a:t>
+            </a:r>
+            <a:r>
+              <a:rPr dirty="0"/>
+              <a:t> в </a:t>
+            </a:r>
+            <a:r>
+              <a:rPr dirty="0" err="1"/>
+              <a:t>конечное</a:t>
+            </a:r>
+            <a:r>
+              <a:rPr dirty="0"/>
+              <a:t> </a:t>
+            </a:r>
+            <a:r>
+              <a:rPr dirty="0" err="1"/>
+              <a:t>состояние</a:t>
+            </a:r>
+            <a:r>
+              <a:rPr dirty="0"/>
+              <a:t> и </a:t>
+            </a:r>
+            <a:r>
+              <a:rPr dirty="0" err="1"/>
+              <a:t>цепочка</a:t>
+            </a:r>
+            <a:r>
+              <a:rPr dirty="0"/>
+              <a:t> </a:t>
+            </a:r>
+            <a:r>
+              <a:rPr dirty="0" err="1"/>
+              <a:t>закончилась</a:t>
+            </a:r>
+            <a:r>
+              <a:rPr dirty="0"/>
+              <a:t> – </a:t>
+            </a:r>
+            <a:r>
+              <a:rPr dirty="0" err="1"/>
+              <a:t>строка</a:t>
+            </a:r>
+            <a:r>
+              <a:rPr dirty="0"/>
+              <a:t> </a:t>
+            </a:r>
+            <a:r>
+              <a:rPr b="1" dirty="0" err="1">
                 <a:latin typeface="+mn-lt"/>
                 <a:ea typeface="+mn-ea"/>
                 <a:cs typeface="+mn-cs"/>
                 <a:sym typeface="Helvetica"/>
               </a:rPr>
-              <a:t>не распознана</a:t>
-            </a:r>
-            <a:r>
+              <a:t>не</a:t>
+            </a:r>
+            <a:r>
+              <a:rPr b="1" dirty="0">
+                <a:latin typeface="+mn-lt"/>
+                <a:ea typeface="+mn-ea"/>
+                <a:cs typeface="+mn-cs"/>
+                <a:sym typeface="Helvetica"/>
+              </a:rPr>
+              <a:t> </a:t>
+            </a:r>
+            <a:r>
+              <a:rPr b="1" dirty="0" err="1">
+                <a:latin typeface="+mn-lt"/>
+                <a:ea typeface="+mn-ea"/>
+                <a:cs typeface="+mn-cs"/>
+                <a:sym typeface="Helvetica"/>
+              </a:rPr>
+              <a:t>распознана</a:t>
+            </a:r>
+            <a:r>
+              <a:rPr dirty="0"/>
               <a:t>.</a:t>
             </a:r>
           </a:p>

</xml_diff>